<commit_message>
Diagram without EXP-G icons for usage in the AP document added
</commit_message>
<xml_diff>
--- a/data/business_object_models/managed_model_based_3d_engineering/dvlp/Overview_V6.pptx
+++ b/data/business_object_models/managed_model_based_3d_engineering/dvlp/Overview_V6.pptx
@@ -8,7 +8,9 @@
     <p:sldId id="260" r:id="rId2"/>
     <p:sldId id="259" r:id="rId3"/>
     <p:sldId id="258" r:id="rId4"/>
-    <p:sldId id="256" r:id="rId5"/>
+    <p:sldId id="262" r:id="rId5"/>
+    <p:sldId id="261" r:id="rId6"/>
+    <p:sldId id="256" r:id="rId7"/>
   </p:sldIdLst>
   <p:sldSz cx="9144000" cy="6858000" type="screen4x3"/>
   <p:notesSz cx="6858000" cy="9144000"/>
@@ -291,7 +293,7 @@
           <a:p>
             <a:fld id="{2724F6E8-1EEB-4BA2-8E05-81009CE2F19A}" type="datetimeFigureOut">
               <a:rPr lang="en-GB" smtClean="0"/>
-              <a:t>06/02/2013</a:t>
+              <a:t>13/02/2013</a:t>
             </a:fld>
             <a:endParaRPr lang="en-GB"/>
           </a:p>
@@ -333,7 +335,7 @@
           <a:p>
             <a:fld id="{CF3E3E37-4BA2-4F1D-BE2D-8C92174A2704}" type="slidenum">
               <a:rPr lang="en-GB" smtClean="0"/>
-              <a:t>‹#›</a:t>
+              <a:t>‹Nr.›</a:t>
             </a:fld>
             <a:endParaRPr lang="en-GB"/>
           </a:p>
@@ -461,7 +463,7 @@
           <a:p>
             <a:fld id="{2724F6E8-1EEB-4BA2-8E05-81009CE2F19A}" type="datetimeFigureOut">
               <a:rPr lang="en-GB" smtClean="0"/>
-              <a:t>06/02/2013</a:t>
+              <a:t>13/02/2013</a:t>
             </a:fld>
             <a:endParaRPr lang="en-GB"/>
           </a:p>
@@ -503,7 +505,7 @@
           <a:p>
             <a:fld id="{CF3E3E37-4BA2-4F1D-BE2D-8C92174A2704}" type="slidenum">
               <a:rPr lang="en-GB" smtClean="0"/>
-              <a:t>‹#›</a:t>
+              <a:t>‹Nr.›</a:t>
             </a:fld>
             <a:endParaRPr lang="en-GB"/>
           </a:p>
@@ -641,7 +643,7 @@
           <a:p>
             <a:fld id="{2724F6E8-1EEB-4BA2-8E05-81009CE2F19A}" type="datetimeFigureOut">
               <a:rPr lang="en-GB" smtClean="0"/>
-              <a:t>06/02/2013</a:t>
+              <a:t>13/02/2013</a:t>
             </a:fld>
             <a:endParaRPr lang="en-GB"/>
           </a:p>
@@ -683,7 +685,7 @@
           <a:p>
             <a:fld id="{CF3E3E37-4BA2-4F1D-BE2D-8C92174A2704}" type="slidenum">
               <a:rPr lang="en-GB" smtClean="0"/>
-              <a:t>‹#›</a:t>
+              <a:t>‹Nr.›</a:t>
             </a:fld>
             <a:endParaRPr lang="en-GB"/>
           </a:p>
@@ -811,7 +813,7 @@
           <a:p>
             <a:fld id="{2724F6E8-1EEB-4BA2-8E05-81009CE2F19A}" type="datetimeFigureOut">
               <a:rPr lang="en-GB" smtClean="0"/>
-              <a:t>06/02/2013</a:t>
+              <a:t>13/02/2013</a:t>
             </a:fld>
             <a:endParaRPr lang="en-GB"/>
           </a:p>
@@ -853,7 +855,7 @@
           <a:p>
             <a:fld id="{CF3E3E37-4BA2-4F1D-BE2D-8C92174A2704}" type="slidenum">
               <a:rPr lang="en-GB" smtClean="0"/>
-              <a:t>‹#›</a:t>
+              <a:t>‹Nr.›</a:t>
             </a:fld>
             <a:endParaRPr lang="en-GB"/>
           </a:p>
@@ -1057,7 +1059,7 @@
           <a:p>
             <a:fld id="{2724F6E8-1EEB-4BA2-8E05-81009CE2F19A}" type="datetimeFigureOut">
               <a:rPr lang="en-GB" smtClean="0"/>
-              <a:t>06/02/2013</a:t>
+              <a:t>13/02/2013</a:t>
             </a:fld>
             <a:endParaRPr lang="en-GB"/>
           </a:p>
@@ -1099,7 +1101,7 @@
           <a:p>
             <a:fld id="{CF3E3E37-4BA2-4F1D-BE2D-8C92174A2704}" type="slidenum">
               <a:rPr lang="en-GB" smtClean="0"/>
-              <a:t>‹#›</a:t>
+              <a:t>‹Nr.›</a:t>
             </a:fld>
             <a:endParaRPr lang="en-GB"/>
           </a:p>
@@ -1345,7 +1347,7 @@
           <a:p>
             <a:fld id="{2724F6E8-1EEB-4BA2-8E05-81009CE2F19A}" type="datetimeFigureOut">
               <a:rPr lang="en-GB" smtClean="0"/>
-              <a:t>06/02/2013</a:t>
+              <a:t>13/02/2013</a:t>
             </a:fld>
             <a:endParaRPr lang="en-GB"/>
           </a:p>
@@ -1387,7 +1389,7 @@
           <a:p>
             <a:fld id="{CF3E3E37-4BA2-4F1D-BE2D-8C92174A2704}" type="slidenum">
               <a:rPr lang="en-GB" smtClean="0"/>
-              <a:t>‹#›</a:t>
+              <a:t>‹Nr.›</a:t>
             </a:fld>
             <a:endParaRPr lang="en-GB"/>
           </a:p>
@@ -1767,7 +1769,7 @@
           <a:p>
             <a:fld id="{2724F6E8-1EEB-4BA2-8E05-81009CE2F19A}" type="datetimeFigureOut">
               <a:rPr lang="en-GB" smtClean="0"/>
-              <a:t>06/02/2013</a:t>
+              <a:t>13/02/2013</a:t>
             </a:fld>
             <a:endParaRPr lang="en-GB"/>
           </a:p>
@@ -1809,7 +1811,7 @@
           <a:p>
             <a:fld id="{CF3E3E37-4BA2-4F1D-BE2D-8C92174A2704}" type="slidenum">
               <a:rPr lang="en-GB" smtClean="0"/>
-              <a:t>‹#›</a:t>
+              <a:t>‹Nr.›</a:t>
             </a:fld>
             <a:endParaRPr lang="en-GB"/>
           </a:p>
@@ -1885,7 +1887,7 @@
           <a:p>
             <a:fld id="{2724F6E8-1EEB-4BA2-8E05-81009CE2F19A}" type="datetimeFigureOut">
               <a:rPr lang="en-GB" smtClean="0"/>
-              <a:t>06/02/2013</a:t>
+              <a:t>13/02/2013</a:t>
             </a:fld>
             <a:endParaRPr lang="en-GB"/>
           </a:p>
@@ -1927,7 +1929,7 @@
           <a:p>
             <a:fld id="{CF3E3E37-4BA2-4F1D-BE2D-8C92174A2704}" type="slidenum">
               <a:rPr lang="en-GB" smtClean="0"/>
-              <a:t>‹#›</a:t>
+              <a:t>‹Nr.›</a:t>
             </a:fld>
             <a:endParaRPr lang="en-GB"/>
           </a:p>
@@ -1980,7 +1982,7 @@
           <a:p>
             <a:fld id="{2724F6E8-1EEB-4BA2-8E05-81009CE2F19A}" type="datetimeFigureOut">
               <a:rPr lang="en-GB" smtClean="0"/>
-              <a:t>06/02/2013</a:t>
+              <a:t>13/02/2013</a:t>
             </a:fld>
             <a:endParaRPr lang="en-GB"/>
           </a:p>
@@ -2022,7 +2024,7 @@
           <a:p>
             <a:fld id="{CF3E3E37-4BA2-4F1D-BE2D-8C92174A2704}" type="slidenum">
               <a:rPr lang="en-GB" smtClean="0"/>
-              <a:t>‹#›</a:t>
+              <a:t>‹Nr.›</a:t>
             </a:fld>
             <a:endParaRPr lang="en-GB"/>
           </a:p>
@@ -2257,7 +2259,7 @@
           <a:p>
             <a:fld id="{2724F6E8-1EEB-4BA2-8E05-81009CE2F19A}" type="datetimeFigureOut">
               <a:rPr lang="en-GB" smtClean="0"/>
-              <a:t>06/02/2013</a:t>
+              <a:t>13/02/2013</a:t>
             </a:fld>
             <a:endParaRPr lang="en-GB"/>
           </a:p>
@@ -2299,7 +2301,7 @@
           <a:p>
             <a:fld id="{CF3E3E37-4BA2-4F1D-BE2D-8C92174A2704}" type="slidenum">
               <a:rPr lang="en-GB" smtClean="0"/>
-              <a:t>‹#›</a:t>
+              <a:t>‹Nr.›</a:t>
             </a:fld>
             <a:endParaRPr lang="en-GB"/>
           </a:p>
@@ -2510,7 +2512,7 @@
           <a:p>
             <a:fld id="{2724F6E8-1EEB-4BA2-8E05-81009CE2F19A}" type="datetimeFigureOut">
               <a:rPr lang="en-GB" smtClean="0"/>
-              <a:t>06/02/2013</a:t>
+              <a:t>13/02/2013</a:t>
             </a:fld>
             <a:endParaRPr lang="en-GB"/>
           </a:p>
@@ -2552,7 +2554,7 @@
           <a:p>
             <a:fld id="{CF3E3E37-4BA2-4F1D-BE2D-8C92174A2704}" type="slidenum">
               <a:rPr lang="en-GB" smtClean="0"/>
-              <a:t>‹#›</a:t>
+              <a:t>‹Nr.›</a:t>
             </a:fld>
             <a:endParaRPr lang="en-GB"/>
           </a:p>
@@ -2723,7 +2725,7 @@
           <a:p>
             <a:fld id="{2724F6E8-1EEB-4BA2-8E05-81009CE2F19A}" type="datetimeFigureOut">
               <a:rPr lang="en-GB" smtClean="0"/>
-              <a:t>06/02/2013</a:t>
+              <a:t>13/02/2013</a:t>
             </a:fld>
             <a:endParaRPr lang="en-GB"/>
           </a:p>
@@ -2801,7 +2803,7 @@
           <a:p>
             <a:fld id="{CF3E3E37-4BA2-4F1D-BE2D-8C92174A2704}" type="slidenum">
               <a:rPr lang="en-GB" smtClean="0"/>
-              <a:t>‹#›</a:t>
+              <a:t>‹Nr.›</a:t>
             </a:fld>
             <a:endParaRPr lang="en-GB"/>
           </a:p>
@@ -9510,6 +9512,3734 @@
 </file>
 
 <file path=ppt/slides/slide4.xml><?xml version="1.0" encoding="utf-8"?>
+<p:sld xmlns:a="http://schemas.openxmlformats.org/drawingml/2006/main" xmlns:r="http://schemas.openxmlformats.org/officeDocument/2006/relationships" xmlns:p="http://schemas.openxmlformats.org/presentationml/2006/main">
+  <p:cSld>
+    <p:spTree>
+      <p:nvGrpSpPr>
+        <p:cNvPr id="1" name=""/>
+        <p:cNvGrpSpPr/>
+        <p:nvPr/>
+      </p:nvGrpSpPr>
+      <p:grpSpPr>
+        <a:xfrm>
+          <a:off x="0" y="0"/>
+          <a:ext cx="0" cy="0"/>
+          <a:chOff x="0" y="0"/>
+          <a:chExt cx="0" cy="0"/>
+        </a:xfrm>
+      </p:grpSpPr>
+      <p:sp>
+        <p:nvSpPr>
+          <p:cNvPr id="10" name="Rectangle 9"/>
+          <p:cNvSpPr/>
+          <p:nvPr/>
+        </p:nvSpPr>
+        <p:spPr>
+          <a:xfrm>
+            <a:off x="49564" y="6453936"/>
+            <a:ext cx="9036496" cy="359440"/>
+          </a:xfrm>
+          <a:prstGeom prst="rect">
+            <a:avLst/>
+          </a:prstGeom>
+        </p:spPr>
+        <p:style>
+          <a:lnRef idx="1">
+            <a:schemeClr val="dk1"/>
+          </a:lnRef>
+          <a:fillRef idx="2">
+            <a:schemeClr val="dk1"/>
+          </a:fillRef>
+          <a:effectRef idx="1">
+            <a:schemeClr val="dk1"/>
+          </a:effectRef>
+          <a:fontRef idx="minor">
+            <a:schemeClr val="dk1"/>
+          </a:fontRef>
+        </p:style>
+        <p:txBody>
+          <a:bodyPr rtlCol="0" anchor="ctr"/>
+          <a:lstStyle/>
+          <a:p>
+            <a:pPr algn="ctr"/>
+            <a:endParaRPr lang="en-GB"/>
+          </a:p>
+        </p:txBody>
+      </p:sp>
+      <p:sp>
+        <p:nvSpPr>
+          <p:cNvPr id="5" name="Rectangle 4"/>
+          <p:cNvSpPr/>
+          <p:nvPr/>
+        </p:nvSpPr>
+        <p:spPr>
+          <a:xfrm>
+            <a:off x="125861" y="6564066"/>
+            <a:ext cx="288000" cy="180000"/>
+          </a:xfrm>
+          <a:prstGeom prst="rect">
+            <a:avLst/>
+          </a:prstGeom>
+          <a:ln/>
+        </p:spPr>
+        <p:style>
+          <a:lnRef idx="0">
+            <a:schemeClr val="accent6"/>
+          </a:lnRef>
+          <a:fillRef idx="3">
+            <a:schemeClr val="accent6"/>
+          </a:fillRef>
+          <a:effectRef idx="3">
+            <a:schemeClr val="accent6"/>
+          </a:effectRef>
+          <a:fontRef idx="minor">
+            <a:schemeClr val="lt1"/>
+          </a:fontRef>
+        </p:style>
+        <p:txBody>
+          <a:bodyPr lIns="0" tIns="0" rIns="0" bIns="0" rtlCol="0" anchor="t"/>
+          <a:lstStyle/>
+          <a:p>
+            <a:pPr algn="ctr"/>
+            <a:endParaRPr lang="en-US" sz="1400" b="1">
+              <a:solidFill>
+                <a:schemeClr val="tx1"/>
+              </a:solidFill>
+            </a:endParaRPr>
+          </a:p>
+        </p:txBody>
+      </p:sp>
+      <p:sp>
+        <p:nvSpPr>
+          <p:cNvPr id="6" name="6-Point Star 5"/>
+          <p:cNvSpPr/>
+          <p:nvPr/>
+        </p:nvSpPr>
+        <p:spPr>
+          <a:xfrm>
+            <a:off x="6893622" y="6575317"/>
+            <a:ext cx="139910" cy="157498"/>
+          </a:xfrm>
+          <a:prstGeom prst="star6">
+            <a:avLst/>
+          </a:prstGeom>
+          <a:solidFill>
+            <a:schemeClr val="tx1"/>
+          </a:solidFill>
+          <a:ln>
+            <a:solidFill>
+              <a:schemeClr val="tx1"/>
+            </a:solidFill>
+          </a:ln>
+        </p:spPr>
+        <p:style>
+          <a:lnRef idx="2">
+            <a:schemeClr val="accent1">
+              <a:shade val="50000"/>
+            </a:schemeClr>
+          </a:lnRef>
+          <a:fillRef idx="1">
+            <a:schemeClr val="accent1"/>
+          </a:fillRef>
+          <a:effectRef idx="0">
+            <a:schemeClr val="accent1"/>
+          </a:effectRef>
+          <a:fontRef idx="minor">
+            <a:schemeClr val="lt1"/>
+          </a:fontRef>
+        </p:style>
+        <p:txBody>
+          <a:bodyPr rtlCol="0" anchor="ctr"/>
+          <a:lstStyle/>
+          <a:p>
+            <a:pPr algn="ctr"/>
+            <a:endParaRPr lang="en-US"/>
+          </a:p>
+        </p:txBody>
+      </p:sp>
+      <p:sp>
+        <p:nvSpPr>
+          <p:cNvPr id="7" name="TextBox 6"/>
+          <p:cNvSpPr txBox="1"/>
+          <p:nvPr/>
+        </p:nvSpPr>
+        <p:spPr>
+          <a:xfrm>
+            <a:off x="389617" y="6405810"/>
+            <a:ext cx="2377574" cy="383503"/>
+          </a:xfrm>
+          <a:prstGeom prst="rect">
+            <a:avLst/>
+          </a:prstGeom>
+          <a:noFill/>
+        </p:spPr>
+        <p:txBody>
+          <a:bodyPr wrap="none" rtlCol="0">
+            <a:spAutoFit/>
+          </a:bodyPr>
+          <a:lstStyle/>
+          <a:p>
+            <a:pPr>
+              <a:lnSpc>
+                <a:spcPct val="200000"/>
+              </a:lnSpc>
+            </a:pPr>
+            <a:r>
+              <a:rPr lang="en-US" sz="1100" dirty="0"/>
+              <a:t>C</a:t>
+            </a:r>
+            <a:r>
+              <a:rPr lang="en-US" sz="1100" dirty="0" smtClean="0"/>
+              <a:t>apability with an XML representation</a:t>
+            </a:r>
+          </a:p>
+        </p:txBody>
+      </p:sp>
+      <p:sp>
+        <p:nvSpPr>
+          <p:cNvPr id="8" name="Rectangle 7"/>
+          <p:cNvSpPr/>
+          <p:nvPr/>
+        </p:nvSpPr>
+        <p:spPr>
+          <a:xfrm>
+            <a:off x="3228124" y="6564066"/>
+            <a:ext cx="288000" cy="180000"/>
+          </a:xfrm>
+          <a:prstGeom prst="rect">
+            <a:avLst/>
+          </a:prstGeom>
+          <a:ln/>
+        </p:spPr>
+        <p:style>
+          <a:lnRef idx="0">
+            <a:schemeClr val="accent5"/>
+          </a:lnRef>
+          <a:fillRef idx="3">
+            <a:schemeClr val="accent5"/>
+          </a:fillRef>
+          <a:effectRef idx="3">
+            <a:schemeClr val="accent5"/>
+          </a:effectRef>
+          <a:fontRef idx="minor">
+            <a:schemeClr val="lt1"/>
+          </a:fontRef>
+        </p:style>
+        <p:txBody>
+          <a:bodyPr lIns="0" tIns="0" rIns="0" bIns="0" rtlCol="0" anchor="ctr"/>
+          <a:lstStyle/>
+          <a:p>
+            <a:pPr algn="ctr"/>
+            <a:endParaRPr lang="en-US" sz="1400" b="1">
+              <a:solidFill>
+                <a:schemeClr val="tx1"/>
+              </a:solidFill>
+            </a:endParaRPr>
+          </a:p>
+        </p:txBody>
+      </p:sp>
+      <p:sp>
+        <p:nvSpPr>
+          <p:cNvPr id="4" name="Rectangle 3"/>
+          <p:cNvSpPr/>
+          <p:nvPr/>
+        </p:nvSpPr>
+        <p:spPr>
+          <a:xfrm>
+            <a:off x="3491880" y="6405810"/>
+            <a:ext cx="2880320" cy="383503"/>
+          </a:xfrm>
+          <a:prstGeom prst="rect">
+            <a:avLst/>
+          </a:prstGeom>
+        </p:spPr>
+        <p:txBody>
+          <a:bodyPr wrap="square">
+            <a:spAutoFit/>
+          </a:bodyPr>
+          <a:lstStyle/>
+          <a:p>
+            <a:pPr>
+              <a:lnSpc>
+                <a:spcPct val="200000"/>
+              </a:lnSpc>
+            </a:pPr>
+            <a:r>
+              <a:rPr lang="en-US" sz="1100" dirty="0"/>
+              <a:t>Capability without an XML </a:t>
+            </a:r>
+            <a:r>
+              <a:rPr lang="en-US" sz="1100" dirty="0" smtClean="0"/>
+              <a:t>representation</a:t>
+            </a:r>
+            <a:endParaRPr lang="en-US" sz="1100" dirty="0"/>
+          </a:p>
+        </p:txBody>
+      </p:sp>
+      <p:sp>
+        <p:nvSpPr>
+          <p:cNvPr id="9" name="Rectangle 8"/>
+          <p:cNvSpPr/>
+          <p:nvPr/>
+        </p:nvSpPr>
+        <p:spPr>
+          <a:xfrm>
+            <a:off x="7021274" y="6405810"/>
+            <a:ext cx="2082621" cy="383503"/>
+          </a:xfrm>
+          <a:prstGeom prst="rect">
+            <a:avLst/>
+          </a:prstGeom>
+        </p:spPr>
+        <p:txBody>
+          <a:bodyPr wrap="none">
+            <a:spAutoFit/>
+          </a:bodyPr>
+          <a:lstStyle/>
+          <a:p>
+            <a:pPr>
+              <a:lnSpc>
+                <a:spcPct val="200000"/>
+              </a:lnSpc>
+            </a:pPr>
+            <a:r>
+              <a:rPr lang="en-US" sz="1100" dirty="0"/>
+              <a:t>Capability not part of this version</a:t>
+            </a:r>
+          </a:p>
+        </p:txBody>
+      </p:sp>
+      <p:pic>
+        <p:nvPicPr>
+          <p:cNvPr id="2" name="Picture 2"/>
+          <p:cNvPicPr>
+            <a:picLocks noChangeAspect="1" noChangeArrowheads="1"/>
+          </p:cNvPicPr>
+          <p:nvPr/>
+        </p:nvPicPr>
+        <p:blipFill>
+          <a:blip r:embed="rId2">
+            <a:extLst>
+              <a:ext uri="{28A0092B-C50C-407E-A947-70E740481C1C}">
+                <a14:useLocalDpi xmlns:a14="http://schemas.microsoft.com/office/drawing/2010/main" val="0"/>
+              </a:ext>
+            </a:extLst>
+          </a:blip>
+          <a:srcRect/>
+          <a:stretch>
+            <a:fillRect/>
+          </a:stretch>
+        </p:blipFill>
+        <p:spPr bwMode="auto">
+          <a:xfrm>
+            <a:off x="389617" y="116632"/>
+            <a:ext cx="8364766" cy="6325638"/>
+          </a:xfrm>
+          <a:prstGeom prst="rect">
+            <a:avLst/>
+          </a:prstGeom>
+          <a:noFill/>
+          <a:ln>
+            <a:noFill/>
+          </a:ln>
+          <a:effectLst/>
+          <a:extLst>
+            <a:ext uri="{909E8E84-426E-40DD-AFC4-6F175D3DCCD1}">
+              <a14:hiddenFill xmlns:a14="http://schemas.microsoft.com/office/drawing/2010/main">
+                <a:solidFill>
+                  <a:schemeClr val="accent1"/>
+                </a:solidFill>
+              </a14:hiddenFill>
+            </a:ext>
+            <a:ext uri="{91240B29-F687-4F45-9708-019B960494DF}">
+              <a14:hiddenLine xmlns:a14="http://schemas.microsoft.com/office/drawing/2010/main" w="9525">
+                <a:solidFill>
+                  <a:schemeClr val="tx1"/>
+                </a:solidFill>
+                <a:miter lim="800000"/>
+                <a:headEnd/>
+                <a:tailEnd/>
+              </a14:hiddenLine>
+            </a:ext>
+            <a:ext uri="{AF507438-7753-43E0-B8FC-AC1667EBCBE1}">
+              <a14:hiddenEffects xmlns:a14="http://schemas.microsoft.com/office/drawing/2010/main">
+                <a:effectLst>
+                  <a:outerShdw dist="35921" dir="2700000" algn="ctr" rotWithShape="0">
+                    <a:schemeClr val="bg2"/>
+                  </a:outerShdw>
+                </a:effectLst>
+              </a14:hiddenEffects>
+            </a:ext>
+          </a:extLst>
+        </p:spPr>
+      </p:pic>
+    </p:spTree>
+    <p:extLst>
+      <p:ext uri="{BB962C8B-B14F-4D97-AF65-F5344CB8AC3E}">
+        <p14:creationId xmlns:p14="http://schemas.microsoft.com/office/powerpoint/2010/main" val="613201449"/>
+      </p:ext>
+    </p:extLst>
+  </p:cSld>
+  <p:clrMapOvr>
+    <a:masterClrMapping/>
+  </p:clrMapOvr>
+  <p:timing>
+    <p:tnLst>
+      <p:par>
+        <p:cTn id="1" dur="indefinite" restart="never" nodeType="tmRoot"/>
+      </p:par>
+    </p:tnLst>
+  </p:timing>
+</p:sld>
+</file>
+
+<file path=ppt/slides/slide5.xml><?xml version="1.0" encoding="utf-8"?>
+<p:sld xmlns:a="http://schemas.openxmlformats.org/drawingml/2006/main" xmlns:r="http://schemas.openxmlformats.org/officeDocument/2006/relationships" xmlns:p="http://schemas.openxmlformats.org/presentationml/2006/main">
+  <p:cSld>
+    <p:spTree>
+      <p:nvGrpSpPr>
+        <p:cNvPr id="1" name=""/>
+        <p:cNvGrpSpPr/>
+        <p:nvPr/>
+      </p:nvGrpSpPr>
+      <p:grpSpPr>
+        <a:xfrm>
+          <a:off x="0" y="0"/>
+          <a:ext cx="0" cy="0"/>
+          <a:chOff x="0" y="0"/>
+          <a:chExt cx="0" cy="0"/>
+        </a:xfrm>
+      </p:grpSpPr>
+      <p:cxnSp>
+        <p:nvCxnSpPr>
+          <p:cNvPr id="138" name="Straight Connector 137"/>
+          <p:cNvCxnSpPr/>
+          <p:nvPr/>
+        </p:nvCxnSpPr>
+        <p:spPr>
+          <a:xfrm flipH="1" flipV="1">
+            <a:off x="1203937" y="2507254"/>
+            <a:ext cx="1385201" cy="475630"/>
+          </a:xfrm>
+          <a:prstGeom prst="line">
+            <a:avLst/>
+          </a:prstGeom>
+          <a:ln w="28575">
+            <a:solidFill>
+              <a:schemeClr val="tx1"/>
+            </a:solidFill>
+          </a:ln>
+        </p:spPr>
+        <p:style>
+          <a:lnRef idx="1">
+            <a:schemeClr val="accent1"/>
+          </a:lnRef>
+          <a:fillRef idx="0">
+            <a:schemeClr val="accent1"/>
+          </a:fillRef>
+          <a:effectRef idx="0">
+            <a:schemeClr val="accent1"/>
+          </a:effectRef>
+          <a:fontRef idx="minor">
+            <a:schemeClr val="tx1"/>
+          </a:fontRef>
+        </p:style>
+      </p:cxnSp>
+      <p:cxnSp>
+        <p:nvCxnSpPr>
+          <p:cNvPr id="141" name="Straight Connector 140"/>
+          <p:cNvCxnSpPr/>
+          <p:nvPr/>
+        </p:nvCxnSpPr>
+        <p:spPr>
+          <a:xfrm>
+            <a:off x="3625444" y="3677849"/>
+            <a:ext cx="1530407" cy="1025129"/>
+          </a:xfrm>
+          <a:prstGeom prst="line">
+            <a:avLst/>
+          </a:prstGeom>
+          <a:ln w="28575">
+            <a:solidFill>
+              <a:schemeClr val="tx1"/>
+            </a:solidFill>
+          </a:ln>
+        </p:spPr>
+        <p:style>
+          <a:lnRef idx="1">
+            <a:schemeClr val="accent1"/>
+          </a:lnRef>
+          <a:fillRef idx="0">
+            <a:schemeClr val="accent1"/>
+          </a:fillRef>
+          <a:effectRef idx="0">
+            <a:schemeClr val="accent1"/>
+          </a:effectRef>
+          <a:fontRef idx="minor">
+            <a:schemeClr val="tx1"/>
+          </a:fontRef>
+        </p:style>
+      </p:cxnSp>
+      <p:cxnSp>
+        <p:nvCxnSpPr>
+          <p:cNvPr id="149" name="Straight Connector 148"/>
+          <p:cNvCxnSpPr/>
+          <p:nvPr/>
+        </p:nvCxnSpPr>
+        <p:spPr>
+          <a:xfrm flipV="1">
+            <a:off x="4091127" y="900693"/>
+            <a:ext cx="1749026" cy="1880236"/>
+          </a:xfrm>
+          <a:prstGeom prst="line">
+            <a:avLst/>
+          </a:prstGeom>
+          <a:ln w="28575">
+            <a:solidFill>
+              <a:schemeClr val="tx1"/>
+            </a:solidFill>
+          </a:ln>
+        </p:spPr>
+        <p:style>
+          <a:lnRef idx="1">
+            <a:schemeClr val="accent1"/>
+          </a:lnRef>
+          <a:fillRef idx="0">
+            <a:schemeClr val="accent1"/>
+          </a:fillRef>
+          <a:effectRef idx="0">
+            <a:schemeClr val="accent1"/>
+          </a:effectRef>
+          <a:fontRef idx="minor">
+            <a:schemeClr val="tx1"/>
+          </a:fontRef>
+        </p:style>
+      </p:cxnSp>
+      <p:cxnSp>
+        <p:nvCxnSpPr>
+          <p:cNvPr id="147" name="Straight Connector 146"/>
+          <p:cNvCxnSpPr/>
+          <p:nvPr/>
+        </p:nvCxnSpPr>
+        <p:spPr>
+          <a:xfrm flipV="1">
+            <a:off x="3948674" y="2940636"/>
+            <a:ext cx="1127382" cy="126737"/>
+          </a:xfrm>
+          <a:prstGeom prst="line">
+            <a:avLst/>
+          </a:prstGeom>
+          <a:ln w="28575">
+            <a:solidFill>
+              <a:schemeClr val="tx1"/>
+            </a:solidFill>
+          </a:ln>
+        </p:spPr>
+        <p:style>
+          <a:lnRef idx="1">
+            <a:schemeClr val="accent1"/>
+          </a:lnRef>
+          <a:fillRef idx="0">
+            <a:schemeClr val="accent1"/>
+          </a:fillRef>
+          <a:effectRef idx="0">
+            <a:schemeClr val="accent1"/>
+          </a:effectRef>
+          <a:fontRef idx="minor">
+            <a:schemeClr val="tx1"/>
+          </a:fontRef>
+        </p:style>
+      </p:cxnSp>
+      <p:cxnSp>
+        <p:nvCxnSpPr>
+          <p:cNvPr id="145" name="Straight Connector 144"/>
+          <p:cNvCxnSpPr/>
+          <p:nvPr/>
+        </p:nvCxnSpPr>
+        <p:spPr>
+          <a:xfrm flipV="1">
+            <a:off x="4116552" y="3327303"/>
+            <a:ext cx="2951150" cy="65304"/>
+          </a:xfrm>
+          <a:prstGeom prst="line">
+            <a:avLst/>
+          </a:prstGeom>
+          <a:ln w="28575">
+            <a:solidFill>
+              <a:schemeClr val="tx1"/>
+            </a:solidFill>
+          </a:ln>
+        </p:spPr>
+        <p:style>
+          <a:lnRef idx="1">
+            <a:schemeClr val="accent1"/>
+          </a:lnRef>
+          <a:fillRef idx="0">
+            <a:schemeClr val="accent1"/>
+          </a:fillRef>
+          <a:effectRef idx="0">
+            <a:schemeClr val="accent1"/>
+          </a:effectRef>
+          <a:fontRef idx="minor">
+            <a:schemeClr val="tx1"/>
+          </a:fontRef>
+        </p:style>
+      </p:cxnSp>
+      <p:cxnSp>
+        <p:nvCxnSpPr>
+          <p:cNvPr id="143" name="Straight Connector 142"/>
+          <p:cNvCxnSpPr/>
+          <p:nvPr/>
+        </p:nvCxnSpPr>
+        <p:spPr>
+          <a:xfrm>
+            <a:off x="4130725" y="3559255"/>
+            <a:ext cx="3609627" cy="626540"/>
+          </a:xfrm>
+          <a:prstGeom prst="line">
+            <a:avLst/>
+          </a:prstGeom>
+          <a:ln w="28575">
+            <a:solidFill>
+              <a:schemeClr val="tx1"/>
+            </a:solidFill>
+          </a:ln>
+        </p:spPr>
+        <p:style>
+          <a:lnRef idx="1">
+            <a:schemeClr val="accent1"/>
+          </a:lnRef>
+          <a:fillRef idx="0">
+            <a:schemeClr val="accent1"/>
+          </a:fillRef>
+          <a:effectRef idx="0">
+            <a:schemeClr val="accent1"/>
+          </a:effectRef>
+          <a:fontRef idx="minor">
+            <a:schemeClr val="tx1"/>
+          </a:fontRef>
+        </p:style>
+      </p:cxnSp>
+      <p:cxnSp>
+        <p:nvCxnSpPr>
+          <p:cNvPr id="140" name="Straight Connector 139"/>
+          <p:cNvCxnSpPr/>
+          <p:nvPr/>
+        </p:nvCxnSpPr>
+        <p:spPr>
+          <a:xfrm>
+            <a:off x="3989189" y="3677849"/>
+            <a:ext cx="3290979" cy="1083903"/>
+          </a:xfrm>
+          <a:prstGeom prst="line">
+            <a:avLst/>
+          </a:prstGeom>
+          <a:ln w="28575">
+            <a:solidFill>
+              <a:schemeClr val="tx1"/>
+            </a:solidFill>
+          </a:ln>
+        </p:spPr>
+        <p:style>
+          <a:lnRef idx="1">
+            <a:schemeClr val="accent1"/>
+          </a:lnRef>
+          <a:fillRef idx="0">
+            <a:schemeClr val="accent1"/>
+          </a:fillRef>
+          <a:effectRef idx="0">
+            <a:schemeClr val="accent1"/>
+          </a:effectRef>
+          <a:fontRef idx="minor">
+            <a:schemeClr val="tx1"/>
+          </a:fontRef>
+        </p:style>
+      </p:cxnSp>
+      <p:cxnSp>
+        <p:nvCxnSpPr>
+          <p:cNvPr id="136" name="Straight Connector 135"/>
+          <p:cNvCxnSpPr/>
+          <p:nvPr/>
+        </p:nvCxnSpPr>
+        <p:spPr>
+          <a:xfrm>
+            <a:off x="3419872" y="3814578"/>
+            <a:ext cx="944540" cy="2185608"/>
+          </a:xfrm>
+          <a:prstGeom prst="line">
+            <a:avLst/>
+          </a:prstGeom>
+          <a:ln w="28575">
+            <a:solidFill>
+              <a:schemeClr val="tx1"/>
+            </a:solidFill>
+          </a:ln>
+        </p:spPr>
+        <p:style>
+          <a:lnRef idx="1">
+            <a:schemeClr val="accent1"/>
+          </a:lnRef>
+          <a:fillRef idx="0">
+            <a:schemeClr val="accent1"/>
+          </a:fillRef>
+          <a:effectRef idx="0">
+            <a:schemeClr val="accent1"/>
+          </a:effectRef>
+          <a:fontRef idx="minor">
+            <a:schemeClr val="tx1"/>
+          </a:fontRef>
+        </p:style>
+      </p:cxnSp>
+      <p:cxnSp>
+        <p:nvCxnSpPr>
+          <p:cNvPr id="129" name="Straight Connector 128"/>
+          <p:cNvCxnSpPr/>
+          <p:nvPr/>
+        </p:nvCxnSpPr>
+        <p:spPr>
+          <a:xfrm>
+            <a:off x="3133920" y="3691917"/>
+            <a:ext cx="69928" cy="2308269"/>
+          </a:xfrm>
+          <a:prstGeom prst="line">
+            <a:avLst/>
+          </a:prstGeom>
+          <a:ln w="28575">
+            <a:solidFill>
+              <a:schemeClr val="tx1"/>
+            </a:solidFill>
+          </a:ln>
+        </p:spPr>
+        <p:style>
+          <a:lnRef idx="1">
+            <a:schemeClr val="accent1"/>
+          </a:lnRef>
+          <a:fillRef idx="0">
+            <a:schemeClr val="accent1"/>
+          </a:fillRef>
+          <a:effectRef idx="0">
+            <a:schemeClr val="accent1"/>
+          </a:effectRef>
+          <a:fontRef idx="minor">
+            <a:schemeClr val="tx1"/>
+          </a:fontRef>
+        </p:style>
+      </p:cxnSp>
+      <p:cxnSp>
+        <p:nvCxnSpPr>
+          <p:cNvPr id="127" name="Straight Connector 126"/>
+          <p:cNvCxnSpPr/>
+          <p:nvPr/>
+        </p:nvCxnSpPr>
+        <p:spPr>
+          <a:xfrm flipV="1">
+            <a:off x="3948674" y="505246"/>
+            <a:ext cx="638292" cy="2301206"/>
+          </a:xfrm>
+          <a:prstGeom prst="line">
+            <a:avLst/>
+          </a:prstGeom>
+          <a:ln w="28575">
+            <a:solidFill>
+              <a:schemeClr val="tx1"/>
+            </a:solidFill>
+          </a:ln>
+        </p:spPr>
+        <p:style>
+          <a:lnRef idx="1">
+            <a:schemeClr val="accent1"/>
+          </a:lnRef>
+          <a:fillRef idx="0">
+            <a:schemeClr val="accent1"/>
+          </a:fillRef>
+          <a:effectRef idx="0">
+            <a:schemeClr val="accent1"/>
+          </a:effectRef>
+          <a:fontRef idx="minor">
+            <a:schemeClr val="tx1"/>
+          </a:fontRef>
+        </p:style>
+      </p:cxnSp>
+      <p:cxnSp>
+        <p:nvCxnSpPr>
+          <p:cNvPr id="124" name="Straight Connector 123"/>
+          <p:cNvCxnSpPr/>
+          <p:nvPr/>
+        </p:nvCxnSpPr>
+        <p:spPr>
+          <a:xfrm flipH="1" flipV="1">
+            <a:off x="3016164" y="2094892"/>
+            <a:ext cx="178536" cy="845744"/>
+          </a:xfrm>
+          <a:prstGeom prst="line">
+            <a:avLst/>
+          </a:prstGeom>
+          <a:ln w="28575">
+            <a:solidFill>
+              <a:schemeClr val="tx1"/>
+            </a:solidFill>
+          </a:ln>
+        </p:spPr>
+        <p:style>
+          <a:lnRef idx="1">
+            <a:schemeClr val="accent1"/>
+          </a:lnRef>
+          <a:fillRef idx="0">
+            <a:schemeClr val="accent1"/>
+          </a:fillRef>
+          <a:effectRef idx="0">
+            <a:schemeClr val="accent1"/>
+          </a:effectRef>
+          <a:fontRef idx="minor">
+            <a:schemeClr val="tx1"/>
+          </a:fontRef>
+        </p:style>
+      </p:cxnSp>
+      <p:cxnSp>
+        <p:nvCxnSpPr>
+          <p:cNvPr id="122" name="Straight Connector 121"/>
+          <p:cNvCxnSpPr/>
+          <p:nvPr/>
+        </p:nvCxnSpPr>
+        <p:spPr>
+          <a:xfrm flipH="1">
+            <a:off x="1679665" y="3501008"/>
+            <a:ext cx="963920" cy="0"/>
+          </a:xfrm>
+          <a:prstGeom prst="line">
+            <a:avLst/>
+          </a:prstGeom>
+          <a:ln w="28575">
+            <a:solidFill>
+              <a:schemeClr val="tx1"/>
+            </a:solidFill>
+          </a:ln>
+        </p:spPr>
+        <p:style>
+          <a:lnRef idx="1">
+            <a:schemeClr val="accent1"/>
+          </a:lnRef>
+          <a:fillRef idx="0">
+            <a:schemeClr val="accent1"/>
+          </a:fillRef>
+          <a:effectRef idx="0">
+            <a:schemeClr val="accent1"/>
+          </a:effectRef>
+          <a:fontRef idx="minor">
+            <a:schemeClr val="tx1"/>
+          </a:fontRef>
+        </p:style>
+      </p:cxnSp>
+      <p:cxnSp>
+        <p:nvCxnSpPr>
+          <p:cNvPr id="120" name="Straight Connector 119"/>
+          <p:cNvCxnSpPr/>
+          <p:nvPr/>
+        </p:nvCxnSpPr>
+        <p:spPr>
+          <a:xfrm flipH="1">
+            <a:off x="1957293" y="3649408"/>
+            <a:ext cx="696268" cy="1291760"/>
+          </a:xfrm>
+          <a:prstGeom prst="line">
+            <a:avLst/>
+          </a:prstGeom>
+          <a:ln w="28575">
+            <a:solidFill>
+              <a:schemeClr val="tx1"/>
+            </a:solidFill>
+          </a:ln>
+        </p:spPr>
+        <p:style>
+          <a:lnRef idx="1">
+            <a:schemeClr val="accent1"/>
+          </a:lnRef>
+          <a:fillRef idx="0">
+            <a:schemeClr val="accent1"/>
+          </a:fillRef>
+          <a:effectRef idx="0">
+            <a:schemeClr val="accent1"/>
+          </a:effectRef>
+          <a:fontRef idx="minor">
+            <a:schemeClr val="tx1"/>
+          </a:fontRef>
+        </p:style>
+      </p:cxnSp>
+      <p:cxnSp>
+        <p:nvCxnSpPr>
+          <p:cNvPr id="2052" name="Straight Connector 2051"/>
+          <p:cNvCxnSpPr/>
+          <p:nvPr/>
+        </p:nvCxnSpPr>
+        <p:spPr>
+          <a:xfrm flipH="1">
+            <a:off x="2267744" y="3852054"/>
+            <a:ext cx="531115" cy="2062077"/>
+          </a:xfrm>
+          <a:prstGeom prst="line">
+            <a:avLst/>
+          </a:prstGeom>
+          <a:ln w="28575">
+            <a:solidFill>
+              <a:schemeClr val="tx1"/>
+            </a:solidFill>
+          </a:ln>
+        </p:spPr>
+        <p:style>
+          <a:lnRef idx="1">
+            <a:schemeClr val="accent1"/>
+          </a:lnRef>
+          <a:fillRef idx="0">
+            <a:schemeClr val="accent1"/>
+          </a:fillRef>
+          <a:effectRef idx="0">
+            <a:schemeClr val="accent1"/>
+          </a:effectRef>
+          <a:fontRef idx="minor">
+            <a:schemeClr val="tx1"/>
+          </a:fontRef>
+        </p:style>
+      </p:cxnSp>
+      <p:sp>
+        <p:nvSpPr>
+          <p:cNvPr id="29" name="Rounded Rectangle 28"/>
+          <p:cNvSpPr/>
+          <p:nvPr/>
+        </p:nvSpPr>
+        <p:spPr>
+          <a:xfrm>
+            <a:off x="4243863" y="5787421"/>
+            <a:ext cx="3300300" cy="1041353"/>
+          </a:xfrm>
+          <a:prstGeom prst="roundRect">
+            <a:avLst>
+              <a:gd name="adj" fmla="val 3894"/>
+            </a:avLst>
+          </a:prstGeom>
+          <a:solidFill>
+            <a:schemeClr val="bg1"/>
+          </a:solidFill>
+        </p:spPr>
+        <p:style>
+          <a:lnRef idx="2">
+            <a:schemeClr val="accent1">
+              <a:shade val="50000"/>
+            </a:schemeClr>
+          </a:lnRef>
+          <a:fillRef idx="1">
+            <a:schemeClr val="accent1"/>
+          </a:fillRef>
+          <a:effectRef idx="0">
+            <a:schemeClr val="accent1"/>
+          </a:effectRef>
+          <a:fontRef idx="minor">
+            <a:schemeClr val="lt1"/>
+          </a:fontRef>
+        </p:style>
+        <p:txBody>
+          <a:bodyPr rtlCol="0" anchor="ctr"/>
+          <a:lstStyle/>
+          <a:p>
+            <a:pPr algn="ctr"/>
+            <a:endParaRPr lang="en-GB"/>
+          </a:p>
+        </p:txBody>
+      </p:sp>
+      <p:sp>
+        <p:nvSpPr>
+          <p:cNvPr id="4" name="Rectangle 3"/>
+          <p:cNvSpPr/>
+          <p:nvPr/>
+        </p:nvSpPr>
+        <p:spPr>
+          <a:xfrm>
+            <a:off x="42531" y="2116814"/>
+            <a:ext cx="1338470" cy="574670"/>
+          </a:xfrm>
+          <a:prstGeom prst="rect">
+            <a:avLst/>
+          </a:prstGeom>
+          <a:ln/>
+        </p:spPr>
+        <p:style>
+          <a:lnRef idx="0">
+            <a:schemeClr val="accent6"/>
+          </a:lnRef>
+          <a:fillRef idx="3">
+            <a:schemeClr val="accent6"/>
+          </a:fillRef>
+          <a:effectRef idx="3">
+            <a:schemeClr val="accent6"/>
+          </a:effectRef>
+          <a:fontRef idx="minor">
+            <a:schemeClr val="lt1"/>
+          </a:fontRef>
+        </p:style>
+        <p:txBody>
+          <a:bodyPr lIns="0" tIns="0" rIns="0" bIns="0" rtlCol="0" anchor="t"/>
+          <a:lstStyle/>
+          <a:p>
+            <a:pPr algn="ctr"/>
+            <a:r>
+              <a:rPr lang="en-US" sz="1400" b="1" smtClean="0">
+                <a:solidFill>
+                  <a:schemeClr val="tx1"/>
+                </a:solidFill>
+              </a:rPr>
+              <a:t>Effectivity</a:t>
+            </a:r>
+            <a:endParaRPr lang="en-US" sz="1400" b="1">
+              <a:solidFill>
+                <a:schemeClr val="tx1"/>
+              </a:solidFill>
+            </a:endParaRPr>
+          </a:p>
+        </p:txBody>
+      </p:sp>
+      <p:sp>
+        <p:nvSpPr>
+          <p:cNvPr id="5" name="Rectangle 4"/>
+          <p:cNvSpPr/>
+          <p:nvPr/>
+        </p:nvSpPr>
+        <p:spPr>
+          <a:xfrm>
+            <a:off x="1446160" y="39258"/>
+            <a:ext cx="2405760" cy="2377182"/>
+          </a:xfrm>
+          <a:prstGeom prst="rect">
+            <a:avLst/>
+          </a:prstGeom>
+          <a:ln/>
+        </p:spPr>
+        <p:style>
+          <a:lnRef idx="0">
+            <a:schemeClr val="accent6"/>
+          </a:lnRef>
+          <a:fillRef idx="3">
+            <a:schemeClr val="accent6"/>
+          </a:fillRef>
+          <a:effectRef idx="3">
+            <a:schemeClr val="accent6"/>
+          </a:effectRef>
+          <a:fontRef idx="minor">
+            <a:schemeClr val="lt1"/>
+          </a:fontRef>
+        </p:style>
+        <p:txBody>
+          <a:bodyPr lIns="0" tIns="0" rIns="0" bIns="0" rtlCol="0" anchor="t"/>
+          <a:lstStyle/>
+          <a:p>
+            <a:pPr algn="ctr"/>
+            <a:r>
+              <a:rPr lang="en-US" sz="1400" b="1" dirty="0" smtClean="0">
+                <a:solidFill>
+                  <a:schemeClr val="tx1"/>
+                </a:solidFill>
+              </a:rPr>
+              <a:t>Specification, Breakdown &amp; Configuration</a:t>
+            </a:r>
+            <a:endParaRPr lang="en-US" sz="1400" b="1" dirty="0">
+              <a:solidFill>
+                <a:schemeClr val="tx1"/>
+              </a:solidFill>
+            </a:endParaRPr>
+          </a:p>
+        </p:txBody>
+      </p:sp>
+      <p:sp>
+        <p:nvSpPr>
+          <p:cNvPr id="6" name="Rectangle 5"/>
+          <p:cNvSpPr/>
+          <p:nvPr/>
+        </p:nvSpPr>
+        <p:spPr>
+          <a:xfrm>
+            <a:off x="4070586" y="404664"/>
+            <a:ext cx="1509526" cy="576000"/>
+          </a:xfrm>
+          <a:prstGeom prst="rect">
+            <a:avLst/>
+          </a:prstGeom>
+          <a:ln/>
+        </p:spPr>
+        <p:style>
+          <a:lnRef idx="0">
+            <a:schemeClr val="accent6"/>
+          </a:lnRef>
+          <a:fillRef idx="3">
+            <a:schemeClr val="accent6"/>
+          </a:fillRef>
+          <a:effectRef idx="3">
+            <a:schemeClr val="accent6"/>
+          </a:effectRef>
+          <a:fontRef idx="minor">
+            <a:schemeClr val="lt1"/>
+          </a:fontRef>
+        </p:style>
+        <p:txBody>
+          <a:bodyPr lIns="0" tIns="0" rIns="0" bIns="0" rtlCol="0" anchor="t"/>
+          <a:lstStyle/>
+          <a:p>
+            <a:pPr algn="ctr"/>
+            <a:r>
+              <a:rPr lang="en-US" sz="1400" b="1" dirty="0" smtClean="0">
+                <a:solidFill>
+                  <a:schemeClr val="tx1"/>
+                </a:solidFill>
+              </a:rPr>
+              <a:t>Individual Part</a:t>
+            </a:r>
+            <a:endParaRPr lang="en-US" sz="1400" b="1" dirty="0">
+              <a:solidFill>
+                <a:schemeClr val="tx1"/>
+              </a:solidFill>
+            </a:endParaRPr>
+          </a:p>
+        </p:txBody>
+      </p:sp>
+      <p:sp>
+        <p:nvSpPr>
+          <p:cNvPr id="7" name="Rectangle 6"/>
+          <p:cNvSpPr/>
+          <p:nvPr/>
+        </p:nvSpPr>
+        <p:spPr>
+          <a:xfrm>
+            <a:off x="5745230" y="39258"/>
+            <a:ext cx="3355530" cy="1949582"/>
+          </a:xfrm>
+          <a:prstGeom prst="rect">
+            <a:avLst/>
+          </a:prstGeom>
+          <a:ln/>
+        </p:spPr>
+        <p:style>
+          <a:lnRef idx="0">
+            <a:schemeClr val="accent6"/>
+          </a:lnRef>
+          <a:fillRef idx="3">
+            <a:schemeClr val="accent6"/>
+          </a:fillRef>
+          <a:effectRef idx="3">
+            <a:schemeClr val="accent6"/>
+          </a:effectRef>
+          <a:fontRef idx="minor">
+            <a:schemeClr val="lt1"/>
+          </a:fontRef>
+        </p:style>
+        <p:txBody>
+          <a:bodyPr lIns="0" tIns="0" rIns="0" bIns="0" rtlCol="0" anchor="t"/>
+          <a:lstStyle/>
+          <a:p>
+            <a:pPr algn="ctr"/>
+            <a:r>
+              <a:rPr lang="en-US" sz="1400" b="1" smtClean="0">
+                <a:solidFill>
+                  <a:schemeClr val="tx1"/>
+                </a:solidFill>
+              </a:rPr>
+              <a:t>General Mgmt. Information</a:t>
+            </a:r>
+            <a:endParaRPr lang="en-US" sz="1400" b="1">
+              <a:solidFill>
+                <a:schemeClr val="tx1"/>
+              </a:solidFill>
+            </a:endParaRPr>
+          </a:p>
+        </p:txBody>
+      </p:sp>
+      <p:sp>
+        <p:nvSpPr>
+          <p:cNvPr id="8" name="Rectangle 7"/>
+          <p:cNvSpPr/>
+          <p:nvPr/>
+        </p:nvSpPr>
+        <p:spPr>
+          <a:xfrm>
+            <a:off x="42530" y="2844234"/>
+            <a:ext cx="1867842" cy="1325948"/>
+          </a:xfrm>
+          <a:prstGeom prst="rect">
+            <a:avLst/>
+          </a:prstGeom>
+          <a:ln/>
+        </p:spPr>
+        <p:style>
+          <a:lnRef idx="0">
+            <a:schemeClr val="accent6"/>
+          </a:lnRef>
+          <a:fillRef idx="3">
+            <a:schemeClr val="accent6"/>
+          </a:fillRef>
+          <a:effectRef idx="3">
+            <a:schemeClr val="accent6"/>
+          </a:effectRef>
+          <a:fontRef idx="minor">
+            <a:schemeClr val="lt1"/>
+          </a:fontRef>
+        </p:style>
+        <p:txBody>
+          <a:bodyPr lIns="0" tIns="0" rIns="0" bIns="0" rtlCol="0" anchor="t"/>
+          <a:lstStyle/>
+          <a:p>
+            <a:pPr algn="ctr"/>
+            <a:r>
+              <a:rPr lang="en-US" sz="1400" b="1" dirty="0" smtClean="0">
+                <a:solidFill>
+                  <a:schemeClr val="tx1"/>
+                </a:solidFill>
+              </a:rPr>
+              <a:t>Characteristic</a:t>
+            </a:r>
+            <a:endParaRPr lang="en-US" sz="1400" b="1" dirty="0">
+              <a:solidFill>
+                <a:schemeClr val="tx1"/>
+              </a:solidFill>
+            </a:endParaRPr>
+          </a:p>
+        </p:txBody>
+      </p:sp>
+      <p:sp>
+        <p:nvSpPr>
+          <p:cNvPr id="9" name="Rectangle 8"/>
+          <p:cNvSpPr/>
+          <p:nvPr/>
+        </p:nvSpPr>
+        <p:spPr>
+          <a:xfrm>
+            <a:off x="2434108" y="2761045"/>
+            <a:ext cx="1777852" cy="1129807"/>
+          </a:xfrm>
+          <a:prstGeom prst="rect">
+            <a:avLst/>
+          </a:prstGeom>
+          <a:ln/>
+        </p:spPr>
+        <p:style>
+          <a:lnRef idx="0">
+            <a:schemeClr val="accent6"/>
+          </a:lnRef>
+          <a:fillRef idx="3">
+            <a:schemeClr val="accent6"/>
+          </a:fillRef>
+          <a:effectRef idx="3">
+            <a:schemeClr val="accent6"/>
+          </a:effectRef>
+          <a:fontRef idx="minor">
+            <a:schemeClr val="lt1"/>
+          </a:fontRef>
+        </p:style>
+        <p:txBody>
+          <a:bodyPr lIns="0" tIns="0" rIns="0" bIns="0" rtlCol="0" anchor="t"/>
+          <a:lstStyle/>
+          <a:p>
+            <a:pPr algn="ctr"/>
+            <a:r>
+              <a:rPr lang="en-US" sz="1400" b="1" dirty="0" smtClean="0">
+                <a:solidFill>
+                  <a:schemeClr val="tx1"/>
+                </a:solidFill>
+              </a:rPr>
+              <a:t>Part Identification</a:t>
+            </a:r>
+            <a:endParaRPr lang="en-US" sz="1400" b="1" dirty="0">
+              <a:solidFill>
+                <a:schemeClr val="tx1"/>
+              </a:solidFill>
+            </a:endParaRPr>
+          </a:p>
+        </p:txBody>
+      </p:sp>
+      <p:sp>
+        <p:nvSpPr>
+          <p:cNvPr id="10" name="Rectangle 9"/>
+          <p:cNvSpPr/>
+          <p:nvPr/>
+        </p:nvSpPr>
+        <p:spPr>
+          <a:xfrm>
+            <a:off x="4871667" y="2076890"/>
+            <a:ext cx="1820468" cy="1123992"/>
+          </a:xfrm>
+          <a:prstGeom prst="rect">
+            <a:avLst/>
+          </a:prstGeom>
+          <a:ln/>
+        </p:spPr>
+        <p:style>
+          <a:lnRef idx="0">
+            <a:schemeClr val="accent6"/>
+          </a:lnRef>
+          <a:fillRef idx="3">
+            <a:schemeClr val="accent6"/>
+          </a:fillRef>
+          <a:effectRef idx="3">
+            <a:schemeClr val="accent6"/>
+          </a:effectRef>
+          <a:fontRef idx="minor">
+            <a:schemeClr val="lt1"/>
+          </a:fontRef>
+        </p:style>
+        <p:txBody>
+          <a:bodyPr lIns="0" tIns="0" rIns="0" bIns="0" rtlCol="0" anchor="t"/>
+          <a:lstStyle/>
+          <a:p>
+            <a:pPr algn="ctr"/>
+            <a:r>
+              <a:rPr lang="en-US" sz="1400" b="1" dirty="0" smtClean="0">
+                <a:solidFill>
+                  <a:schemeClr val="tx1"/>
+                </a:solidFill>
+              </a:rPr>
+              <a:t>Activity &amp; Work Mgmt.</a:t>
+            </a:r>
+            <a:endParaRPr lang="en-US" sz="1400" b="1" dirty="0">
+              <a:solidFill>
+                <a:schemeClr val="tx1"/>
+              </a:solidFill>
+            </a:endParaRPr>
+          </a:p>
+        </p:txBody>
+      </p:sp>
+      <p:sp>
+        <p:nvSpPr>
+          <p:cNvPr id="11" name="Rectangle 10"/>
+          <p:cNvSpPr/>
+          <p:nvPr/>
+        </p:nvSpPr>
+        <p:spPr>
+          <a:xfrm>
+            <a:off x="6867414" y="2636912"/>
+            <a:ext cx="2241090" cy="1006264"/>
+          </a:xfrm>
+          <a:prstGeom prst="rect">
+            <a:avLst/>
+          </a:prstGeom>
+          <a:ln/>
+        </p:spPr>
+        <p:style>
+          <a:lnRef idx="0">
+            <a:schemeClr val="accent6"/>
+          </a:lnRef>
+          <a:fillRef idx="3">
+            <a:schemeClr val="accent6"/>
+          </a:fillRef>
+          <a:effectRef idx="3">
+            <a:schemeClr val="accent6"/>
+          </a:effectRef>
+          <a:fontRef idx="minor">
+            <a:schemeClr val="lt1"/>
+          </a:fontRef>
+        </p:style>
+        <p:txBody>
+          <a:bodyPr lIns="0" tIns="0" rIns="0" bIns="0" rtlCol="0" anchor="t"/>
+          <a:lstStyle/>
+          <a:p>
+            <a:pPr algn="ctr"/>
+            <a:r>
+              <a:rPr lang="en-US" sz="1400" b="1" dirty="0" smtClean="0">
+                <a:solidFill>
+                  <a:schemeClr val="tx1"/>
+                </a:solidFill>
+              </a:rPr>
+              <a:t>Composites</a:t>
+            </a:r>
+            <a:endParaRPr lang="en-US" sz="1400" b="1" dirty="0">
+              <a:solidFill>
+                <a:schemeClr val="tx1"/>
+              </a:solidFill>
+            </a:endParaRPr>
+          </a:p>
+        </p:txBody>
+      </p:sp>
+      <p:sp>
+        <p:nvSpPr>
+          <p:cNvPr id="12" name="Rectangle 11"/>
+          <p:cNvSpPr/>
+          <p:nvPr/>
+        </p:nvSpPr>
+        <p:spPr>
+          <a:xfrm>
+            <a:off x="35496" y="4287793"/>
+            <a:ext cx="2099337" cy="1068877"/>
+          </a:xfrm>
+          <a:prstGeom prst="rect">
+            <a:avLst/>
+          </a:prstGeom>
+          <a:ln/>
+        </p:spPr>
+        <p:style>
+          <a:lnRef idx="0">
+            <a:schemeClr val="accent6"/>
+          </a:lnRef>
+          <a:fillRef idx="3">
+            <a:schemeClr val="accent6"/>
+          </a:fillRef>
+          <a:effectRef idx="3">
+            <a:schemeClr val="accent6"/>
+          </a:effectRef>
+          <a:fontRef idx="minor">
+            <a:schemeClr val="lt1"/>
+          </a:fontRef>
+        </p:style>
+        <p:txBody>
+          <a:bodyPr lIns="0" tIns="0" rIns="0" bIns="0" rtlCol="0" anchor="t"/>
+          <a:lstStyle/>
+          <a:p>
+            <a:pPr algn="ctr"/>
+            <a:r>
+              <a:rPr lang="en-US" sz="1400" b="1" dirty="0" smtClean="0">
+                <a:solidFill>
+                  <a:schemeClr val="tx1"/>
+                </a:solidFill>
+              </a:rPr>
+              <a:t>Document Management</a:t>
+            </a:r>
+            <a:endParaRPr lang="en-US" sz="1400" b="1" dirty="0">
+              <a:solidFill>
+                <a:schemeClr val="tx1"/>
+              </a:solidFill>
+            </a:endParaRPr>
+          </a:p>
+        </p:txBody>
+      </p:sp>
+      <p:sp>
+        <p:nvSpPr>
+          <p:cNvPr id="13" name="Rectangle 12"/>
+          <p:cNvSpPr/>
+          <p:nvPr/>
+        </p:nvSpPr>
+        <p:spPr>
+          <a:xfrm>
+            <a:off x="2573096" y="5803937"/>
+            <a:ext cx="1550814" cy="844321"/>
+          </a:xfrm>
+          <a:prstGeom prst="rect">
+            <a:avLst/>
+          </a:prstGeom>
+          <a:ln/>
+        </p:spPr>
+        <p:style>
+          <a:lnRef idx="0">
+            <a:schemeClr val="accent6"/>
+          </a:lnRef>
+          <a:fillRef idx="3">
+            <a:schemeClr val="accent6"/>
+          </a:fillRef>
+          <a:effectRef idx="3">
+            <a:schemeClr val="accent6"/>
+          </a:effectRef>
+          <a:fontRef idx="minor">
+            <a:schemeClr val="lt1"/>
+          </a:fontRef>
+        </p:style>
+        <p:txBody>
+          <a:bodyPr lIns="0" tIns="0" rIns="0" bIns="0" rtlCol="0" anchor="t"/>
+          <a:lstStyle/>
+          <a:p>
+            <a:pPr algn="ctr"/>
+            <a:r>
+              <a:rPr lang="en-US" sz="1400" b="1" dirty="0" smtClean="0">
+                <a:solidFill>
+                  <a:schemeClr val="tx1"/>
+                </a:solidFill>
+              </a:rPr>
+              <a:t>Process Plan</a:t>
+            </a:r>
+            <a:endParaRPr lang="en-US" sz="1400" b="1" dirty="0">
+              <a:solidFill>
+                <a:schemeClr val="tx1"/>
+              </a:solidFill>
+            </a:endParaRPr>
+          </a:p>
+        </p:txBody>
+      </p:sp>
+      <p:sp>
+        <p:nvSpPr>
+          <p:cNvPr id="14" name="Rectangle 13"/>
+          <p:cNvSpPr/>
+          <p:nvPr/>
+        </p:nvSpPr>
+        <p:spPr>
+          <a:xfrm>
+            <a:off x="6857839" y="4754203"/>
+            <a:ext cx="2232000" cy="886637"/>
+          </a:xfrm>
+          <a:prstGeom prst="rect">
+            <a:avLst/>
+          </a:prstGeom>
+          <a:ln/>
+        </p:spPr>
+        <p:style>
+          <a:lnRef idx="0">
+            <a:schemeClr val="accent6"/>
+          </a:lnRef>
+          <a:fillRef idx="3">
+            <a:schemeClr val="accent6"/>
+          </a:fillRef>
+          <a:effectRef idx="3">
+            <a:schemeClr val="accent6"/>
+          </a:effectRef>
+          <a:fontRef idx="minor">
+            <a:schemeClr val="lt1"/>
+          </a:fontRef>
+        </p:style>
+        <p:txBody>
+          <a:bodyPr lIns="0" tIns="0" rIns="0" bIns="0" rtlCol="0" anchor="t"/>
+          <a:lstStyle/>
+          <a:p>
+            <a:pPr algn="ctr"/>
+            <a:r>
+              <a:rPr lang="en-US" sz="1400" b="1" dirty="0" smtClean="0">
+                <a:solidFill>
+                  <a:schemeClr val="tx1"/>
+                </a:solidFill>
+              </a:rPr>
+              <a:t>Kinematics</a:t>
+            </a:r>
+            <a:endParaRPr lang="en-US" sz="1400" b="1" dirty="0">
+              <a:solidFill>
+                <a:schemeClr val="tx1"/>
+              </a:solidFill>
+            </a:endParaRPr>
+          </a:p>
+        </p:txBody>
+      </p:sp>
+      <p:sp>
+        <p:nvSpPr>
+          <p:cNvPr id="15" name="Rectangle 14"/>
+          <p:cNvSpPr/>
+          <p:nvPr/>
+        </p:nvSpPr>
+        <p:spPr>
+          <a:xfrm>
+            <a:off x="7067702" y="3715184"/>
+            <a:ext cx="2033768" cy="886637"/>
+          </a:xfrm>
+          <a:prstGeom prst="rect">
+            <a:avLst/>
+          </a:prstGeom>
+          <a:ln/>
+        </p:spPr>
+        <p:style>
+          <a:lnRef idx="0">
+            <a:schemeClr val="accent6"/>
+          </a:lnRef>
+          <a:fillRef idx="3">
+            <a:schemeClr val="accent6"/>
+          </a:fillRef>
+          <a:effectRef idx="3">
+            <a:schemeClr val="accent6"/>
+          </a:effectRef>
+          <a:fontRef idx="minor">
+            <a:schemeClr val="lt1"/>
+          </a:fontRef>
+        </p:style>
+        <p:txBody>
+          <a:bodyPr lIns="0" tIns="0" rIns="0" bIns="0" rtlCol="0" anchor="t"/>
+          <a:lstStyle/>
+          <a:p>
+            <a:pPr algn="ctr"/>
+            <a:r>
+              <a:rPr lang="en-US" sz="1400" b="1" dirty="0" smtClean="0">
+                <a:solidFill>
+                  <a:schemeClr val="tx1"/>
+                </a:solidFill>
+              </a:rPr>
+              <a:t>Shape Data </a:t>
+            </a:r>
+            <a:r>
+              <a:rPr lang="en-US" sz="1400" b="1" dirty="0">
+                <a:solidFill>
+                  <a:schemeClr val="tx1"/>
+                </a:solidFill>
+              </a:rPr>
+              <a:t>Q</a:t>
+            </a:r>
+            <a:r>
+              <a:rPr lang="en-US" sz="1400" b="1" dirty="0" smtClean="0">
+                <a:solidFill>
+                  <a:schemeClr val="tx1"/>
+                </a:solidFill>
+              </a:rPr>
+              <a:t>uality</a:t>
+            </a:r>
+            <a:endParaRPr lang="en-US" sz="1400" b="1" dirty="0">
+              <a:solidFill>
+                <a:schemeClr val="tx1"/>
+              </a:solidFill>
+            </a:endParaRPr>
+          </a:p>
+        </p:txBody>
+      </p:sp>
+      <p:sp>
+        <p:nvSpPr>
+          <p:cNvPr id="16" name="Rectangle 15"/>
+          <p:cNvSpPr/>
+          <p:nvPr/>
+        </p:nvSpPr>
+        <p:spPr>
+          <a:xfrm>
+            <a:off x="467544" y="5483348"/>
+            <a:ext cx="1960017" cy="1041996"/>
+          </a:xfrm>
+          <a:prstGeom prst="rect">
+            <a:avLst/>
+          </a:prstGeom>
+          <a:ln/>
+        </p:spPr>
+        <p:style>
+          <a:lnRef idx="0">
+            <a:schemeClr val="accent6"/>
+          </a:lnRef>
+          <a:fillRef idx="3">
+            <a:schemeClr val="accent6"/>
+          </a:fillRef>
+          <a:effectRef idx="3">
+            <a:schemeClr val="accent6"/>
+          </a:effectRef>
+          <a:fontRef idx="minor">
+            <a:schemeClr val="lt1"/>
+          </a:fontRef>
+        </p:style>
+        <p:txBody>
+          <a:bodyPr lIns="0" tIns="0" rIns="0" bIns="0" rtlCol="0" anchor="t"/>
+          <a:lstStyle/>
+          <a:p>
+            <a:pPr algn="ctr"/>
+            <a:r>
+              <a:rPr lang="en-US" sz="1400" b="1" dirty="0" smtClean="0">
+                <a:solidFill>
+                  <a:schemeClr val="tx1"/>
+                </a:solidFill>
+              </a:rPr>
+              <a:t>Rules and Requirements</a:t>
+            </a:r>
+            <a:endParaRPr lang="en-US" sz="1400" b="1" dirty="0">
+              <a:solidFill>
+                <a:schemeClr val="tx1"/>
+              </a:solidFill>
+            </a:endParaRPr>
+          </a:p>
+        </p:txBody>
+      </p:sp>
+      <p:sp>
+        <p:nvSpPr>
+          <p:cNvPr id="18" name="Rectangle 17"/>
+          <p:cNvSpPr/>
+          <p:nvPr/>
+        </p:nvSpPr>
+        <p:spPr>
+          <a:xfrm>
+            <a:off x="4320806" y="6485164"/>
+            <a:ext cx="1932009" cy="252000"/>
+          </a:xfrm>
+          <a:prstGeom prst="rect">
+            <a:avLst/>
+          </a:prstGeom>
+          <a:ln/>
+        </p:spPr>
+        <p:style>
+          <a:lnRef idx="0">
+            <a:schemeClr val="accent5"/>
+          </a:lnRef>
+          <a:fillRef idx="3">
+            <a:schemeClr val="accent5"/>
+          </a:fillRef>
+          <a:effectRef idx="3">
+            <a:schemeClr val="accent5"/>
+          </a:effectRef>
+          <a:fontRef idx="minor">
+            <a:schemeClr val="lt1"/>
+          </a:fontRef>
+        </p:style>
+        <p:txBody>
+          <a:bodyPr lIns="0" tIns="0" rIns="0" bIns="0" rtlCol="0" anchor="ctr"/>
+          <a:lstStyle/>
+          <a:p>
+            <a:pPr algn="ctr"/>
+            <a:r>
+              <a:rPr lang="en-US" sz="1400" b="1" dirty="0" smtClean="0">
+                <a:solidFill>
+                  <a:schemeClr val="tx1"/>
+                </a:solidFill>
+              </a:rPr>
+              <a:t>Machining Features</a:t>
+            </a:r>
+            <a:endParaRPr lang="en-US" sz="1400" b="1" dirty="0">
+              <a:solidFill>
+                <a:schemeClr val="tx1"/>
+              </a:solidFill>
+            </a:endParaRPr>
+          </a:p>
+        </p:txBody>
+      </p:sp>
+      <p:sp>
+        <p:nvSpPr>
+          <p:cNvPr id="19" name="Rectangle 18"/>
+          <p:cNvSpPr/>
+          <p:nvPr/>
+        </p:nvSpPr>
+        <p:spPr>
+          <a:xfrm>
+            <a:off x="4788024" y="5865093"/>
+            <a:ext cx="2297222" cy="554770"/>
+          </a:xfrm>
+          <a:prstGeom prst="rect">
+            <a:avLst/>
+          </a:prstGeom>
+          <a:ln/>
+        </p:spPr>
+        <p:style>
+          <a:lnRef idx="0">
+            <a:schemeClr val="accent5"/>
+          </a:lnRef>
+          <a:fillRef idx="3">
+            <a:schemeClr val="accent5"/>
+          </a:fillRef>
+          <a:effectRef idx="3">
+            <a:schemeClr val="accent5"/>
+          </a:effectRef>
+          <a:fontRef idx="minor">
+            <a:schemeClr val="lt1"/>
+          </a:fontRef>
+        </p:style>
+        <p:txBody>
+          <a:bodyPr lIns="0" tIns="0" rIns="0" bIns="0" rtlCol="0" anchor="ctr"/>
+          <a:lstStyle/>
+          <a:p>
+            <a:pPr algn="ctr"/>
+            <a:r>
+              <a:rPr lang="en-US" sz="1400" b="1" dirty="0" smtClean="0">
+                <a:solidFill>
+                  <a:schemeClr val="tx1"/>
+                </a:solidFill>
+              </a:rPr>
+              <a:t>3D Parametrics &amp;</a:t>
+            </a:r>
+          </a:p>
+          <a:p>
+            <a:pPr algn="ctr"/>
+            <a:r>
+              <a:rPr lang="en-US" sz="1400" b="1" dirty="0" smtClean="0">
+                <a:solidFill>
+                  <a:schemeClr val="tx1"/>
+                </a:solidFill>
+              </a:rPr>
+              <a:t>Geometric Constraints Design</a:t>
+            </a:r>
+          </a:p>
+        </p:txBody>
+      </p:sp>
+      <p:sp>
+        <p:nvSpPr>
+          <p:cNvPr id="24" name="Rectangle 23"/>
+          <p:cNvSpPr/>
+          <p:nvPr/>
+        </p:nvSpPr>
+        <p:spPr>
+          <a:xfrm>
+            <a:off x="6358035" y="6485164"/>
+            <a:ext cx="1094285" cy="252000"/>
+          </a:xfrm>
+          <a:prstGeom prst="rect">
+            <a:avLst/>
+          </a:prstGeom>
+          <a:ln/>
+        </p:spPr>
+        <p:style>
+          <a:lnRef idx="0">
+            <a:schemeClr val="accent5"/>
+          </a:lnRef>
+          <a:fillRef idx="3">
+            <a:schemeClr val="accent5"/>
+          </a:fillRef>
+          <a:effectRef idx="3">
+            <a:schemeClr val="accent5"/>
+          </a:effectRef>
+          <a:fontRef idx="minor">
+            <a:schemeClr val="lt1"/>
+          </a:fontRef>
+        </p:style>
+        <p:txBody>
+          <a:bodyPr lIns="0" tIns="0" rIns="0" bIns="0" rtlCol="0" anchor="ctr"/>
+          <a:lstStyle/>
+          <a:p>
+            <a:pPr algn="ctr"/>
+            <a:r>
+              <a:rPr lang="en-US" sz="1400" b="1" dirty="0" smtClean="0">
+                <a:solidFill>
+                  <a:schemeClr val="tx1"/>
+                </a:solidFill>
+              </a:rPr>
+              <a:t>GD&amp;T</a:t>
+            </a:r>
+            <a:endParaRPr lang="en-US" sz="1400" b="1" dirty="0">
+              <a:solidFill>
+                <a:schemeClr val="tx1"/>
+              </a:solidFill>
+            </a:endParaRPr>
+          </a:p>
+        </p:txBody>
+      </p:sp>
+      <p:sp>
+        <p:nvSpPr>
+          <p:cNvPr id="28" name="Rectangle 27"/>
+          <p:cNvSpPr/>
+          <p:nvPr/>
+        </p:nvSpPr>
+        <p:spPr>
+          <a:xfrm>
+            <a:off x="143370" y="2384062"/>
+            <a:ext cx="1136790" cy="216024"/>
+          </a:xfrm>
+          <a:prstGeom prst="rect">
+            <a:avLst/>
+          </a:prstGeom>
+          <a:ln w="12700"/>
+        </p:spPr>
+        <p:style>
+          <a:lnRef idx="2">
+            <a:schemeClr val="dk1"/>
+          </a:lnRef>
+          <a:fillRef idx="1">
+            <a:schemeClr val="lt1"/>
+          </a:fillRef>
+          <a:effectRef idx="0">
+            <a:schemeClr val="dk1"/>
+          </a:effectRef>
+          <a:fontRef idx="minor">
+            <a:schemeClr val="dk1"/>
+          </a:fontRef>
+        </p:style>
+        <p:txBody>
+          <a:bodyPr rtlCol="0" anchor="ctr"/>
+          <a:lstStyle/>
+          <a:p>
+            <a:r>
+              <a:rPr lang="fr-FR" sz="1200" dirty="0" smtClean="0"/>
+              <a:t>Effectivity</a:t>
+            </a:r>
+            <a:endParaRPr lang="en-GB" sz="1200" dirty="0"/>
+          </a:p>
+        </p:txBody>
+      </p:sp>
+      <p:sp>
+        <p:nvSpPr>
+          <p:cNvPr id="30" name="Rectangle 29"/>
+          <p:cNvSpPr/>
+          <p:nvPr/>
+        </p:nvSpPr>
+        <p:spPr>
+          <a:xfrm>
+            <a:off x="4126615" y="681964"/>
+            <a:ext cx="1397468" cy="216024"/>
+          </a:xfrm>
+          <a:prstGeom prst="rect">
+            <a:avLst/>
+          </a:prstGeom>
+          <a:ln w="12700"/>
+        </p:spPr>
+        <p:style>
+          <a:lnRef idx="2">
+            <a:schemeClr val="dk1"/>
+          </a:lnRef>
+          <a:fillRef idx="1">
+            <a:schemeClr val="lt1"/>
+          </a:fillRef>
+          <a:effectRef idx="0">
+            <a:schemeClr val="dk1"/>
+          </a:effectRef>
+          <a:fontRef idx="minor">
+            <a:schemeClr val="dk1"/>
+          </a:fontRef>
+        </p:style>
+        <p:txBody>
+          <a:bodyPr rtlCol="0" anchor="ctr"/>
+          <a:lstStyle/>
+          <a:p>
+            <a:r>
+              <a:rPr lang="fr-FR" sz="1200" dirty="0" smtClean="0"/>
+              <a:t>Individual Part</a:t>
+            </a:r>
+            <a:endParaRPr lang="en-GB" sz="1200" dirty="0"/>
+          </a:p>
+        </p:txBody>
+      </p:sp>
+      <p:sp>
+        <p:nvSpPr>
+          <p:cNvPr id="32" name="Rectangle 31"/>
+          <p:cNvSpPr/>
+          <p:nvPr/>
+        </p:nvSpPr>
+        <p:spPr>
+          <a:xfrm>
+            <a:off x="627360" y="5768234"/>
+            <a:ext cx="1640384" cy="216024"/>
+          </a:xfrm>
+          <a:prstGeom prst="rect">
+            <a:avLst/>
+          </a:prstGeom>
+          <a:ln w="12700"/>
+        </p:spPr>
+        <p:style>
+          <a:lnRef idx="2">
+            <a:schemeClr val="dk1"/>
+          </a:lnRef>
+          <a:fillRef idx="1">
+            <a:schemeClr val="lt1"/>
+          </a:fillRef>
+          <a:effectRef idx="0">
+            <a:schemeClr val="dk1"/>
+          </a:effectRef>
+          <a:fontRef idx="minor">
+            <a:schemeClr val="dk1"/>
+          </a:fontRef>
+        </p:style>
+        <p:txBody>
+          <a:bodyPr rtlCol="0" anchor="ctr"/>
+          <a:lstStyle/>
+          <a:p>
+            <a:r>
+              <a:rPr lang="fr-FR" sz="1200" dirty="0" smtClean="0"/>
+              <a:t>Requirements</a:t>
+            </a:r>
+            <a:endParaRPr lang="en-GB" sz="1200" dirty="0"/>
+          </a:p>
+        </p:txBody>
+      </p:sp>
+      <p:sp>
+        <p:nvSpPr>
+          <p:cNvPr id="35" name="Rectangle 34"/>
+          <p:cNvSpPr/>
+          <p:nvPr/>
+        </p:nvSpPr>
+        <p:spPr>
+          <a:xfrm>
+            <a:off x="627360" y="6063020"/>
+            <a:ext cx="1640384" cy="361154"/>
+          </a:xfrm>
+          <a:prstGeom prst="rect">
+            <a:avLst/>
+          </a:prstGeom>
+          <a:ln w="12700"/>
+        </p:spPr>
+        <p:style>
+          <a:lnRef idx="2">
+            <a:schemeClr val="dk1"/>
+          </a:lnRef>
+          <a:fillRef idx="1">
+            <a:schemeClr val="lt1"/>
+          </a:fillRef>
+          <a:effectRef idx="0">
+            <a:schemeClr val="dk1"/>
+          </a:effectRef>
+          <a:fontRef idx="minor">
+            <a:schemeClr val="dk1"/>
+          </a:fontRef>
+        </p:style>
+        <p:txBody>
+          <a:bodyPr rtlCol="0" anchor="ctr"/>
+          <a:lstStyle/>
+          <a:p>
+            <a:r>
+              <a:rPr lang="fr-FR" sz="1200" dirty="0" smtClean="0"/>
+              <a:t>Planned &amp; Eval.</a:t>
+            </a:r>
+          </a:p>
+          <a:p>
+            <a:r>
+              <a:rPr lang="fr-FR" sz="1200" dirty="0" smtClean="0"/>
+              <a:t>Characteristics</a:t>
+            </a:r>
+            <a:endParaRPr lang="en-GB" sz="1200" dirty="0"/>
+          </a:p>
+        </p:txBody>
+      </p:sp>
+      <p:sp>
+        <p:nvSpPr>
+          <p:cNvPr id="38" name="Rectangle 37"/>
+          <p:cNvSpPr/>
+          <p:nvPr/>
+        </p:nvSpPr>
+        <p:spPr>
+          <a:xfrm>
+            <a:off x="6970563" y="2898905"/>
+            <a:ext cx="2034792" cy="659637"/>
+          </a:xfrm>
+          <a:prstGeom prst="rect">
+            <a:avLst/>
+          </a:prstGeom>
+          <a:ln w="12700"/>
+        </p:spPr>
+        <p:style>
+          <a:lnRef idx="2">
+            <a:schemeClr val="dk1"/>
+          </a:lnRef>
+          <a:fillRef idx="1">
+            <a:schemeClr val="lt1"/>
+          </a:fillRef>
+          <a:effectRef idx="0">
+            <a:schemeClr val="dk1"/>
+          </a:effectRef>
+          <a:fontRef idx="minor">
+            <a:schemeClr val="dk1"/>
+          </a:fontRef>
+        </p:style>
+        <p:txBody>
+          <a:bodyPr rtlCol="0" anchor="ctr"/>
+          <a:lstStyle/>
+          <a:p>
+            <a:r>
+              <a:rPr lang="fr-FR" sz="1200" dirty="0" smtClean="0"/>
+              <a:t>Composite Structural</a:t>
+            </a:r>
+          </a:p>
+          <a:p>
+            <a:r>
+              <a:rPr lang="fr-FR" sz="1200" dirty="0" smtClean="0"/>
+              <a:t>Shape &amp; Structure</a:t>
+            </a:r>
+            <a:endParaRPr lang="en-GB" sz="1200" dirty="0"/>
+          </a:p>
+        </p:txBody>
+      </p:sp>
+      <p:sp>
+        <p:nvSpPr>
+          <p:cNvPr id="45" name="Rectangle 44"/>
+          <p:cNvSpPr/>
+          <p:nvPr/>
+        </p:nvSpPr>
+        <p:spPr>
+          <a:xfrm>
+            <a:off x="148451" y="3149065"/>
+            <a:ext cx="1656000" cy="216024"/>
+          </a:xfrm>
+          <a:prstGeom prst="rect">
+            <a:avLst/>
+          </a:prstGeom>
+          <a:ln w="12700"/>
+        </p:spPr>
+        <p:style>
+          <a:lnRef idx="2">
+            <a:schemeClr val="dk1"/>
+          </a:lnRef>
+          <a:fillRef idx="1">
+            <a:schemeClr val="lt1"/>
+          </a:fillRef>
+          <a:effectRef idx="0">
+            <a:schemeClr val="dk1"/>
+          </a:effectRef>
+          <a:fontRef idx="minor">
+            <a:schemeClr val="dk1"/>
+          </a:fontRef>
+        </p:style>
+        <p:txBody>
+          <a:bodyPr rtlCol="0" anchor="ctr"/>
+          <a:lstStyle/>
+          <a:p>
+            <a:r>
+              <a:rPr lang="fr-FR" sz="1200" dirty="0" smtClean="0"/>
+              <a:t>Property</a:t>
+            </a:r>
+            <a:endParaRPr lang="en-GB" sz="1200" dirty="0"/>
+          </a:p>
+        </p:txBody>
+      </p:sp>
+      <p:sp>
+        <p:nvSpPr>
+          <p:cNvPr id="50" name="Rectangle 49"/>
+          <p:cNvSpPr/>
+          <p:nvPr/>
+        </p:nvSpPr>
+        <p:spPr>
+          <a:xfrm>
+            <a:off x="148451" y="3423029"/>
+            <a:ext cx="1656000" cy="216024"/>
+          </a:xfrm>
+          <a:prstGeom prst="rect">
+            <a:avLst/>
+          </a:prstGeom>
+          <a:ln w="12700"/>
+        </p:spPr>
+        <p:style>
+          <a:lnRef idx="2">
+            <a:schemeClr val="dk1"/>
+          </a:lnRef>
+          <a:fillRef idx="1">
+            <a:schemeClr val="lt1"/>
+          </a:fillRef>
+          <a:effectRef idx="0">
+            <a:schemeClr val="dk1"/>
+          </a:effectRef>
+          <a:fontRef idx="minor">
+            <a:schemeClr val="dk1"/>
+          </a:fontRef>
+        </p:style>
+        <p:txBody>
+          <a:bodyPr rtlCol="0" anchor="ctr"/>
+          <a:lstStyle/>
+          <a:p>
+            <a:r>
+              <a:rPr lang="fr-FR" sz="1200" dirty="0" smtClean="0"/>
+              <a:t>Material</a:t>
+            </a:r>
+            <a:endParaRPr lang="en-GB" sz="1200" dirty="0"/>
+          </a:p>
+        </p:txBody>
+      </p:sp>
+      <p:sp>
+        <p:nvSpPr>
+          <p:cNvPr id="55" name="Rectangle 54"/>
+          <p:cNvSpPr/>
+          <p:nvPr/>
+        </p:nvSpPr>
+        <p:spPr>
+          <a:xfrm>
+            <a:off x="148451" y="3690579"/>
+            <a:ext cx="1656000" cy="421261"/>
+          </a:xfrm>
+          <a:prstGeom prst="rect">
+            <a:avLst/>
+          </a:prstGeom>
+          <a:ln w="12700"/>
+        </p:spPr>
+        <p:style>
+          <a:lnRef idx="2">
+            <a:schemeClr val="dk1"/>
+          </a:lnRef>
+          <a:fillRef idx="1">
+            <a:schemeClr val="lt1"/>
+          </a:fillRef>
+          <a:effectRef idx="0">
+            <a:schemeClr val="dk1"/>
+          </a:effectRef>
+          <a:fontRef idx="minor">
+            <a:schemeClr val="dk1"/>
+          </a:fontRef>
+        </p:style>
+        <p:txBody>
+          <a:bodyPr rtlCol="0" anchor="ctr"/>
+          <a:lstStyle/>
+          <a:p>
+            <a:r>
+              <a:rPr lang="fr-FR" sz="1200" dirty="0" smtClean="0"/>
+              <a:t>Shape Association &amp; Structure</a:t>
+            </a:r>
+            <a:endParaRPr lang="en-GB" sz="1200" dirty="0"/>
+          </a:p>
+        </p:txBody>
+      </p:sp>
+      <p:sp>
+        <p:nvSpPr>
+          <p:cNvPr id="57" name="Rectangle 56"/>
+          <p:cNvSpPr/>
+          <p:nvPr/>
+        </p:nvSpPr>
+        <p:spPr>
+          <a:xfrm>
+            <a:off x="99515" y="4580064"/>
+            <a:ext cx="1971299" cy="216024"/>
+          </a:xfrm>
+          <a:prstGeom prst="rect">
+            <a:avLst/>
+          </a:prstGeom>
+          <a:ln w="12700"/>
+        </p:spPr>
+        <p:style>
+          <a:lnRef idx="2">
+            <a:schemeClr val="dk1"/>
+          </a:lnRef>
+          <a:fillRef idx="1">
+            <a:schemeClr val="lt1"/>
+          </a:fillRef>
+          <a:effectRef idx="0">
+            <a:schemeClr val="dk1"/>
+          </a:effectRef>
+          <a:fontRef idx="minor">
+            <a:schemeClr val="dk1"/>
+          </a:fontRef>
+        </p:style>
+        <p:txBody>
+          <a:bodyPr rtlCol="0" anchor="ctr"/>
+          <a:lstStyle/>
+          <a:p>
+            <a:r>
+              <a:rPr lang="fr-FR" sz="1200" dirty="0" smtClean="0"/>
+              <a:t>Document Identification</a:t>
+            </a:r>
+            <a:endParaRPr lang="en-GB" sz="1200" dirty="0"/>
+          </a:p>
+        </p:txBody>
+      </p:sp>
+      <p:sp>
+        <p:nvSpPr>
+          <p:cNvPr id="59" name="Rectangle 58"/>
+          <p:cNvSpPr/>
+          <p:nvPr/>
+        </p:nvSpPr>
+        <p:spPr>
+          <a:xfrm>
+            <a:off x="99515" y="4854862"/>
+            <a:ext cx="1971299" cy="410304"/>
+          </a:xfrm>
+          <a:prstGeom prst="rect">
+            <a:avLst/>
+          </a:prstGeom>
+          <a:ln w="12700"/>
+        </p:spPr>
+        <p:style>
+          <a:lnRef idx="2">
+            <a:schemeClr val="dk1"/>
+          </a:lnRef>
+          <a:fillRef idx="1">
+            <a:schemeClr val="lt1"/>
+          </a:fillRef>
+          <a:effectRef idx="0">
+            <a:schemeClr val="dk1"/>
+          </a:effectRef>
+          <a:fontRef idx="minor">
+            <a:schemeClr val="dk1"/>
+          </a:fontRef>
+        </p:style>
+        <p:txBody>
+          <a:bodyPr rtlCol="0" anchor="ctr"/>
+          <a:lstStyle/>
+          <a:p>
+            <a:r>
+              <a:rPr lang="fr-FR" sz="1200" dirty="0" smtClean="0"/>
+              <a:t>Document Structure &amp; </a:t>
+            </a:r>
+          </a:p>
+          <a:p>
+            <a:r>
+              <a:rPr lang="fr-FR" sz="1200" dirty="0" smtClean="0"/>
+              <a:t>Property</a:t>
+            </a:r>
+            <a:endParaRPr lang="en-GB" sz="1200" dirty="0"/>
+          </a:p>
+        </p:txBody>
+      </p:sp>
+      <p:sp>
+        <p:nvSpPr>
+          <p:cNvPr id="64" name="Rectangle 63"/>
+          <p:cNvSpPr/>
+          <p:nvPr/>
+        </p:nvSpPr>
+        <p:spPr>
+          <a:xfrm>
+            <a:off x="7158253" y="4000419"/>
+            <a:ext cx="1874603" cy="216024"/>
+          </a:xfrm>
+          <a:prstGeom prst="rect">
+            <a:avLst/>
+          </a:prstGeom>
+          <a:ln w="12700"/>
+        </p:spPr>
+        <p:style>
+          <a:lnRef idx="2">
+            <a:schemeClr val="dk1"/>
+          </a:lnRef>
+          <a:fillRef idx="1">
+            <a:schemeClr val="lt1"/>
+          </a:fillRef>
+          <a:effectRef idx="0">
+            <a:schemeClr val="dk1"/>
+          </a:effectRef>
+          <a:fontRef idx="minor">
+            <a:schemeClr val="dk1"/>
+          </a:fontRef>
+        </p:style>
+        <p:txBody>
+          <a:bodyPr rtlCol="0" anchor="ctr"/>
+          <a:lstStyle/>
+          <a:p>
+            <a:r>
+              <a:rPr lang="fr-FR" sz="1200" dirty="0" smtClean="0"/>
+              <a:t>Shape Data Q. Criteria</a:t>
+            </a:r>
+            <a:endParaRPr lang="en-GB" sz="1200" dirty="0"/>
+          </a:p>
+        </p:txBody>
+      </p:sp>
+      <p:sp>
+        <p:nvSpPr>
+          <p:cNvPr id="66" name="Rectangle 65"/>
+          <p:cNvSpPr/>
+          <p:nvPr/>
+        </p:nvSpPr>
+        <p:spPr>
+          <a:xfrm>
+            <a:off x="7158253" y="4272409"/>
+            <a:ext cx="1874603" cy="216024"/>
+          </a:xfrm>
+          <a:prstGeom prst="rect">
+            <a:avLst/>
+          </a:prstGeom>
+          <a:ln w="12700"/>
+        </p:spPr>
+        <p:style>
+          <a:lnRef idx="2">
+            <a:schemeClr val="dk1"/>
+          </a:lnRef>
+          <a:fillRef idx="1">
+            <a:schemeClr val="lt1"/>
+          </a:fillRef>
+          <a:effectRef idx="0">
+            <a:schemeClr val="dk1"/>
+          </a:effectRef>
+          <a:fontRef idx="minor">
+            <a:schemeClr val="dk1"/>
+          </a:fontRef>
+        </p:style>
+        <p:txBody>
+          <a:bodyPr rtlCol="0" anchor="ctr"/>
+          <a:lstStyle/>
+          <a:p>
+            <a:r>
+              <a:rPr lang="fr-FR" sz="1200" dirty="0" smtClean="0"/>
+              <a:t>Shape Data Q. Inspection</a:t>
+            </a:r>
+            <a:endParaRPr lang="en-GB" sz="1200" dirty="0"/>
+          </a:p>
+        </p:txBody>
+      </p:sp>
+      <p:sp>
+        <p:nvSpPr>
+          <p:cNvPr id="69" name="6-Point Star 68"/>
+          <p:cNvSpPr/>
+          <p:nvPr/>
+        </p:nvSpPr>
+        <p:spPr>
+          <a:xfrm>
+            <a:off x="8850049" y="4025793"/>
+            <a:ext cx="139910" cy="157498"/>
+          </a:xfrm>
+          <a:prstGeom prst="star6">
+            <a:avLst/>
+          </a:prstGeom>
+          <a:solidFill>
+            <a:schemeClr val="tx1"/>
+          </a:solidFill>
+          <a:ln>
+            <a:solidFill>
+              <a:schemeClr val="tx1"/>
+            </a:solidFill>
+          </a:ln>
+        </p:spPr>
+        <p:style>
+          <a:lnRef idx="2">
+            <a:schemeClr val="accent1">
+              <a:shade val="50000"/>
+            </a:schemeClr>
+          </a:lnRef>
+          <a:fillRef idx="1">
+            <a:schemeClr val="accent1"/>
+          </a:fillRef>
+          <a:effectRef idx="0">
+            <a:schemeClr val="accent1"/>
+          </a:effectRef>
+          <a:fontRef idx="minor">
+            <a:schemeClr val="lt1"/>
+          </a:fontRef>
+        </p:style>
+        <p:txBody>
+          <a:bodyPr rtlCol="0" anchor="ctr"/>
+          <a:lstStyle/>
+          <a:p>
+            <a:pPr algn="ctr"/>
+            <a:endParaRPr lang="en-GB"/>
+          </a:p>
+        </p:txBody>
+      </p:sp>
+      <p:sp>
+        <p:nvSpPr>
+          <p:cNvPr id="70" name="6-Point Star 69"/>
+          <p:cNvSpPr/>
+          <p:nvPr/>
+        </p:nvSpPr>
+        <p:spPr>
+          <a:xfrm>
+            <a:off x="6075057" y="6540443"/>
+            <a:ext cx="139910" cy="157498"/>
+          </a:xfrm>
+          <a:prstGeom prst="star6">
+            <a:avLst/>
+          </a:prstGeom>
+          <a:solidFill>
+            <a:schemeClr val="tx1"/>
+          </a:solidFill>
+          <a:ln>
+            <a:solidFill>
+              <a:schemeClr val="tx1"/>
+            </a:solidFill>
+          </a:ln>
+        </p:spPr>
+        <p:style>
+          <a:lnRef idx="2">
+            <a:schemeClr val="accent1">
+              <a:shade val="50000"/>
+            </a:schemeClr>
+          </a:lnRef>
+          <a:fillRef idx="1">
+            <a:schemeClr val="accent1"/>
+          </a:fillRef>
+          <a:effectRef idx="0">
+            <a:schemeClr val="accent1"/>
+          </a:effectRef>
+          <a:fontRef idx="minor">
+            <a:schemeClr val="lt1"/>
+          </a:fontRef>
+        </p:style>
+        <p:txBody>
+          <a:bodyPr rtlCol="0" anchor="ctr"/>
+          <a:lstStyle/>
+          <a:p>
+            <a:pPr algn="ctr"/>
+            <a:endParaRPr lang="en-GB"/>
+          </a:p>
+        </p:txBody>
+      </p:sp>
+      <p:sp>
+        <p:nvSpPr>
+          <p:cNvPr id="71" name="6-Point Star 70"/>
+          <p:cNvSpPr/>
+          <p:nvPr/>
+        </p:nvSpPr>
+        <p:spPr>
+          <a:xfrm>
+            <a:off x="7252450" y="6547477"/>
+            <a:ext cx="139910" cy="157498"/>
+          </a:xfrm>
+          <a:prstGeom prst="star6">
+            <a:avLst/>
+          </a:prstGeom>
+          <a:solidFill>
+            <a:schemeClr val="tx1"/>
+          </a:solidFill>
+          <a:ln>
+            <a:solidFill>
+              <a:schemeClr val="tx1"/>
+            </a:solidFill>
+          </a:ln>
+        </p:spPr>
+        <p:style>
+          <a:lnRef idx="2">
+            <a:schemeClr val="accent1">
+              <a:shade val="50000"/>
+            </a:schemeClr>
+          </a:lnRef>
+          <a:fillRef idx="1">
+            <a:schemeClr val="accent1"/>
+          </a:fillRef>
+          <a:effectRef idx="0">
+            <a:schemeClr val="accent1"/>
+          </a:effectRef>
+          <a:fontRef idx="minor">
+            <a:schemeClr val="lt1"/>
+          </a:fontRef>
+        </p:style>
+        <p:txBody>
+          <a:bodyPr rtlCol="0" anchor="ctr"/>
+          <a:lstStyle/>
+          <a:p>
+            <a:pPr algn="ctr"/>
+            <a:endParaRPr lang="en-GB"/>
+          </a:p>
+        </p:txBody>
+      </p:sp>
+      <p:sp>
+        <p:nvSpPr>
+          <p:cNvPr id="74" name="Rectangle 73"/>
+          <p:cNvSpPr/>
+          <p:nvPr/>
+        </p:nvSpPr>
+        <p:spPr>
+          <a:xfrm>
+            <a:off x="6914821" y="5052524"/>
+            <a:ext cx="2118036" cy="216024"/>
+          </a:xfrm>
+          <a:prstGeom prst="rect">
+            <a:avLst/>
+          </a:prstGeom>
+          <a:ln w="12700"/>
+        </p:spPr>
+        <p:style>
+          <a:lnRef idx="2">
+            <a:schemeClr val="dk1"/>
+          </a:lnRef>
+          <a:fillRef idx="1">
+            <a:schemeClr val="lt1"/>
+          </a:fillRef>
+          <a:effectRef idx="0">
+            <a:schemeClr val="dk1"/>
+          </a:effectRef>
+          <a:fontRef idx="minor">
+            <a:schemeClr val="dk1"/>
+          </a:fontRef>
+        </p:style>
+        <p:txBody>
+          <a:bodyPr rtlCol="0" anchor="ctr"/>
+          <a:lstStyle/>
+          <a:p>
+            <a:r>
+              <a:rPr lang="fr-FR" sz="1200" dirty="0" smtClean="0"/>
+              <a:t>Kinematic Structure &amp; Links</a:t>
+            </a:r>
+            <a:endParaRPr lang="en-GB" sz="1200" dirty="0"/>
+          </a:p>
+        </p:txBody>
+      </p:sp>
+      <p:sp>
+        <p:nvSpPr>
+          <p:cNvPr id="75" name="6-Point Star 74"/>
+          <p:cNvSpPr/>
+          <p:nvPr/>
+        </p:nvSpPr>
+        <p:spPr>
+          <a:xfrm>
+            <a:off x="8841165" y="5080629"/>
+            <a:ext cx="139910" cy="157498"/>
+          </a:xfrm>
+          <a:prstGeom prst="star6">
+            <a:avLst/>
+          </a:prstGeom>
+          <a:solidFill>
+            <a:schemeClr val="tx1"/>
+          </a:solidFill>
+          <a:ln>
+            <a:solidFill>
+              <a:schemeClr val="tx1"/>
+            </a:solidFill>
+          </a:ln>
+        </p:spPr>
+        <p:style>
+          <a:lnRef idx="2">
+            <a:schemeClr val="accent1">
+              <a:shade val="50000"/>
+            </a:schemeClr>
+          </a:lnRef>
+          <a:fillRef idx="1">
+            <a:schemeClr val="accent1"/>
+          </a:fillRef>
+          <a:effectRef idx="0">
+            <a:schemeClr val="accent1"/>
+          </a:effectRef>
+          <a:fontRef idx="minor">
+            <a:schemeClr val="lt1"/>
+          </a:fontRef>
+        </p:style>
+        <p:txBody>
+          <a:bodyPr rtlCol="0" anchor="ctr"/>
+          <a:lstStyle/>
+          <a:p>
+            <a:pPr algn="ctr"/>
+            <a:endParaRPr lang="en-GB"/>
+          </a:p>
+        </p:txBody>
+      </p:sp>
+      <p:sp>
+        <p:nvSpPr>
+          <p:cNvPr id="76" name="Rectangle 75"/>
+          <p:cNvSpPr/>
+          <p:nvPr/>
+        </p:nvSpPr>
+        <p:spPr>
+          <a:xfrm>
+            <a:off x="6914823" y="5350734"/>
+            <a:ext cx="2118034" cy="216024"/>
+          </a:xfrm>
+          <a:prstGeom prst="rect">
+            <a:avLst/>
+          </a:prstGeom>
+          <a:ln w="12700"/>
+        </p:spPr>
+        <p:style>
+          <a:lnRef idx="2">
+            <a:schemeClr val="dk1"/>
+          </a:lnRef>
+          <a:fillRef idx="1">
+            <a:schemeClr val="lt1"/>
+          </a:fillRef>
+          <a:effectRef idx="0">
+            <a:schemeClr val="dk1"/>
+          </a:effectRef>
+          <a:fontRef idx="minor">
+            <a:schemeClr val="dk1"/>
+          </a:fontRef>
+        </p:style>
+        <p:txBody>
+          <a:bodyPr rtlCol="0" anchor="ctr"/>
+          <a:lstStyle/>
+          <a:p>
+            <a:r>
+              <a:rPr lang="fr-FR" sz="1200" dirty="0" smtClean="0"/>
+              <a:t>Kinematic Motion</a:t>
+            </a:r>
+            <a:endParaRPr lang="en-GB" sz="1200" dirty="0"/>
+          </a:p>
+        </p:txBody>
+      </p:sp>
+      <p:sp>
+        <p:nvSpPr>
+          <p:cNvPr id="78" name="Rectangle 77"/>
+          <p:cNvSpPr/>
+          <p:nvPr/>
+        </p:nvSpPr>
+        <p:spPr>
+          <a:xfrm>
+            <a:off x="2666637" y="6072876"/>
+            <a:ext cx="1363732" cy="216024"/>
+          </a:xfrm>
+          <a:prstGeom prst="rect">
+            <a:avLst/>
+          </a:prstGeom>
+          <a:ln w="12700"/>
+        </p:spPr>
+        <p:style>
+          <a:lnRef idx="2">
+            <a:schemeClr val="dk1"/>
+          </a:lnRef>
+          <a:fillRef idx="1">
+            <a:schemeClr val="lt1"/>
+          </a:fillRef>
+          <a:effectRef idx="0">
+            <a:schemeClr val="dk1"/>
+          </a:effectRef>
+          <a:fontRef idx="minor">
+            <a:schemeClr val="dk1"/>
+          </a:fontRef>
+        </p:style>
+        <p:txBody>
+          <a:bodyPr rtlCol="0" anchor="ctr"/>
+          <a:lstStyle/>
+          <a:p>
+            <a:r>
+              <a:rPr lang="fr-FR" sz="1200" dirty="0" smtClean="0"/>
+              <a:t>Process Plan</a:t>
+            </a:r>
+            <a:endParaRPr lang="en-GB" sz="1200" dirty="0"/>
+          </a:p>
+        </p:txBody>
+      </p:sp>
+      <p:sp>
+        <p:nvSpPr>
+          <p:cNvPr id="80" name="Rectangle 79"/>
+          <p:cNvSpPr/>
+          <p:nvPr/>
+        </p:nvSpPr>
+        <p:spPr>
+          <a:xfrm>
+            <a:off x="2666637" y="6346213"/>
+            <a:ext cx="1363732" cy="216024"/>
+          </a:xfrm>
+          <a:prstGeom prst="rect">
+            <a:avLst/>
+          </a:prstGeom>
+          <a:ln w="12700"/>
+        </p:spPr>
+        <p:style>
+          <a:lnRef idx="2">
+            <a:schemeClr val="dk1"/>
+          </a:lnRef>
+          <a:fillRef idx="1">
+            <a:schemeClr val="lt1"/>
+          </a:fillRef>
+          <a:effectRef idx="0">
+            <a:schemeClr val="dk1"/>
+          </a:effectRef>
+          <a:fontRef idx="minor">
+            <a:schemeClr val="dk1"/>
+          </a:fontRef>
+        </p:style>
+        <p:txBody>
+          <a:bodyPr rtlCol="0" anchor="ctr"/>
+          <a:lstStyle/>
+          <a:p>
+            <a:r>
+              <a:rPr lang="fr-FR" sz="1200" dirty="0" smtClean="0"/>
+              <a:t>Mating</a:t>
+            </a:r>
+            <a:endParaRPr lang="en-GB" sz="1200" dirty="0"/>
+          </a:p>
+        </p:txBody>
+      </p:sp>
+      <p:sp>
+        <p:nvSpPr>
+          <p:cNvPr id="82" name="Rectangle 81"/>
+          <p:cNvSpPr/>
+          <p:nvPr/>
+        </p:nvSpPr>
+        <p:spPr>
+          <a:xfrm>
+            <a:off x="5078189" y="2364922"/>
+            <a:ext cx="1440000" cy="216024"/>
+          </a:xfrm>
+          <a:prstGeom prst="rect">
+            <a:avLst/>
+          </a:prstGeom>
+          <a:ln w="12700"/>
+        </p:spPr>
+        <p:style>
+          <a:lnRef idx="2">
+            <a:schemeClr val="dk1"/>
+          </a:lnRef>
+          <a:fillRef idx="1">
+            <a:schemeClr val="lt1"/>
+          </a:fillRef>
+          <a:effectRef idx="0">
+            <a:schemeClr val="dk1"/>
+          </a:effectRef>
+          <a:fontRef idx="minor">
+            <a:schemeClr val="dk1"/>
+          </a:fontRef>
+        </p:style>
+        <p:txBody>
+          <a:bodyPr rtlCol="0" anchor="ctr"/>
+          <a:lstStyle/>
+          <a:p>
+            <a:r>
+              <a:rPr lang="fr-FR" sz="1200" dirty="0" smtClean="0"/>
+              <a:t>Activity</a:t>
+            </a:r>
+            <a:endParaRPr lang="en-GB" sz="1200" dirty="0"/>
+          </a:p>
+        </p:txBody>
+      </p:sp>
+      <p:sp>
+        <p:nvSpPr>
+          <p:cNvPr id="85" name="Rectangle 84"/>
+          <p:cNvSpPr/>
+          <p:nvPr/>
+        </p:nvSpPr>
+        <p:spPr>
+          <a:xfrm>
+            <a:off x="5078189" y="2638113"/>
+            <a:ext cx="1440000" cy="216024"/>
+          </a:xfrm>
+          <a:prstGeom prst="rect">
+            <a:avLst/>
+          </a:prstGeom>
+          <a:ln w="12700"/>
+        </p:spPr>
+        <p:style>
+          <a:lnRef idx="2">
+            <a:schemeClr val="dk1"/>
+          </a:lnRef>
+          <a:fillRef idx="1">
+            <a:schemeClr val="lt1"/>
+          </a:fillRef>
+          <a:effectRef idx="0">
+            <a:schemeClr val="dk1"/>
+          </a:effectRef>
+          <a:fontRef idx="minor">
+            <a:schemeClr val="dk1"/>
+          </a:fontRef>
+        </p:style>
+        <p:txBody>
+          <a:bodyPr rtlCol="0" anchor="ctr"/>
+          <a:lstStyle/>
+          <a:p>
+            <a:r>
+              <a:rPr lang="fr-FR" sz="1200" dirty="0" smtClean="0"/>
+              <a:t>Work Mgmt.</a:t>
+            </a:r>
+            <a:endParaRPr lang="en-GB" sz="1200" dirty="0"/>
+          </a:p>
+        </p:txBody>
+      </p:sp>
+      <p:sp>
+        <p:nvSpPr>
+          <p:cNvPr id="88" name="Rectangle 87"/>
+          <p:cNvSpPr/>
+          <p:nvPr/>
+        </p:nvSpPr>
+        <p:spPr>
+          <a:xfrm>
+            <a:off x="5078189" y="2912697"/>
+            <a:ext cx="1440000" cy="216024"/>
+          </a:xfrm>
+          <a:prstGeom prst="rect">
+            <a:avLst/>
+          </a:prstGeom>
+          <a:ln w="12700"/>
+        </p:spPr>
+        <p:style>
+          <a:lnRef idx="2">
+            <a:schemeClr val="dk1"/>
+          </a:lnRef>
+          <a:fillRef idx="1">
+            <a:schemeClr val="lt1"/>
+          </a:fillRef>
+          <a:effectRef idx="0">
+            <a:schemeClr val="dk1"/>
+          </a:effectRef>
+          <a:fontRef idx="minor">
+            <a:schemeClr val="dk1"/>
+          </a:fontRef>
+        </p:style>
+        <p:txBody>
+          <a:bodyPr rtlCol="0" anchor="ctr"/>
+          <a:lstStyle/>
+          <a:p>
+            <a:r>
+              <a:rPr lang="fr-FR" sz="1200" dirty="0" smtClean="0"/>
+              <a:t>Delta Change</a:t>
+            </a:r>
+            <a:endParaRPr lang="en-GB" sz="1200" dirty="0"/>
+          </a:p>
+        </p:txBody>
+      </p:sp>
+      <p:sp>
+        <p:nvSpPr>
+          <p:cNvPr id="90" name="Rectangle 89"/>
+          <p:cNvSpPr/>
+          <p:nvPr/>
+        </p:nvSpPr>
+        <p:spPr>
+          <a:xfrm>
+            <a:off x="2575482" y="3051371"/>
+            <a:ext cx="1495104" cy="421261"/>
+          </a:xfrm>
+          <a:prstGeom prst="rect">
+            <a:avLst/>
+          </a:prstGeom>
+          <a:ln w="12700"/>
+        </p:spPr>
+        <p:style>
+          <a:lnRef idx="2">
+            <a:schemeClr val="dk1"/>
+          </a:lnRef>
+          <a:fillRef idx="1">
+            <a:schemeClr val="lt1"/>
+          </a:fillRef>
+          <a:effectRef idx="0">
+            <a:schemeClr val="dk1"/>
+          </a:effectRef>
+          <a:fontRef idx="minor">
+            <a:schemeClr val="dk1"/>
+          </a:fontRef>
+        </p:style>
+        <p:txBody>
+          <a:bodyPr rtlCol="0" anchor="ctr"/>
+          <a:lstStyle/>
+          <a:p>
+            <a:r>
+              <a:rPr lang="fr-FR" sz="1200" dirty="0" smtClean="0"/>
+              <a:t>Part &amp; Version</a:t>
+            </a:r>
+          </a:p>
+          <a:p>
+            <a:r>
+              <a:rPr lang="fr-FR" sz="1200" dirty="0" smtClean="0"/>
+              <a:t>Identification</a:t>
+            </a:r>
+            <a:endParaRPr lang="en-GB" sz="1200" dirty="0"/>
+          </a:p>
+        </p:txBody>
+      </p:sp>
+      <p:sp>
+        <p:nvSpPr>
+          <p:cNvPr id="92" name="Rectangle 91"/>
+          <p:cNvSpPr/>
+          <p:nvPr/>
+        </p:nvSpPr>
+        <p:spPr>
+          <a:xfrm>
+            <a:off x="2575482" y="3543212"/>
+            <a:ext cx="1495104" cy="216024"/>
+          </a:xfrm>
+          <a:prstGeom prst="rect">
+            <a:avLst/>
+          </a:prstGeom>
+          <a:ln w="12700"/>
+        </p:spPr>
+        <p:style>
+          <a:lnRef idx="2">
+            <a:schemeClr val="dk1"/>
+          </a:lnRef>
+          <a:fillRef idx="1">
+            <a:schemeClr val="lt1"/>
+          </a:fillRef>
+          <a:effectRef idx="0">
+            <a:schemeClr val="dk1"/>
+          </a:effectRef>
+          <a:fontRef idx="minor">
+            <a:schemeClr val="dk1"/>
+          </a:fontRef>
+        </p:style>
+        <p:txBody>
+          <a:bodyPr rtlCol="0" anchor="ctr"/>
+          <a:lstStyle/>
+          <a:p>
+            <a:r>
+              <a:rPr lang="fr-FR" sz="1200" dirty="0" smtClean="0"/>
+              <a:t>Part View</a:t>
+            </a:r>
+            <a:endParaRPr lang="en-GB" sz="1200" dirty="0"/>
+          </a:p>
+        </p:txBody>
+      </p:sp>
+      <p:sp>
+        <p:nvSpPr>
+          <p:cNvPr id="97" name="Rectangle 96"/>
+          <p:cNvSpPr/>
+          <p:nvPr/>
+        </p:nvSpPr>
+        <p:spPr>
+          <a:xfrm>
+            <a:off x="1573988" y="536756"/>
+            <a:ext cx="2196000" cy="216024"/>
+          </a:xfrm>
+          <a:prstGeom prst="rect">
+            <a:avLst/>
+          </a:prstGeom>
+          <a:ln w="12700"/>
+        </p:spPr>
+        <p:style>
+          <a:lnRef idx="2">
+            <a:schemeClr val="dk1"/>
+          </a:lnRef>
+          <a:fillRef idx="1">
+            <a:schemeClr val="lt1"/>
+          </a:fillRef>
+          <a:effectRef idx="0">
+            <a:schemeClr val="dk1"/>
+          </a:effectRef>
+          <a:fontRef idx="minor">
+            <a:schemeClr val="dk1"/>
+          </a:fontRef>
+        </p:style>
+        <p:txBody>
+          <a:bodyPr rtlCol="0" anchor="ctr"/>
+          <a:lstStyle/>
+          <a:p>
+            <a:r>
+              <a:rPr lang="fr-FR" sz="1200" dirty="0" smtClean="0"/>
+              <a:t>Product Specification</a:t>
+            </a:r>
+            <a:endParaRPr lang="en-GB" sz="1200" dirty="0"/>
+          </a:p>
+        </p:txBody>
+      </p:sp>
+      <p:sp>
+        <p:nvSpPr>
+          <p:cNvPr id="99" name="Rectangle 98"/>
+          <p:cNvSpPr/>
+          <p:nvPr/>
+        </p:nvSpPr>
+        <p:spPr>
+          <a:xfrm>
+            <a:off x="1573988" y="794398"/>
+            <a:ext cx="2196000" cy="216024"/>
+          </a:xfrm>
+          <a:prstGeom prst="rect">
+            <a:avLst/>
+          </a:prstGeom>
+          <a:ln w="12700"/>
+        </p:spPr>
+        <p:style>
+          <a:lnRef idx="2">
+            <a:schemeClr val="dk1"/>
+          </a:lnRef>
+          <a:fillRef idx="1">
+            <a:schemeClr val="lt1"/>
+          </a:fillRef>
+          <a:effectRef idx="0">
+            <a:schemeClr val="dk1"/>
+          </a:effectRef>
+          <a:fontRef idx="minor">
+            <a:schemeClr val="dk1"/>
+          </a:fontRef>
+        </p:style>
+        <p:txBody>
+          <a:bodyPr rtlCol="0" anchor="ctr"/>
+          <a:lstStyle/>
+          <a:p>
+            <a:r>
+              <a:rPr lang="fr-FR" sz="1200" dirty="0" smtClean="0"/>
+              <a:t>Breakdown</a:t>
+            </a:r>
+            <a:endParaRPr lang="en-GB" sz="1200" dirty="0"/>
+          </a:p>
+        </p:txBody>
+      </p:sp>
+      <p:sp>
+        <p:nvSpPr>
+          <p:cNvPr id="104" name="Rectangle 103"/>
+          <p:cNvSpPr/>
+          <p:nvPr/>
+        </p:nvSpPr>
+        <p:spPr>
+          <a:xfrm>
+            <a:off x="1573988" y="1050063"/>
+            <a:ext cx="2196000" cy="216024"/>
+          </a:xfrm>
+          <a:prstGeom prst="rect">
+            <a:avLst/>
+          </a:prstGeom>
+          <a:ln w="12700"/>
+        </p:spPr>
+        <p:style>
+          <a:lnRef idx="2">
+            <a:schemeClr val="dk1"/>
+          </a:lnRef>
+          <a:fillRef idx="1">
+            <a:schemeClr val="lt1"/>
+          </a:fillRef>
+          <a:effectRef idx="0">
+            <a:schemeClr val="dk1"/>
+          </a:effectRef>
+          <a:fontRef idx="minor">
+            <a:schemeClr val="dk1"/>
+          </a:fontRef>
+        </p:style>
+        <p:txBody>
+          <a:bodyPr rtlCol="0" anchor="ctr"/>
+          <a:lstStyle/>
+          <a:p>
+            <a:r>
+              <a:rPr lang="fr-FR" sz="1200" dirty="0" smtClean="0"/>
+              <a:t>Assembly Structure</a:t>
+            </a:r>
+            <a:endParaRPr lang="en-GB" sz="1200" dirty="0"/>
+          </a:p>
+        </p:txBody>
+      </p:sp>
+      <p:sp>
+        <p:nvSpPr>
+          <p:cNvPr id="108" name="Rectangle 107"/>
+          <p:cNvSpPr/>
+          <p:nvPr/>
+        </p:nvSpPr>
+        <p:spPr>
+          <a:xfrm>
+            <a:off x="1573988" y="1305048"/>
+            <a:ext cx="2196000" cy="216024"/>
+          </a:xfrm>
+          <a:prstGeom prst="rect">
+            <a:avLst/>
+          </a:prstGeom>
+          <a:ln w="12700"/>
+        </p:spPr>
+        <p:style>
+          <a:lnRef idx="2">
+            <a:schemeClr val="dk1"/>
+          </a:lnRef>
+          <a:fillRef idx="1">
+            <a:schemeClr val="lt1"/>
+          </a:fillRef>
+          <a:effectRef idx="0">
+            <a:schemeClr val="dk1"/>
+          </a:effectRef>
+          <a:fontRef idx="minor">
+            <a:schemeClr val="dk1"/>
+          </a:fontRef>
+        </p:style>
+        <p:txBody>
+          <a:bodyPr rtlCol="0" anchor="ctr"/>
+          <a:lstStyle/>
+          <a:p>
+            <a:r>
+              <a:rPr lang="fr-FR" sz="1200" dirty="0" smtClean="0"/>
+              <a:t>Configuration</a:t>
+            </a:r>
+            <a:endParaRPr lang="en-GB" sz="1200" dirty="0"/>
+          </a:p>
+        </p:txBody>
+      </p:sp>
+      <p:sp>
+        <p:nvSpPr>
+          <p:cNvPr id="110" name="Rectangle 109"/>
+          <p:cNvSpPr/>
+          <p:nvPr/>
+        </p:nvSpPr>
+        <p:spPr>
+          <a:xfrm>
+            <a:off x="1573988" y="1574202"/>
+            <a:ext cx="2196000" cy="216024"/>
+          </a:xfrm>
+          <a:prstGeom prst="rect">
+            <a:avLst/>
+          </a:prstGeom>
+          <a:ln w="12700"/>
+        </p:spPr>
+        <p:style>
+          <a:lnRef idx="2">
+            <a:schemeClr val="dk1"/>
+          </a:lnRef>
+          <a:fillRef idx="1">
+            <a:schemeClr val="lt1"/>
+          </a:fillRef>
+          <a:effectRef idx="0">
+            <a:schemeClr val="dk1"/>
+          </a:effectRef>
+          <a:fontRef idx="minor">
+            <a:schemeClr val="dk1"/>
+          </a:fontRef>
+        </p:style>
+        <p:txBody>
+          <a:bodyPr rtlCol="0" anchor="ctr"/>
+          <a:lstStyle/>
+          <a:p>
+            <a:r>
+              <a:rPr lang="fr-FR" sz="1200" dirty="0" smtClean="0"/>
+              <a:t>Part Occurrence</a:t>
+            </a:r>
+            <a:endParaRPr lang="en-GB" sz="1200" dirty="0"/>
+          </a:p>
+        </p:txBody>
+      </p:sp>
+      <p:sp>
+        <p:nvSpPr>
+          <p:cNvPr id="115" name="Rectangle 114"/>
+          <p:cNvSpPr/>
+          <p:nvPr/>
+        </p:nvSpPr>
+        <p:spPr>
+          <a:xfrm>
+            <a:off x="1573988" y="1833760"/>
+            <a:ext cx="2196000" cy="522264"/>
+          </a:xfrm>
+          <a:prstGeom prst="rect">
+            <a:avLst/>
+          </a:prstGeom>
+          <a:ln w="12700"/>
+        </p:spPr>
+        <p:style>
+          <a:lnRef idx="2">
+            <a:schemeClr val="dk1"/>
+          </a:lnRef>
+          <a:fillRef idx="1">
+            <a:schemeClr val="lt1"/>
+          </a:fillRef>
+          <a:effectRef idx="0">
+            <a:schemeClr val="dk1"/>
+          </a:effectRef>
+          <a:fontRef idx="minor">
+            <a:schemeClr val="dk1"/>
+          </a:fontRef>
+        </p:style>
+        <p:txBody>
+          <a:bodyPr rtlCol="0" anchor="ctr"/>
+          <a:lstStyle/>
+          <a:p>
+            <a:r>
+              <a:rPr lang="fr-FR" sz="1200" dirty="0" smtClean="0"/>
+              <a:t>Transf., Geom. Coord. Space &amp;</a:t>
+            </a:r>
+          </a:p>
+          <a:p>
+            <a:r>
+              <a:rPr lang="fr-FR" sz="1200" dirty="0" smtClean="0"/>
+              <a:t>Coord. System</a:t>
+            </a:r>
+            <a:endParaRPr lang="en-GB" sz="1200" dirty="0"/>
+          </a:p>
+        </p:txBody>
+      </p:sp>
+      <p:sp>
+        <p:nvSpPr>
+          <p:cNvPr id="157" name="Rectangle 156"/>
+          <p:cNvSpPr/>
+          <p:nvPr/>
+        </p:nvSpPr>
+        <p:spPr>
+          <a:xfrm>
+            <a:off x="5856995" y="321924"/>
+            <a:ext cx="3132000" cy="216024"/>
+          </a:xfrm>
+          <a:prstGeom prst="rect">
+            <a:avLst/>
+          </a:prstGeom>
+          <a:ln w="12700"/>
+        </p:spPr>
+        <p:style>
+          <a:lnRef idx="2">
+            <a:schemeClr val="dk1"/>
+          </a:lnRef>
+          <a:fillRef idx="1">
+            <a:schemeClr val="lt1"/>
+          </a:fillRef>
+          <a:effectRef idx="0">
+            <a:schemeClr val="dk1"/>
+          </a:effectRef>
+          <a:fontRef idx="minor">
+            <a:schemeClr val="dk1"/>
+          </a:fontRef>
+        </p:style>
+        <p:txBody>
+          <a:bodyPr rtlCol="0" anchor="ctr"/>
+          <a:lstStyle/>
+          <a:p>
+            <a:r>
+              <a:rPr lang="fr-FR" sz="1200" dirty="0" smtClean="0"/>
+              <a:t>Person, Org. &amp; Address</a:t>
+            </a:r>
+            <a:endParaRPr lang="en-GB" sz="1200" dirty="0"/>
+          </a:p>
+        </p:txBody>
+      </p:sp>
+      <p:sp>
+        <p:nvSpPr>
+          <p:cNvPr id="159" name="Rectangle 158"/>
+          <p:cNvSpPr/>
+          <p:nvPr/>
+        </p:nvSpPr>
+        <p:spPr>
+          <a:xfrm>
+            <a:off x="5856995" y="584391"/>
+            <a:ext cx="3132000" cy="216024"/>
+          </a:xfrm>
+          <a:prstGeom prst="rect">
+            <a:avLst/>
+          </a:prstGeom>
+          <a:ln w="12700"/>
+        </p:spPr>
+        <p:style>
+          <a:lnRef idx="2">
+            <a:schemeClr val="dk1"/>
+          </a:lnRef>
+          <a:fillRef idx="1">
+            <a:schemeClr val="lt1"/>
+          </a:fillRef>
+          <a:effectRef idx="0">
+            <a:schemeClr val="dk1"/>
+          </a:effectRef>
+          <a:fontRef idx="minor">
+            <a:schemeClr val="dk1"/>
+          </a:fontRef>
+        </p:style>
+        <p:txBody>
+          <a:bodyPr rtlCol="0" anchor="ctr"/>
+          <a:lstStyle/>
+          <a:p>
+            <a:r>
+              <a:rPr lang="fr-FR" sz="1200" dirty="0" smtClean="0"/>
+              <a:t>Date &amp; Time</a:t>
+            </a:r>
+            <a:endParaRPr lang="en-GB" sz="1200" dirty="0"/>
+          </a:p>
+        </p:txBody>
+      </p:sp>
+      <p:sp>
+        <p:nvSpPr>
+          <p:cNvPr id="164" name="Rectangle 163"/>
+          <p:cNvSpPr/>
+          <p:nvPr/>
+        </p:nvSpPr>
+        <p:spPr>
+          <a:xfrm>
+            <a:off x="5856995" y="840646"/>
+            <a:ext cx="3132000" cy="216024"/>
+          </a:xfrm>
+          <a:prstGeom prst="rect">
+            <a:avLst/>
+          </a:prstGeom>
+          <a:ln w="12700"/>
+        </p:spPr>
+        <p:style>
+          <a:lnRef idx="2">
+            <a:schemeClr val="dk1"/>
+          </a:lnRef>
+          <a:fillRef idx="1">
+            <a:schemeClr val="lt1"/>
+          </a:fillRef>
+          <a:effectRef idx="0">
+            <a:schemeClr val="dk1"/>
+          </a:effectRef>
+          <a:fontRef idx="minor">
+            <a:schemeClr val="dk1"/>
+          </a:fontRef>
+        </p:style>
+        <p:txBody>
+          <a:bodyPr rtlCol="0" anchor="ctr"/>
+          <a:lstStyle/>
+          <a:p>
+            <a:r>
+              <a:rPr lang="fr-FR" sz="1200" dirty="0" smtClean="0"/>
+              <a:t>Approval, Contract &amp; Project</a:t>
+            </a:r>
+            <a:endParaRPr lang="en-GB" sz="1200" dirty="0"/>
+          </a:p>
+        </p:txBody>
+      </p:sp>
+      <p:sp>
+        <p:nvSpPr>
+          <p:cNvPr id="169" name="Rectangle 168"/>
+          <p:cNvSpPr/>
+          <p:nvPr/>
+        </p:nvSpPr>
+        <p:spPr>
+          <a:xfrm>
+            <a:off x="5856995" y="1119837"/>
+            <a:ext cx="1350493" cy="216024"/>
+          </a:xfrm>
+          <a:prstGeom prst="rect">
+            <a:avLst/>
+          </a:prstGeom>
+          <a:ln w="12700"/>
+        </p:spPr>
+        <p:style>
+          <a:lnRef idx="2">
+            <a:schemeClr val="dk1"/>
+          </a:lnRef>
+          <a:fillRef idx="1">
+            <a:schemeClr val="lt1"/>
+          </a:fillRef>
+          <a:effectRef idx="0">
+            <a:schemeClr val="dk1"/>
+          </a:effectRef>
+          <a:fontRef idx="minor">
+            <a:schemeClr val="dk1"/>
+          </a:fontRef>
+        </p:style>
+        <p:txBody>
+          <a:bodyPr rtlCol="0" anchor="ctr"/>
+          <a:lstStyle/>
+          <a:p>
+            <a:r>
+              <a:rPr lang="fr-FR" sz="1200" dirty="0" smtClean="0"/>
+              <a:t>Identification</a:t>
+            </a:r>
+            <a:endParaRPr lang="en-GB" sz="1200" dirty="0"/>
+          </a:p>
+        </p:txBody>
+      </p:sp>
+      <p:sp>
+        <p:nvSpPr>
+          <p:cNvPr id="171" name="Rectangle 170"/>
+          <p:cNvSpPr/>
+          <p:nvPr/>
+        </p:nvSpPr>
+        <p:spPr>
+          <a:xfrm>
+            <a:off x="7280168" y="1119837"/>
+            <a:ext cx="1700907" cy="216024"/>
+          </a:xfrm>
+          <a:prstGeom prst="rect">
+            <a:avLst/>
+          </a:prstGeom>
+          <a:ln w="12700"/>
+        </p:spPr>
+        <p:style>
+          <a:lnRef idx="2">
+            <a:schemeClr val="dk1"/>
+          </a:lnRef>
+          <a:fillRef idx="1">
+            <a:schemeClr val="lt1"/>
+          </a:fillRef>
+          <a:effectRef idx="0">
+            <a:schemeClr val="dk1"/>
+          </a:effectRef>
+          <a:fontRef idx="minor">
+            <a:schemeClr val="dk1"/>
+          </a:fontRef>
+        </p:style>
+        <p:txBody>
+          <a:bodyPr rtlCol="0" anchor="ctr"/>
+          <a:lstStyle/>
+          <a:p>
+            <a:r>
+              <a:rPr lang="fr-FR" sz="1200" dirty="0" smtClean="0"/>
+              <a:t>Name &amp; Description</a:t>
+            </a:r>
+            <a:endParaRPr lang="en-GB" sz="1200" dirty="0"/>
+          </a:p>
+        </p:txBody>
+      </p:sp>
+      <p:sp>
+        <p:nvSpPr>
+          <p:cNvPr id="173" name="Rectangle 172"/>
+          <p:cNvSpPr/>
+          <p:nvPr/>
+        </p:nvSpPr>
+        <p:spPr>
+          <a:xfrm>
+            <a:off x="5875178" y="1405595"/>
+            <a:ext cx="1533976" cy="216024"/>
+          </a:xfrm>
+          <a:prstGeom prst="rect">
+            <a:avLst/>
+          </a:prstGeom>
+          <a:ln w="12700"/>
+        </p:spPr>
+        <p:style>
+          <a:lnRef idx="2">
+            <a:schemeClr val="dk1"/>
+          </a:lnRef>
+          <a:fillRef idx="1">
+            <a:schemeClr val="lt1"/>
+          </a:fillRef>
+          <a:effectRef idx="0">
+            <a:schemeClr val="dk1"/>
+          </a:effectRef>
+          <a:fontRef idx="minor">
+            <a:schemeClr val="dk1"/>
+          </a:fontRef>
+        </p:style>
+        <p:txBody>
+          <a:bodyPr rtlCol="0" anchor="ctr"/>
+          <a:lstStyle/>
+          <a:p>
+            <a:r>
+              <a:rPr lang="fr-FR" sz="1200" dirty="0" smtClean="0"/>
+              <a:t>Classification</a:t>
+            </a:r>
+            <a:endParaRPr lang="en-GB" sz="1200" dirty="0"/>
+          </a:p>
+        </p:txBody>
+      </p:sp>
+      <p:sp>
+        <p:nvSpPr>
+          <p:cNvPr id="176" name="Rectangle 175"/>
+          <p:cNvSpPr/>
+          <p:nvPr/>
+        </p:nvSpPr>
+        <p:spPr>
+          <a:xfrm>
+            <a:off x="7485325" y="1412213"/>
+            <a:ext cx="1503669" cy="216024"/>
+          </a:xfrm>
+          <a:prstGeom prst="rect">
+            <a:avLst/>
+          </a:prstGeom>
+          <a:ln w="12700"/>
+        </p:spPr>
+        <p:style>
+          <a:lnRef idx="2">
+            <a:schemeClr val="dk1"/>
+          </a:lnRef>
+          <a:fillRef idx="1">
+            <a:schemeClr val="lt1"/>
+          </a:fillRef>
+          <a:effectRef idx="0">
+            <a:schemeClr val="dk1"/>
+          </a:effectRef>
+          <a:fontRef idx="minor">
+            <a:schemeClr val="dk1"/>
+          </a:fontRef>
+        </p:style>
+        <p:txBody>
+          <a:bodyPr rtlCol="0" anchor="ctr"/>
+          <a:lstStyle/>
+          <a:p>
+            <a:r>
+              <a:rPr lang="fr-FR" sz="1200" dirty="0" smtClean="0"/>
+              <a:t>Multi Linguism</a:t>
+            </a:r>
+            <a:endParaRPr lang="en-GB" sz="1200" dirty="0"/>
+          </a:p>
+        </p:txBody>
+      </p:sp>
+      <p:sp>
+        <p:nvSpPr>
+          <p:cNvPr id="178" name="Rectangle 177"/>
+          <p:cNvSpPr/>
+          <p:nvPr/>
+        </p:nvSpPr>
+        <p:spPr>
+          <a:xfrm>
+            <a:off x="5856995" y="1690409"/>
+            <a:ext cx="3132000" cy="216024"/>
+          </a:xfrm>
+          <a:prstGeom prst="rect">
+            <a:avLst/>
+          </a:prstGeom>
+          <a:ln w="12700"/>
+        </p:spPr>
+        <p:style>
+          <a:lnRef idx="2">
+            <a:schemeClr val="dk1"/>
+          </a:lnRef>
+          <a:fillRef idx="1">
+            <a:schemeClr val="lt1"/>
+          </a:fillRef>
+          <a:effectRef idx="0">
+            <a:schemeClr val="dk1"/>
+          </a:effectRef>
+          <a:fontRef idx="minor">
+            <a:schemeClr val="dk1"/>
+          </a:fontRef>
+        </p:style>
+        <p:txBody>
+          <a:bodyPr rtlCol="0" anchor="ctr"/>
+          <a:lstStyle/>
+          <a:p>
+            <a:r>
+              <a:rPr lang="fr-FR" sz="1200" dirty="0" smtClean="0"/>
+              <a:t>Information Right</a:t>
+            </a:r>
+            <a:endParaRPr lang="en-GB" sz="1200" dirty="0"/>
+          </a:p>
+        </p:txBody>
+      </p:sp>
+      <p:sp>
+        <p:nvSpPr>
+          <p:cNvPr id="135" name="Rectangle 134"/>
+          <p:cNvSpPr/>
+          <p:nvPr/>
+        </p:nvSpPr>
+        <p:spPr>
+          <a:xfrm>
+            <a:off x="4372074" y="4649931"/>
+            <a:ext cx="2304019" cy="1051242"/>
+          </a:xfrm>
+          <a:prstGeom prst="rect">
+            <a:avLst/>
+          </a:prstGeom>
+          <a:ln/>
+        </p:spPr>
+        <p:style>
+          <a:lnRef idx="0">
+            <a:schemeClr val="accent6"/>
+          </a:lnRef>
+          <a:fillRef idx="3">
+            <a:schemeClr val="accent6"/>
+          </a:fillRef>
+          <a:effectRef idx="3">
+            <a:schemeClr val="accent6"/>
+          </a:effectRef>
+          <a:fontRef idx="minor">
+            <a:schemeClr val="lt1"/>
+          </a:fontRef>
+        </p:style>
+        <p:txBody>
+          <a:bodyPr lIns="0" tIns="0" rIns="0" bIns="0" rtlCol="0" anchor="t"/>
+          <a:lstStyle/>
+          <a:p>
+            <a:pPr algn="ctr"/>
+            <a:r>
+              <a:rPr lang="en-US" sz="1400" b="1" dirty="0" smtClean="0">
+                <a:solidFill>
+                  <a:schemeClr val="tx1"/>
+                </a:solidFill>
+              </a:rPr>
+              <a:t>Geometric &amp; Ext. Elem. Ref.</a:t>
+            </a:r>
+            <a:endParaRPr lang="en-US" sz="1400" b="1" dirty="0">
+              <a:solidFill>
+                <a:schemeClr val="tx1"/>
+              </a:solidFill>
+            </a:endParaRPr>
+          </a:p>
+        </p:txBody>
+      </p:sp>
+      <p:sp>
+        <p:nvSpPr>
+          <p:cNvPr id="17" name="Rectangle 16"/>
+          <p:cNvSpPr/>
+          <p:nvPr/>
+        </p:nvSpPr>
+        <p:spPr>
+          <a:xfrm>
+            <a:off x="4506833" y="4905229"/>
+            <a:ext cx="2088000" cy="216024"/>
+          </a:xfrm>
+          <a:prstGeom prst="rect">
+            <a:avLst/>
+          </a:prstGeom>
+          <a:ln w="12700"/>
+        </p:spPr>
+        <p:style>
+          <a:lnRef idx="2">
+            <a:schemeClr val="dk1"/>
+          </a:lnRef>
+          <a:fillRef idx="1">
+            <a:schemeClr val="lt1"/>
+          </a:fillRef>
+          <a:effectRef idx="0">
+            <a:schemeClr val="dk1"/>
+          </a:effectRef>
+          <a:fontRef idx="minor">
+            <a:schemeClr val="dk1"/>
+          </a:fontRef>
+        </p:style>
+        <p:txBody>
+          <a:bodyPr rtlCol="0" anchor="ctr"/>
+          <a:lstStyle/>
+          <a:p>
+            <a:r>
+              <a:rPr lang="en-US" sz="1200" dirty="0">
+                <a:solidFill>
+                  <a:schemeClr val="dk1"/>
+                </a:solidFill>
+              </a:rPr>
+              <a:t>Geometric Shape</a:t>
+            </a:r>
+          </a:p>
+        </p:txBody>
+      </p:sp>
+      <p:sp>
+        <p:nvSpPr>
+          <p:cNvPr id="23" name="Rectangle 22"/>
+          <p:cNvSpPr/>
+          <p:nvPr/>
+        </p:nvSpPr>
+        <p:spPr>
+          <a:xfrm>
+            <a:off x="4506833" y="5163457"/>
+            <a:ext cx="2088000" cy="216024"/>
+          </a:xfrm>
+          <a:prstGeom prst="rect">
+            <a:avLst/>
+          </a:prstGeom>
+          <a:ln w="12700"/>
+        </p:spPr>
+        <p:style>
+          <a:lnRef idx="2">
+            <a:schemeClr val="dk1"/>
+          </a:lnRef>
+          <a:fillRef idx="1">
+            <a:schemeClr val="lt1"/>
+          </a:fillRef>
+          <a:effectRef idx="0">
+            <a:schemeClr val="dk1"/>
+          </a:effectRef>
+          <a:fontRef idx="minor">
+            <a:schemeClr val="dk1"/>
+          </a:fontRef>
+        </p:style>
+        <p:txBody>
+          <a:bodyPr rtlCol="0" anchor="ctr"/>
+          <a:lstStyle/>
+          <a:p>
+            <a:r>
+              <a:rPr lang="en-US" sz="1200" dirty="0">
+                <a:solidFill>
+                  <a:schemeClr val="dk1"/>
+                </a:solidFill>
+              </a:rPr>
+              <a:t>Presentation </a:t>
+            </a:r>
+            <a:r>
+              <a:rPr lang="en-US" sz="1200" dirty="0" smtClean="0">
+                <a:solidFill>
+                  <a:schemeClr val="dk1"/>
+                </a:solidFill>
+              </a:rPr>
+              <a:t>&amp; Draughting</a:t>
+            </a:r>
+            <a:endParaRPr lang="en-US" sz="1200" dirty="0">
+              <a:solidFill>
+                <a:schemeClr val="dk1"/>
+              </a:solidFill>
+            </a:endParaRPr>
+          </a:p>
+        </p:txBody>
+      </p:sp>
+      <p:sp>
+        <p:nvSpPr>
+          <p:cNvPr id="61" name="Rectangle 60"/>
+          <p:cNvSpPr/>
+          <p:nvPr/>
+        </p:nvSpPr>
+        <p:spPr>
+          <a:xfrm>
+            <a:off x="4506835" y="5430168"/>
+            <a:ext cx="2088000" cy="216024"/>
+          </a:xfrm>
+          <a:prstGeom prst="rect">
+            <a:avLst/>
+          </a:prstGeom>
+          <a:ln w="12700"/>
+        </p:spPr>
+        <p:style>
+          <a:lnRef idx="2">
+            <a:schemeClr val="dk1"/>
+          </a:lnRef>
+          <a:fillRef idx="1">
+            <a:schemeClr val="lt1"/>
+          </a:fillRef>
+          <a:effectRef idx="0">
+            <a:schemeClr val="dk1"/>
+          </a:effectRef>
+          <a:fontRef idx="minor">
+            <a:schemeClr val="dk1"/>
+          </a:fontRef>
+        </p:style>
+        <p:txBody>
+          <a:bodyPr rtlCol="0" anchor="ctr"/>
+          <a:lstStyle/>
+          <a:p>
+            <a:r>
+              <a:rPr lang="fr-FR" sz="1200" dirty="0" smtClean="0"/>
+              <a:t>External References</a:t>
+            </a:r>
+            <a:endParaRPr lang="en-GB" sz="1200" dirty="0"/>
+          </a:p>
+        </p:txBody>
+      </p:sp>
+      <p:sp>
+        <p:nvSpPr>
+          <p:cNvPr id="133" name="6-Point Star 132"/>
+          <p:cNvSpPr/>
+          <p:nvPr/>
+        </p:nvSpPr>
+        <p:spPr>
+          <a:xfrm>
+            <a:off x="8852556" y="4303677"/>
+            <a:ext cx="139910" cy="157498"/>
+          </a:xfrm>
+          <a:prstGeom prst="star6">
+            <a:avLst/>
+          </a:prstGeom>
+          <a:solidFill>
+            <a:schemeClr val="tx1"/>
+          </a:solidFill>
+          <a:ln>
+            <a:solidFill>
+              <a:schemeClr val="tx1"/>
+            </a:solidFill>
+          </a:ln>
+        </p:spPr>
+        <p:style>
+          <a:lnRef idx="2">
+            <a:schemeClr val="accent1">
+              <a:shade val="50000"/>
+            </a:schemeClr>
+          </a:lnRef>
+          <a:fillRef idx="1">
+            <a:schemeClr val="accent1"/>
+          </a:fillRef>
+          <a:effectRef idx="0">
+            <a:schemeClr val="accent1"/>
+          </a:effectRef>
+          <a:fontRef idx="minor">
+            <a:schemeClr val="lt1"/>
+          </a:fontRef>
+        </p:style>
+        <p:txBody>
+          <a:bodyPr rtlCol="0" anchor="ctr"/>
+          <a:lstStyle/>
+          <a:p>
+            <a:pPr algn="ctr"/>
+            <a:endParaRPr lang="en-GB"/>
+          </a:p>
+        </p:txBody>
+      </p:sp>
+    </p:spTree>
+    <p:extLst>
+      <p:ext uri="{BB962C8B-B14F-4D97-AF65-F5344CB8AC3E}">
+        <p14:creationId xmlns:p14="http://schemas.microsoft.com/office/powerpoint/2010/main" val="1545772609"/>
+      </p:ext>
+    </p:extLst>
+  </p:cSld>
+  <p:clrMapOvr>
+    <a:masterClrMapping/>
+  </p:clrMapOvr>
+  <p:timing>
+    <p:tnLst>
+      <p:par>
+        <p:cTn id="1" dur="indefinite" restart="never" nodeType="tmRoot"/>
+      </p:par>
+    </p:tnLst>
+  </p:timing>
+</p:sld>
+</file>
+
+<file path=ppt/slides/slide6.xml><?xml version="1.0" encoding="utf-8"?>
 <p:sld xmlns:a="http://schemas.openxmlformats.org/drawingml/2006/main" xmlns:r="http://schemas.openxmlformats.org/officeDocument/2006/relationships" xmlns:p="http://schemas.openxmlformats.org/presentationml/2006/main">
   <p:cSld>
     <p:spTree>

</xml_diff>

<commit_message>
Figure Capabilities overview: cap. without XML representation removed as response to Convenor comment
</commit_message>
<xml_diff>
--- a/data/business_object_models/managed_model_based_3d_engineering/dvlp/Overview_V6.pptx
+++ b/data/business_object_models/managed_model_based_3d_engineering/dvlp/Overview_V6.pptx
@@ -293,7 +293,7 @@
           <a:p>
             <a:fld id="{2724F6E8-1EEB-4BA2-8E05-81009CE2F19A}" type="datetimeFigureOut">
               <a:rPr lang="en-GB" smtClean="0"/>
-              <a:t>13/02/2013</a:t>
+              <a:t>21/02/2013</a:t>
             </a:fld>
             <a:endParaRPr lang="en-GB"/>
           </a:p>
@@ -463,7 +463,7 @@
           <a:p>
             <a:fld id="{2724F6E8-1EEB-4BA2-8E05-81009CE2F19A}" type="datetimeFigureOut">
               <a:rPr lang="en-GB" smtClean="0"/>
-              <a:t>13/02/2013</a:t>
+              <a:t>21/02/2013</a:t>
             </a:fld>
             <a:endParaRPr lang="en-GB"/>
           </a:p>
@@ -643,7 +643,7 @@
           <a:p>
             <a:fld id="{2724F6E8-1EEB-4BA2-8E05-81009CE2F19A}" type="datetimeFigureOut">
               <a:rPr lang="en-GB" smtClean="0"/>
-              <a:t>13/02/2013</a:t>
+              <a:t>21/02/2013</a:t>
             </a:fld>
             <a:endParaRPr lang="en-GB"/>
           </a:p>
@@ -813,7 +813,7 @@
           <a:p>
             <a:fld id="{2724F6E8-1EEB-4BA2-8E05-81009CE2F19A}" type="datetimeFigureOut">
               <a:rPr lang="en-GB" smtClean="0"/>
-              <a:t>13/02/2013</a:t>
+              <a:t>21/02/2013</a:t>
             </a:fld>
             <a:endParaRPr lang="en-GB"/>
           </a:p>
@@ -1059,7 +1059,7 @@
           <a:p>
             <a:fld id="{2724F6E8-1EEB-4BA2-8E05-81009CE2F19A}" type="datetimeFigureOut">
               <a:rPr lang="en-GB" smtClean="0"/>
-              <a:t>13/02/2013</a:t>
+              <a:t>21/02/2013</a:t>
             </a:fld>
             <a:endParaRPr lang="en-GB"/>
           </a:p>
@@ -1347,7 +1347,7 @@
           <a:p>
             <a:fld id="{2724F6E8-1EEB-4BA2-8E05-81009CE2F19A}" type="datetimeFigureOut">
               <a:rPr lang="en-GB" smtClean="0"/>
-              <a:t>13/02/2013</a:t>
+              <a:t>21/02/2013</a:t>
             </a:fld>
             <a:endParaRPr lang="en-GB"/>
           </a:p>
@@ -1769,7 +1769,7 @@
           <a:p>
             <a:fld id="{2724F6E8-1EEB-4BA2-8E05-81009CE2F19A}" type="datetimeFigureOut">
               <a:rPr lang="en-GB" smtClean="0"/>
-              <a:t>13/02/2013</a:t>
+              <a:t>21/02/2013</a:t>
             </a:fld>
             <a:endParaRPr lang="en-GB"/>
           </a:p>
@@ -1887,7 +1887,7 @@
           <a:p>
             <a:fld id="{2724F6E8-1EEB-4BA2-8E05-81009CE2F19A}" type="datetimeFigureOut">
               <a:rPr lang="en-GB" smtClean="0"/>
-              <a:t>13/02/2013</a:t>
+              <a:t>21/02/2013</a:t>
             </a:fld>
             <a:endParaRPr lang="en-GB"/>
           </a:p>
@@ -1982,7 +1982,7 @@
           <a:p>
             <a:fld id="{2724F6E8-1EEB-4BA2-8E05-81009CE2F19A}" type="datetimeFigureOut">
               <a:rPr lang="en-GB" smtClean="0"/>
-              <a:t>13/02/2013</a:t>
+              <a:t>21/02/2013</a:t>
             </a:fld>
             <a:endParaRPr lang="en-GB"/>
           </a:p>
@@ -2259,7 +2259,7 @@
           <a:p>
             <a:fld id="{2724F6E8-1EEB-4BA2-8E05-81009CE2F19A}" type="datetimeFigureOut">
               <a:rPr lang="en-GB" smtClean="0"/>
-              <a:t>13/02/2013</a:t>
+              <a:t>21/02/2013</a:t>
             </a:fld>
             <a:endParaRPr lang="en-GB"/>
           </a:p>
@@ -2512,7 +2512,7 @@
           <a:p>
             <a:fld id="{2724F6E8-1EEB-4BA2-8E05-81009CE2F19A}" type="datetimeFigureOut">
               <a:rPr lang="en-GB" smtClean="0"/>
-              <a:t>13/02/2013</a:t>
+              <a:t>21/02/2013</a:t>
             </a:fld>
             <a:endParaRPr lang="en-GB"/>
           </a:p>
@@ -2725,7 +2725,7 @@
           <a:p>
             <a:fld id="{2724F6E8-1EEB-4BA2-8E05-81009CE2F19A}" type="datetimeFigureOut">
               <a:rPr lang="en-GB" smtClean="0"/>
-              <a:t>13/02/2013</a:t>
+              <a:t>21/02/2013</a:t>
             </a:fld>
             <a:endParaRPr lang="en-GB"/>
           </a:p>
@@ -3100,290 +3100,9 @@
           <a:chExt cx="0" cy="0"/>
         </a:xfrm>
       </p:grpSpPr>
-      <p:sp>
-        <p:nvSpPr>
-          <p:cNvPr id="10" name="Rectangle 9"/>
-          <p:cNvSpPr/>
-          <p:nvPr/>
-        </p:nvSpPr>
-        <p:spPr>
-          <a:xfrm>
-            <a:off x="49564" y="6453936"/>
-            <a:ext cx="9036496" cy="359440"/>
-          </a:xfrm>
-          <a:prstGeom prst="rect">
-            <a:avLst/>
-          </a:prstGeom>
-        </p:spPr>
-        <p:style>
-          <a:lnRef idx="1">
-            <a:schemeClr val="dk1"/>
-          </a:lnRef>
-          <a:fillRef idx="2">
-            <a:schemeClr val="dk1"/>
-          </a:fillRef>
-          <a:effectRef idx="1">
-            <a:schemeClr val="dk1"/>
-          </a:effectRef>
-          <a:fontRef idx="minor">
-            <a:schemeClr val="dk1"/>
-          </a:fontRef>
-        </p:style>
-        <p:txBody>
-          <a:bodyPr rtlCol="0" anchor="ctr"/>
-          <a:lstStyle/>
-          <a:p>
-            <a:pPr algn="ctr"/>
-            <a:endParaRPr lang="en-GB"/>
-          </a:p>
-        </p:txBody>
-      </p:sp>
-      <p:sp>
-        <p:nvSpPr>
-          <p:cNvPr id="5" name="Rectangle 4"/>
-          <p:cNvSpPr/>
-          <p:nvPr/>
-        </p:nvSpPr>
-        <p:spPr>
-          <a:xfrm>
-            <a:off x="125861" y="6564066"/>
-            <a:ext cx="288000" cy="180000"/>
-          </a:xfrm>
-          <a:prstGeom prst="rect">
-            <a:avLst/>
-          </a:prstGeom>
-          <a:ln/>
-        </p:spPr>
-        <p:style>
-          <a:lnRef idx="0">
-            <a:schemeClr val="accent6"/>
-          </a:lnRef>
-          <a:fillRef idx="3">
-            <a:schemeClr val="accent6"/>
-          </a:fillRef>
-          <a:effectRef idx="3">
-            <a:schemeClr val="accent6"/>
-          </a:effectRef>
-          <a:fontRef idx="minor">
-            <a:schemeClr val="lt1"/>
-          </a:fontRef>
-        </p:style>
-        <p:txBody>
-          <a:bodyPr lIns="0" tIns="0" rIns="0" bIns="0" rtlCol="0" anchor="t"/>
-          <a:lstStyle/>
-          <a:p>
-            <a:pPr algn="ctr"/>
-            <a:endParaRPr lang="en-US" sz="1400" b="1">
-              <a:solidFill>
-                <a:schemeClr val="tx1"/>
-              </a:solidFill>
-            </a:endParaRPr>
-          </a:p>
-        </p:txBody>
-      </p:sp>
-      <p:sp>
-        <p:nvSpPr>
-          <p:cNvPr id="6" name="6-Point Star 5"/>
-          <p:cNvSpPr/>
-          <p:nvPr/>
-        </p:nvSpPr>
-        <p:spPr>
-          <a:xfrm>
-            <a:off x="6893622" y="6575317"/>
-            <a:ext cx="139910" cy="157498"/>
-          </a:xfrm>
-          <a:prstGeom prst="star6">
-            <a:avLst/>
-          </a:prstGeom>
-          <a:solidFill>
-            <a:schemeClr val="tx1"/>
-          </a:solidFill>
-          <a:ln>
-            <a:solidFill>
-              <a:schemeClr val="tx1"/>
-            </a:solidFill>
-          </a:ln>
-        </p:spPr>
-        <p:style>
-          <a:lnRef idx="2">
-            <a:schemeClr val="accent1">
-              <a:shade val="50000"/>
-            </a:schemeClr>
-          </a:lnRef>
-          <a:fillRef idx="1">
-            <a:schemeClr val="accent1"/>
-          </a:fillRef>
-          <a:effectRef idx="0">
-            <a:schemeClr val="accent1"/>
-          </a:effectRef>
-          <a:fontRef idx="minor">
-            <a:schemeClr val="lt1"/>
-          </a:fontRef>
-        </p:style>
-        <p:txBody>
-          <a:bodyPr rtlCol="0" anchor="ctr"/>
-          <a:lstStyle/>
-          <a:p>
-            <a:pPr algn="ctr"/>
-            <a:endParaRPr lang="en-US"/>
-          </a:p>
-        </p:txBody>
-      </p:sp>
-      <p:sp>
-        <p:nvSpPr>
-          <p:cNvPr id="7" name="TextBox 6"/>
-          <p:cNvSpPr txBox="1"/>
-          <p:nvPr/>
-        </p:nvSpPr>
-        <p:spPr>
-          <a:xfrm>
-            <a:off x="389617" y="6405810"/>
-            <a:ext cx="2377574" cy="383503"/>
-          </a:xfrm>
-          <a:prstGeom prst="rect">
-            <a:avLst/>
-          </a:prstGeom>
-          <a:noFill/>
-        </p:spPr>
-        <p:txBody>
-          <a:bodyPr wrap="none" rtlCol="0">
-            <a:spAutoFit/>
-          </a:bodyPr>
-          <a:lstStyle/>
-          <a:p>
-            <a:pPr>
-              <a:lnSpc>
-                <a:spcPct val="200000"/>
-              </a:lnSpc>
-            </a:pPr>
-            <a:r>
-              <a:rPr lang="en-US" sz="1100" dirty="0"/>
-              <a:t>C</a:t>
-            </a:r>
-            <a:r>
-              <a:rPr lang="en-US" sz="1100" dirty="0" smtClean="0"/>
-              <a:t>apability with an XML representation</a:t>
-            </a:r>
-          </a:p>
-        </p:txBody>
-      </p:sp>
-      <p:sp>
-        <p:nvSpPr>
-          <p:cNvPr id="8" name="Rectangle 7"/>
-          <p:cNvSpPr/>
-          <p:nvPr/>
-        </p:nvSpPr>
-        <p:spPr>
-          <a:xfrm>
-            <a:off x="3228124" y="6564066"/>
-            <a:ext cx="288000" cy="180000"/>
-          </a:xfrm>
-          <a:prstGeom prst="rect">
-            <a:avLst/>
-          </a:prstGeom>
-          <a:ln/>
-        </p:spPr>
-        <p:style>
-          <a:lnRef idx="0">
-            <a:schemeClr val="accent5"/>
-          </a:lnRef>
-          <a:fillRef idx="3">
-            <a:schemeClr val="accent5"/>
-          </a:fillRef>
-          <a:effectRef idx="3">
-            <a:schemeClr val="accent5"/>
-          </a:effectRef>
-          <a:fontRef idx="minor">
-            <a:schemeClr val="lt1"/>
-          </a:fontRef>
-        </p:style>
-        <p:txBody>
-          <a:bodyPr lIns="0" tIns="0" rIns="0" bIns="0" rtlCol="0" anchor="ctr"/>
-          <a:lstStyle/>
-          <a:p>
-            <a:pPr algn="ctr"/>
-            <a:endParaRPr lang="en-US" sz="1400" b="1">
-              <a:solidFill>
-                <a:schemeClr val="tx1"/>
-              </a:solidFill>
-            </a:endParaRPr>
-          </a:p>
-        </p:txBody>
-      </p:sp>
-      <p:sp>
-        <p:nvSpPr>
-          <p:cNvPr id="4" name="Rectangle 3"/>
-          <p:cNvSpPr/>
-          <p:nvPr/>
-        </p:nvSpPr>
-        <p:spPr>
-          <a:xfrm>
-            <a:off x="3491880" y="6405810"/>
-            <a:ext cx="2880320" cy="383503"/>
-          </a:xfrm>
-          <a:prstGeom prst="rect">
-            <a:avLst/>
-          </a:prstGeom>
-        </p:spPr>
-        <p:txBody>
-          <a:bodyPr wrap="square">
-            <a:spAutoFit/>
-          </a:bodyPr>
-          <a:lstStyle/>
-          <a:p>
-            <a:pPr>
-              <a:lnSpc>
-                <a:spcPct val="200000"/>
-              </a:lnSpc>
-            </a:pPr>
-            <a:r>
-              <a:rPr lang="en-US" sz="1100" dirty="0"/>
-              <a:t>Capability without an XML </a:t>
-            </a:r>
-            <a:r>
-              <a:rPr lang="en-US" sz="1100" dirty="0" smtClean="0"/>
-              <a:t>representation</a:t>
-            </a:r>
-            <a:endParaRPr lang="en-US" sz="1100" dirty="0"/>
-          </a:p>
-        </p:txBody>
-      </p:sp>
-      <p:sp>
-        <p:nvSpPr>
-          <p:cNvPr id="9" name="Rectangle 8"/>
-          <p:cNvSpPr/>
-          <p:nvPr/>
-        </p:nvSpPr>
-        <p:spPr>
-          <a:xfrm>
-            <a:off x="7021274" y="6405810"/>
-            <a:ext cx="2082621" cy="383503"/>
-          </a:xfrm>
-          <a:prstGeom prst="rect">
-            <a:avLst/>
-          </a:prstGeom>
-        </p:spPr>
-        <p:txBody>
-          <a:bodyPr wrap="none">
-            <a:spAutoFit/>
-          </a:bodyPr>
-          <a:lstStyle/>
-          <a:p>
-            <a:pPr>
-              <a:lnSpc>
-                <a:spcPct val="200000"/>
-              </a:lnSpc>
-            </a:pPr>
-            <a:r>
-              <a:rPr lang="en-US" sz="1100" dirty="0"/>
-              <a:t>Capability not part of this version</a:t>
-            </a:r>
-          </a:p>
-        </p:txBody>
-      </p:sp>
       <p:pic>
         <p:nvPicPr>
-          <p:cNvPr id="1026" name="Picture 2"/>
+          <p:cNvPr id="2" name="Picture 2"/>
           <p:cNvPicPr>
             <a:picLocks noChangeAspect="1" noChangeArrowheads="1"/>
           </p:cNvPicPr>
@@ -3404,15 +3123,18 @@
         </p:blipFill>
         <p:spPr bwMode="auto">
           <a:xfrm>
-            <a:off x="261890" y="-42863"/>
-            <a:ext cx="8611844" cy="6512485"/>
+            <a:off x="261890" y="-42864"/>
+            <a:ext cx="8611844" cy="6353171"/>
           </a:xfrm>
           <a:prstGeom prst="rect">
             <a:avLst/>
           </a:prstGeom>
           <a:noFill/>
-          <a:ln>
+          <a:ln w="9525">
             <a:noFill/>
+            <a:miter lim="800000"/>
+            <a:headEnd/>
+            <a:tailEnd/>
           </a:ln>
           <a:effectLst/>
           <a:extLst>
@@ -3422,16 +3144,6 @@
                   <a:schemeClr val="accent1"/>
                 </a:solidFill>
               </a14:hiddenFill>
-            </a:ext>
-            <a:ext uri="{91240B29-F687-4F45-9708-019B960494DF}">
-              <a14:hiddenLine xmlns:a14="http://schemas.microsoft.com/office/drawing/2010/main" w="9525">
-                <a:solidFill>
-                  <a:schemeClr val="tx1"/>
-                </a:solidFill>
-                <a:miter lim="800000"/>
-                <a:headEnd/>
-                <a:tailEnd/>
-              </a14:hiddenLine>
             </a:ext>
             <a:ext uri="{AF507438-7753-43E0-B8FC-AC1667EBCBE1}">
               <a14:hiddenEffects xmlns:a14="http://schemas.microsoft.com/office/drawing/2010/main">
@@ -3445,6 +3157,221 @@
           </a:extLst>
         </p:spPr>
       </p:pic>
+      <p:grpSp>
+        <p:nvGrpSpPr>
+          <p:cNvPr id="3" name="Gruppieren 2"/>
+          <p:cNvGrpSpPr/>
+          <p:nvPr/>
+        </p:nvGrpSpPr>
+        <p:grpSpPr>
+          <a:xfrm>
+            <a:off x="1637694" y="6405810"/>
+            <a:ext cx="5868613" cy="407566"/>
+            <a:chOff x="49564" y="6405810"/>
+            <a:chExt cx="5868613" cy="407566"/>
+          </a:xfrm>
+        </p:grpSpPr>
+        <p:sp>
+          <p:nvSpPr>
+            <p:cNvPr id="10" name="Rectangle 9"/>
+            <p:cNvSpPr/>
+            <p:nvPr/>
+          </p:nvSpPr>
+          <p:spPr>
+            <a:xfrm>
+              <a:off x="49564" y="6453936"/>
+              <a:ext cx="5818580" cy="359440"/>
+            </a:xfrm>
+            <a:prstGeom prst="rect">
+              <a:avLst/>
+            </a:prstGeom>
+          </p:spPr>
+          <p:style>
+            <a:lnRef idx="1">
+              <a:schemeClr val="dk1"/>
+            </a:lnRef>
+            <a:fillRef idx="2">
+              <a:schemeClr val="dk1"/>
+            </a:fillRef>
+            <a:effectRef idx="1">
+              <a:schemeClr val="dk1"/>
+            </a:effectRef>
+            <a:fontRef idx="minor">
+              <a:schemeClr val="dk1"/>
+            </a:fontRef>
+          </p:style>
+          <p:txBody>
+            <a:bodyPr rtlCol="0" anchor="ctr"/>
+            <a:lstStyle/>
+            <a:p>
+              <a:pPr algn="ctr"/>
+              <a:endParaRPr lang="en-GB"/>
+            </a:p>
+          </p:txBody>
+        </p:sp>
+        <p:sp>
+          <p:nvSpPr>
+            <p:cNvPr id="5" name="Rectangle 4"/>
+            <p:cNvSpPr/>
+            <p:nvPr/>
+          </p:nvSpPr>
+          <p:spPr>
+            <a:xfrm>
+              <a:off x="125861" y="6564066"/>
+              <a:ext cx="288000" cy="180000"/>
+            </a:xfrm>
+            <a:prstGeom prst="rect">
+              <a:avLst/>
+            </a:prstGeom>
+            <a:ln/>
+          </p:spPr>
+          <p:style>
+            <a:lnRef idx="0">
+              <a:schemeClr val="accent6"/>
+            </a:lnRef>
+            <a:fillRef idx="3">
+              <a:schemeClr val="accent6"/>
+            </a:fillRef>
+            <a:effectRef idx="3">
+              <a:schemeClr val="accent6"/>
+            </a:effectRef>
+            <a:fontRef idx="minor">
+              <a:schemeClr val="lt1"/>
+            </a:fontRef>
+          </p:style>
+          <p:txBody>
+            <a:bodyPr lIns="0" tIns="0" rIns="0" bIns="0" rtlCol="0" anchor="t"/>
+            <a:lstStyle/>
+            <a:p>
+              <a:pPr algn="ctr"/>
+              <a:endParaRPr lang="en-US" sz="1400" b="1">
+                <a:solidFill>
+                  <a:schemeClr val="tx1"/>
+                </a:solidFill>
+              </a:endParaRPr>
+            </a:p>
+          </p:txBody>
+        </p:sp>
+        <p:sp>
+          <p:nvSpPr>
+            <p:cNvPr id="6" name="6-Point Star 5"/>
+            <p:cNvSpPr/>
+            <p:nvPr/>
+          </p:nvSpPr>
+          <p:spPr>
+            <a:xfrm>
+              <a:off x="3707904" y="6575317"/>
+              <a:ext cx="139910" cy="157498"/>
+            </a:xfrm>
+            <a:prstGeom prst="star6">
+              <a:avLst/>
+            </a:prstGeom>
+            <a:solidFill>
+              <a:schemeClr val="tx1"/>
+            </a:solidFill>
+            <a:ln>
+              <a:solidFill>
+                <a:schemeClr val="tx1"/>
+              </a:solidFill>
+            </a:ln>
+          </p:spPr>
+          <p:style>
+            <a:lnRef idx="2">
+              <a:schemeClr val="accent1">
+                <a:shade val="50000"/>
+              </a:schemeClr>
+            </a:lnRef>
+            <a:fillRef idx="1">
+              <a:schemeClr val="accent1"/>
+            </a:fillRef>
+            <a:effectRef idx="0">
+              <a:schemeClr val="accent1"/>
+            </a:effectRef>
+            <a:fontRef idx="minor">
+              <a:schemeClr val="lt1"/>
+            </a:fontRef>
+          </p:style>
+          <p:txBody>
+            <a:bodyPr rtlCol="0" anchor="ctr"/>
+            <a:lstStyle/>
+            <a:p>
+              <a:pPr algn="ctr"/>
+              <a:endParaRPr lang="en-US"/>
+            </a:p>
+          </p:txBody>
+        </p:sp>
+        <p:sp>
+          <p:nvSpPr>
+            <p:cNvPr id="7" name="TextBox 6"/>
+            <p:cNvSpPr txBox="1"/>
+            <p:nvPr/>
+          </p:nvSpPr>
+          <p:spPr>
+            <a:xfrm>
+              <a:off x="389617" y="6405810"/>
+              <a:ext cx="2377574" cy="383503"/>
+            </a:xfrm>
+            <a:prstGeom prst="rect">
+              <a:avLst/>
+            </a:prstGeom>
+            <a:noFill/>
+          </p:spPr>
+          <p:txBody>
+            <a:bodyPr wrap="none" rtlCol="0">
+              <a:spAutoFit/>
+            </a:bodyPr>
+            <a:lstStyle/>
+            <a:p>
+              <a:pPr>
+                <a:lnSpc>
+                  <a:spcPct val="200000"/>
+                </a:lnSpc>
+              </a:pPr>
+              <a:r>
+                <a:rPr lang="en-US" sz="1100" dirty="0"/>
+                <a:t>C</a:t>
+              </a:r>
+              <a:r>
+                <a:rPr lang="en-US" sz="1100" dirty="0" smtClean="0"/>
+                <a:t>apability with an XML representation</a:t>
+              </a:r>
+            </a:p>
+          </p:txBody>
+        </p:sp>
+        <p:sp>
+          <p:nvSpPr>
+            <p:cNvPr id="9" name="Rectangle 8"/>
+            <p:cNvSpPr/>
+            <p:nvPr/>
+          </p:nvSpPr>
+          <p:spPr>
+            <a:xfrm>
+              <a:off x="3835556" y="6405810"/>
+              <a:ext cx="2082621" cy="383503"/>
+            </a:xfrm>
+            <a:prstGeom prst="rect">
+              <a:avLst/>
+            </a:prstGeom>
+          </p:spPr>
+          <p:txBody>
+            <a:bodyPr wrap="none">
+              <a:spAutoFit/>
+            </a:bodyPr>
+            <a:lstStyle/>
+            <a:p>
+              <a:pPr>
+                <a:lnSpc>
+                  <a:spcPct val="200000"/>
+                </a:lnSpc>
+              </a:pPr>
+              <a:r>
+                <a:rPr lang="en-US" sz="1100" dirty="0"/>
+                <a:t>Capability not part of this version</a:t>
+              </a:r>
+            </a:p>
+          </p:txBody>
+        </p:sp>
+      </p:grpSp>
     </p:spTree>
     <p:extLst>
       <p:ext uri="{BB962C8B-B14F-4D97-AF65-F5344CB8AC3E}">
@@ -3729,14 +3656,14 @@
       </p:cxnSp>
       <p:cxnSp>
         <p:nvCxnSpPr>
-          <p:cNvPr id="136" name="Straight Connector 135"/>
+          <p:cNvPr id="129" name="Straight Connector 128"/>
           <p:cNvCxnSpPr/>
           <p:nvPr/>
         </p:nvCxnSpPr>
         <p:spPr>
           <a:xfrm>
-            <a:off x="3419872" y="3814578"/>
-            <a:ext cx="944540" cy="2185608"/>
+            <a:off x="3133920" y="3691917"/>
+            <a:ext cx="69928" cy="2308269"/>
           </a:xfrm>
           <a:prstGeom prst="line">
             <a:avLst/>
@@ -3764,14 +3691,14 @@
       </p:cxnSp>
       <p:cxnSp>
         <p:nvCxnSpPr>
-          <p:cNvPr id="129" name="Straight Connector 128"/>
+          <p:cNvPr id="127" name="Straight Connector 126"/>
           <p:cNvCxnSpPr/>
           <p:nvPr/>
         </p:nvCxnSpPr>
         <p:spPr>
-          <a:xfrm>
-            <a:off x="3133920" y="3691917"/>
-            <a:ext cx="69928" cy="2308269"/>
+          <a:xfrm flipV="1">
+            <a:off x="3948674" y="505246"/>
+            <a:ext cx="638292" cy="2301206"/>
           </a:xfrm>
           <a:prstGeom prst="line">
             <a:avLst/>
@@ -3799,14 +3726,14 @@
       </p:cxnSp>
       <p:cxnSp>
         <p:nvCxnSpPr>
-          <p:cNvPr id="127" name="Straight Connector 126"/>
+          <p:cNvPr id="124" name="Straight Connector 123"/>
           <p:cNvCxnSpPr/>
           <p:nvPr/>
         </p:nvCxnSpPr>
         <p:spPr>
-          <a:xfrm flipV="1">
-            <a:off x="3948674" y="505246"/>
-            <a:ext cx="638292" cy="2301206"/>
+          <a:xfrm flipH="1" flipV="1">
+            <a:off x="3016164" y="2094892"/>
+            <a:ext cx="178536" cy="845744"/>
           </a:xfrm>
           <a:prstGeom prst="line">
             <a:avLst/>
@@ -3834,14 +3761,14 @@
       </p:cxnSp>
       <p:cxnSp>
         <p:nvCxnSpPr>
-          <p:cNvPr id="124" name="Straight Connector 123"/>
+          <p:cNvPr id="122" name="Straight Connector 121"/>
           <p:cNvCxnSpPr/>
           <p:nvPr/>
         </p:nvCxnSpPr>
         <p:spPr>
-          <a:xfrm flipH="1" flipV="1">
-            <a:off x="3016164" y="2094892"/>
-            <a:ext cx="178536" cy="845744"/>
+          <a:xfrm flipH="1">
+            <a:off x="1679665" y="3501008"/>
+            <a:ext cx="963920" cy="0"/>
           </a:xfrm>
           <a:prstGeom prst="line">
             <a:avLst/>
@@ -3869,14 +3796,14 @@
       </p:cxnSp>
       <p:cxnSp>
         <p:nvCxnSpPr>
-          <p:cNvPr id="122" name="Straight Connector 121"/>
+          <p:cNvPr id="120" name="Straight Connector 119"/>
           <p:cNvCxnSpPr/>
           <p:nvPr/>
         </p:nvCxnSpPr>
         <p:spPr>
           <a:xfrm flipH="1">
-            <a:off x="1679665" y="3501008"/>
-            <a:ext cx="963920" cy="0"/>
+            <a:off x="1957293" y="3649408"/>
+            <a:ext cx="696268" cy="1291760"/>
           </a:xfrm>
           <a:prstGeom prst="line">
             <a:avLst/>
@@ -3904,14 +3831,14 @@
       </p:cxnSp>
       <p:cxnSp>
         <p:nvCxnSpPr>
-          <p:cNvPr id="120" name="Straight Connector 119"/>
+          <p:cNvPr id="2052" name="Straight Connector 2051"/>
           <p:cNvCxnSpPr/>
           <p:nvPr/>
         </p:nvCxnSpPr>
         <p:spPr>
           <a:xfrm flipH="1">
-            <a:off x="1957293" y="3649408"/>
-            <a:ext cx="696268" cy="1291760"/>
+            <a:off x="2267744" y="3852054"/>
+            <a:ext cx="531115" cy="2062077"/>
           </a:xfrm>
           <a:prstGeom prst="line">
             <a:avLst/>
@@ -3937,86 +3864,6 @@
           </a:fontRef>
         </p:style>
       </p:cxnSp>
-      <p:cxnSp>
-        <p:nvCxnSpPr>
-          <p:cNvPr id="2052" name="Straight Connector 2051"/>
-          <p:cNvCxnSpPr/>
-          <p:nvPr/>
-        </p:nvCxnSpPr>
-        <p:spPr>
-          <a:xfrm flipH="1">
-            <a:off x="2267744" y="3852054"/>
-            <a:ext cx="531115" cy="2062077"/>
-          </a:xfrm>
-          <a:prstGeom prst="line">
-            <a:avLst/>
-          </a:prstGeom>
-          <a:ln w="28575">
-            <a:solidFill>
-              <a:schemeClr val="tx1"/>
-            </a:solidFill>
-          </a:ln>
-        </p:spPr>
-        <p:style>
-          <a:lnRef idx="1">
-            <a:schemeClr val="accent1"/>
-          </a:lnRef>
-          <a:fillRef idx="0">
-            <a:schemeClr val="accent1"/>
-          </a:fillRef>
-          <a:effectRef idx="0">
-            <a:schemeClr val="accent1"/>
-          </a:effectRef>
-          <a:fontRef idx="minor">
-            <a:schemeClr val="tx1"/>
-          </a:fontRef>
-        </p:style>
-      </p:cxnSp>
-      <p:sp>
-        <p:nvSpPr>
-          <p:cNvPr id="29" name="Rounded Rectangle 28"/>
-          <p:cNvSpPr/>
-          <p:nvPr/>
-        </p:nvSpPr>
-        <p:spPr>
-          <a:xfrm>
-            <a:off x="4243863" y="5787421"/>
-            <a:ext cx="3300300" cy="1041353"/>
-          </a:xfrm>
-          <a:prstGeom prst="roundRect">
-            <a:avLst>
-              <a:gd name="adj" fmla="val 3894"/>
-            </a:avLst>
-          </a:prstGeom>
-          <a:solidFill>
-            <a:schemeClr val="bg1"/>
-          </a:solidFill>
-        </p:spPr>
-        <p:style>
-          <a:lnRef idx="2">
-            <a:schemeClr val="accent1">
-              <a:shade val="50000"/>
-            </a:schemeClr>
-          </a:lnRef>
-          <a:fillRef idx="1">
-            <a:schemeClr val="accent1"/>
-          </a:fillRef>
-          <a:effectRef idx="0">
-            <a:schemeClr val="accent1"/>
-          </a:effectRef>
-          <a:fontRef idx="minor">
-            <a:schemeClr val="lt1"/>
-          </a:fontRef>
-        </p:style>
-        <p:txBody>
-          <a:bodyPr rtlCol="0" anchor="ctr"/>
-          <a:lstStyle/>
-          <a:p>
-            <a:pPr algn="ctr"/>
-            <a:endParaRPr lang="en-GB"/>
-          </a:p>
-        </p:txBody>
-      </p:sp>
       <p:sp>
         <p:nvSpPr>
           <p:cNvPr id="4" name="Rectangle 3"/>
@@ -4687,165 +4534,6 @@
                 </a:solidFill>
               </a:rPr>
               <a:t>Rules and Requirements</a:t>
-            </a:r>
-            <a:endParaRPr lang="en-US" sz="1400" b="1" dirty="0">
-              <a:solidFill>
-                <a:schemeClr val="tx1"/>
-              </a:solidFill>
-            </a:endParaRPr>
-          </a:p>
-        </p:txBody>
-      </p:sp>
-      <p:sp>
-        <p:nvSpPr>
-          <p:cNvPr id="18" name="Rectangle 17"/>
-          <p:cNvSpPr/>
-          <p:nvPr/>
-        </p:nvSpPr>
-        <p:spPr>
-          <a:xfrm>
-            <a:off x="4320806" y="6485164"/>
-            <a:ext cx="1932009" cy="252000"/>
-          </a:xfrm>
-          <a:prstGeom prst="rect">
-            <a:avLst/>
-          </a:prstGeom>
-          <a:ln/>
-        </p:spPr>
-        <p:style>
-          <a:lnRef idx="0">
-            <a:schemeClr val="accent5"/>
-          </a:lnRef>
-          <a:fillRef idx="3">
-            <a:schemeClr val="accent5"/>
-          </a:fillRef>
-          <a:effectRef idx="3">
-            <a:schemeClr val="accent5"/>
-          </a:effectRef>
-          <a:fontRef idx="minor">
-            <a:schemeClr val="lt1"/>
-          </a:fontRef>
-        </p:style>
-        <p:txBody>
-          <a:bodyPr lIns="0" tIns="0" rIns="0" bIns="0" rtlCol="0" anchor="ctr"/>
-          <a:lstStyle/>
-          <a:p>
-            <a:pPr algn="ctr"/>
-            <a:r>
-              <a:rPr lang="en-US" sz="1400" b="1" dirty="0" smtClean="0">
-                <a:solidFill>
-                  <a:schemeClr val="tx1"/>
-                </a:solidFill>
-              </a:rPr>
-              <a:t>Machining Features</a:t>
-            </a:r>
-            <a:endParaRPr lang="en-US" sz="1400" b="1" dirty="0">
-              <a:solidFill>
-                <a:schemeClr val="tx1"/>
-              </a:solidFill>
-            </a:endParaRPr>
-          </a:p>
-        </p:txBody>
-      </p:sp>
-      <p:sp>
-        <p:nvSpPr>
-          <p:cNvPr id="19" name="Rectangle 18"/>
-          <p:cNvSpPr/>
-          <p:nvPr/>
-        </p:nvSpPr>
-        <p:spPr>
-          <a:xfrm>
-            <a:off x="4788024" y="5865093"/>
-            <a:ext cx="2297222" cy="554770"/>
-          </a:xfrm>
-          <a:prstGeom prst="rect">
-            <a:avLst/>
-          </a:prstGeom>
-          <a:ln/>
-        </p:spPr>
-        <p:style>
-          <a:lnRef idx="0">
-            <a:schemeClr val="accent5"/>
-          </a:lnRef>
-          <a:fillRef idx="3">
-            <a:schemeClr val="accent5"/>
-          </a:fillRef>
-          <a:effectRef idx="3">
-            <a:schemeClr val="accent5"/>
-          </a:effectRef>
-          <a:fontRef idx="minor">
-            <a:schemeClr val="lt1"/>
-          </a:fontRef>
-        </p:style>
-        <p:txBody>
-          <a:bodyPr lIns="0" tIns="0" rIns="0" bIns="0" rtlCol="0" anchor="ctr"/>
-          <a:lstStyle/>
-          <a:p>
-            <a:pPr algn="ctr"/>
-            <a:r>
-              <a:rPr lang="en-US" sz="1400" b="1" dirty="0" smtClean="0">
-                <a:solidFill>
-                  <a:schemeClr val="tx1"/>
-                </a:solidFill>
-              </a:rPr>
-              <a:t>3D Parametrics &amp;</a:t>
-            </a:r>
-          </a:p>
-          <a:p>
-            <a:pPr algn="ctr"/>
-            <a:r>
-              <a:rPr lang="en-US" sz="1400" b="1" dirty="0" smtClean="0">
-                <a:solidFill>
-                  <a:schemeClr val="tx1"/>
-                </a:solidFill>
-              </a:rPr>
-              <a:t>Geometric Constraints Design</a:t>
-            </a:r>
-          </a:p>
-        </p:txBody>
-      </p:sp>
-      <p:sp>
-        <p:nvSpPr>
-          <p:cNvPr id="24" name="Rectangle 23"/>
-          <p:cNvSpPr/>
-          <p:nvPr/>
-        </p:nvSpPr>
-        <p:spPr>
-          <a:xfrm>
-            <a:off x="6358035" y="6485164"/>
-            <a:ext cx="1094285" cy="252000"/>
-          </a:xfrm>
-          <a:prstGeom prst="rect">
-            <a:avLst/>
-          </a:prstGeom>
-          <a:ln/>
-        </p:spPr>
-        <p:style>
-          <a:lnRef idx="0">
-            <a:schemeClr val="accent5"/>
-          </a:lnRef>
-          <a:fillRef idx="3">
-            <a:schemeClr val="accent5"/>
-          </a:fillRef>
-          <a:effectRef idx="3">
-            <a:schemeClr val="accent5"/>
-          </a:effectRef>
-          <a:fontRef idx="minor">
-            <a:schemeClr val="lt1"/>
-          </a:fontRef>
-        </p:style>
-        <p:txBody>
-          <a:bodyPr lIns="0" tIns="0" rIns="0" bIns="0" rtlCol="0" anchor="ctr"/>
-          <a:lstStyle/>
-          <a:p>
-            <a:pPr algn="ctr"/>
-            <a:r>
-              <a:rPr lang="en-US" sz="1400" b="1" dirty="0" smtClean="0">
-                <a:solidFill>
-                  <a:schemeClr val="tx1"/>
-                </a:solidFill>
-              </a:rPr>
-              <a:t>GD&amp;T</a:t>
             </a:r>
             <a:endParaRPr lang="en-US" sz="1400" b="1" dirty="0">
               <a:solidFill>
@@ -6083,102 +5771,6 @@
         <p:spPr>
           <a:xfrm>
             <a:off x="8850049" y="4025793"/>
-            <a:ext cx="139910" cy="157498"/>
-          </a:xfrm>
-          <a:prstGeom prst="star6">
-            <a:avLst/>
-          </a:prstGeom>
-          <a:solidFill>
-            <a:schemeClr val="tx1"/>
-          </a:solidFill>
-          <a:ln>
-            <a:solidFill>
-              <a:schemeClr val="tx1"/>
-            </a:solidFill>
-          </a:ln>
-        </p:spPr>
-        <p:style>
-          <a:lnRef idx="2">
-            <a:schemeClr val="accent1">
-              <a:shade val="50000"/>
-            </a:schemeClr>
-          </a:lnRef>
-          <a:fillRef idx="1">
-            <a:schemeClr val="accent1"/>
-          </a:fillRef>
-          <a:effectRef idx="0">
-            <a:schemeClr val="accent1"/>
-          </a:effectRef>
-          <a:fontRef idx="minor">
-            <a:schemeClr val="lt1"/>
-          </a:fontRef>
-        </p:style>
-        <p:txBody>
-          <a:bodyPr rtlCol="0" anchor="ctr"/>
-          <a:lstStyle/>
-          <a:p>
-            <a:pPr algn="ctr"/>
-            <a:endParaRPr lang="en-GB"/>
-          </a:p>
-        </p:txBody>
-      </p:sp>
-      <p:sp>
-        <p:nvSpPr>
-          <p:cNvPr id="70" name="6-Point Star 69"/>
-          <p:cNvSpPr/>
-          <p:nvPr/>
-        </p:nvSpPr>
-        <p:spPr>
-          <a:xfrm>
-            <a:off x="6075057" y="6540443"/>
-            <a:ext cx="139910" cy="157498"/>
-          </a:xfrm>
-          <a:prstGeom prst="star6">
-            <a:avLst/>
-          </a:prstGeom>
-          <a:solidFill>
-            <a:schemeClr val="tx1"/>
-          </a:solidFill>
-          <a:ln>
-            <a:solidFill>
-              <a:schemeClr val="tx1"/>
-            </a:solidFill>
-          </a:ln>
-        </p:spPr>
-        <p:style>
-          <a:lnRef idx="2">
-            <a:schemeClr val="accent1">
-              <a:shade val="50000"/>
-            </a:schemeClr>
-          </a:lnRef>
-          <a:fillRef idx="1">
-            <a:schemeClr val="accent1"/>
-          </a:fillRef>
-          <a:effectRef idx="0">
-            <a:schemeClr val="accent1"/>
-          </a:effectRef>
-          <a:fontRef idx="minor">
-            <a:schemeClr val="lt1"/>
-          </a:fontRef>
-        </p:style>
-        <p:txBody>
-          <a:bodyPr rtlCol="0" anchor="ctr"/>
-          <a:lstStyle/>
-          <a:p>
-            <a:pPr algn="ctr"/>
-            <a:endParaRPr lang="en-GB"/>
-          </a:p>
-        </p:txBody>
-      </p:sp>
-      <p:sp>
-        <p:nvSpPr>
-          <p:cNvPr id="71" name="6-Point Star 70"/>
-          <p:cNvSpPr/>
-          <p:nvPr/>
-        </p:nvSpPr>
-        <p:spPr>
-          <a:xfrm>
-            <a:off x="7252450" y="6547477"/>
             <a:ext cx="139910" cy="157498"/>
           </a:xfrm>
           <a:prstGeom prst="star6">

</xml_diff>

<commit_message>
Figure updated to show DIS capabilities, only
</commit_message>
<xml_diff>
--- a/data/business_object_models/managed_model_based_3d_engineering/dvlp/Overview_V6.pptx
+++ b/data/business_object_models/managed_model_based_3d_engineering/dvlp/Overview_V6.pptx
@@ -293,7 +293,7 @@
           <a:p>
             <a:fld id="{2724F6E8-1EEB-4BA2-8E05-81009CE2F19A}" type="datetimeFigureOut">
               <a:rPr lang="en-GB" smtClean="0"/>
-              <a:t>21/02/2013</a:t>
+              <a:t>25/04/2013</a:t>
             </a:fld>
             <a:endParaRPr lang="en-GB"/>
           </a:p>
@@ -463,7 +463,7 @@
           <a:p>
             <a:fld id="{2724F6E8-1EEB-4BA2-8E05-81009CE2F19A}" type="datetimeFigureOut">
               <a:rPr lang="en-GB" smtClean="0"/>
-              <a:t>21/02/2013</a:t>
+              <a:t>25/04/2013</a:t>
             </a:fld>
             <a:endParaRPr lang="en-GB"/>
           </a:p>
@@ -643,7 +643,7 @@
           <a:p>
             <a:fld id="{2724F6E8-1EEB-4BA2-8E05-81009CE2F19A}" type="datetimeFigureOut">
               <a:rPr lang="en-GB" smtClean="0"/>
-              <a:t>21/02/2013</a:t>
+              <a:t>25/04/2013</a:t>
             </a:fld>
             <a:endParaRPr lang="en-GB"/>
           </a:p>
@@ -813,7 +813,7 @@
           <a:p>
             <a:fld id="{2724F6E8-1EEB-4BA2-8E05-81009CE2F19A}" type="datetimeFigureOut">
               <a:rPr lang="en-GB" smtClean="0"/>
-              <a:t>21/02/2013</a:t>
+              <a:t>25/04/2013</a:t>
             </a:fld>
             <a:endParaRPr lang="en-GB"/>
           </a:p>
@@ -1059,7 +1059,7 @@
           <a:p>
             <a:fld id="{2724F6E8-1EEB-4BA2-8E05-81009CE2F19A}" type="datetimeFigureOut">
               <a:rPr lang="en-GB" smtClean="0"/>
-              <a:t>21/02/2013</a:t>
+              <a:t>25/04/2013</a:t>
             </a:fld>
             <a:endParaRPr lang="en-GB"/>
           </a:p>
@@ -1347,7 +1347,7 @@
           <a:p>
             <a:fld id="{2724F6E8-1EEB-4BA2-8E05-81009CE2F19A}" type="datetimeFigureOut">
               <a:rPr lang="en-GB" smtClean="0"/>
-              <a:t>21/02/2013</a:t>
+              <a:t>25/04/2013</a:t>
             </a:fld>
             <a:endParaRPr lang="en-GB"/>
           </a:p>
@@ -1769,7 +1769,7 @@
           <a:p>
             <a:fld id="{2724F6E8-1EEB-4BA2-8E05-81009CE2F19A}" type="datetimeFigureOut">
               <a:rPr lang="en-GB" smtClean="0"/>
-              <a:t>21/02/2013</a:t>
+              <a:t>25/04/2013</a:t>
             </a:fld>
             <a:endParaRPr lang="en-GB"/>
           </a:p>
@@ -1887,7 +1887,7 @@
           <a:p>
             <a:fld id="{2724F6E8-1EEB-4BA2-8E05-81009CE2F19A}" type="datetimeFigureOut">
               <a:rPr lang="en-GB" smtClean="0"/>
-              <a:t>21/02/2013</a:t>
+              <a:t>25/04/2013</a:t>
             </a:fld>
             <a:endParaRPr lang="en-GB"/>
           </a:p>
@@ -1982,7 +1982,7 @@
           <a:p>
             <a:fld id="{2724F6E8-1EEB-4BA2-8E05-81009CE2F19A}" type="datetimeFigureOut">
               <a:rPr lang="en-GB" smtClean="0"/>
-              <a:t>21/02/2013</a:t>
+              <a:t>25/04/2013</a:t>
             </a:fld>
             <a:endParaRPr lang="en-GB"/>
           </a:p>
@@ -2259,7 +2259,7 @@
           <a:p>
             <a:fld id="{2724F6E8-1EEB-4BA2-8E05-81009CE2F19A}" type="datetimeFigureOut">
               <a:rPr lang="en-GB" smtClean="0"/>
-              <a:t>21/02/2013</a:t>
+              <a:t>25/04/2013</a:t>
             </a:fld>
             <a:endParaRPr lang="en-GB"/>
           </a:p>
@@ -2512,7 +2512,7 @@
           <a:p>
             <a:fld id="{2724F6E8-1EEB-4BA2-8E05-81009CE2F19A}" type="datetimeFigureOut">
               <a:rPr lang="en-GB" smtClean="0"/>
-              <a:t>21/02/2013</a:t>
+              <a:t>25/04/2013</a:t>
             </a:fld>
             <a:endParaRPr lang="en-GB"/>
           </a:p>
@@ -2725,7 +2725,7 @@
           <a:p>
             <a:fld id="{2724F6E8-1EEB-4BA2-8E05-81009CE2F19A}" type="datetimeFigureOut">
               <a:rPr lang="en-GB" smtClean="0"/>
-              <a:t>21/02/2013</a:t>
+              <a:t>25/04/2013</a:t>
             </a:fld>
             <a:endParaRPr lang="en-GB"/>
           </a:p>
@@ -3102,7 +3102,7 @@
       </p:grpSpPr>
       <p:pic>
         <p:nvPicPr>
-          <p:cNvPr id="2" name="Picture 2"/>
+          <p:cNvPr id="1026" name="Picture 2"/>
           <p:cNvPicPr>
             <a:picLocks noChangeAspect="1" noChangeArrowheads="1"/>
           </p:cNvPicPr>
@@ -3123,18 +3123,15 @@
         </p:blipFill>
         <p:spPr bwMode="auto">
           <a:xfrm>
-            <a:off x="261890" y="-42864"/>
+            <a:off x="266078" y="-42864"/>
             <a:ext cx="8611844" cy="6353171"/>
           </a:xfrm>
           <a:prstGeom prst="rect">
             <a:avLst/>
           </a:prstGeom>
           <a:noFill/>
-          <a:ln w="9525">
+          <a:ln>
             <a:noFill/>
-            <a:miter lim="800000"/>
-            <a:headEnd/>
-            <a:tailEnd/>
           </a:ln>
           <a:effectLst/>
           <a:extLst>
@@ -3144,6 +3141,16 @@
                   <a:schemeClr val="accent1"/>
                 </a:solidFill>
               </a14:hiddenFill>
+            </a:ext>
+            <a:ext uri="{91240B29-F687-4F45-9708-019B960494DF}">
+              <a14:hiddenLine xmlns:a14="http://schemas.microsoft.com/office/drawing/2010/main" w="9525">
+                <a:solidFill>
+                  <a:schemeClr val="tx1"/>
+                </a:solidFill>
+                <a:miter lim="800000"/>
+                <a:headEnd/>
+                <a:tailEnd/>
+              </a14:hiddenLine>
             </a:ext>
             <a:ext uri="{AF507438-7753-43E0-B8FC-AC1667EBCBE1}">
               <a14:hiddenEffects xmlns:a14="http://schemas.microsoft.com/office/drawing/2010/main">
@@ -3166,9 +3173,9 @@
         <p:grpSpPr>
           <a:xfrm>
             <a:off x="1637694" y="6405810"/>
-            <a:ext cx="5868613" cy="407566"/>
+            <a:ext cx="5818580" cy="407566"/>
             <a:chOff x="49564" y="6405810"/>
-            <a:chExt cx="5868613" cy="407566"/>
+            <a:chExt cx="5818580" cy="407566"/>
           </a:xfrm>
         </p:grpSpPr>
         <p:sp>
@@ -3217,7 +3224,7 @@
           </p:nvSpPr>
           <p:spPr>
             <a:xfrm>
-              <a:off x="125861" y="6564066"/>
+              <a:off x="1566676" y="6564066"/>
               <a:ext cx="288000" cy="180000"/>
             </a:xfrm>
             <a:prstGeom prst="rect">
@@ -3254,61 +3261,13 @@
         </p:sp>
         <p:sp>
           <p:nvSpPr>
-            <p:cNvPr id="6" name="6-Point Star 5"/>
-            <p:cNvSpPr/>
-            <p:nvPr/>
-          </p:nvSpPr>
-          <p:spPr>
-            <a:xfrm>
-              <a:off x="3707904" y="6575317"/>
-              <a:ext cx="139910" cy="157498"/>
-            </a:xfrm>
-            <a:prstGeom prst="star6">
-              <a:avLst/>
-            </a:prstGeom>
-            <a:solidFill>
-              <a:schemeClr val="tx1"/>
-            </a:solidFill>
-            <a:ln>
-              <a:solidFill>
-                <a:schemeClr val="tx1"/>
-              </a:solidFill>
-            </a:ln>
-          </p:spPr>
-          <p:style>
-            <a:lnRef idx="2">
-              <a:schemeClr val="accent1">
-                <a:shade val="50000"/>
-              </a:schemeClr>
-            </a:lnRef>
-            <a:fillRef idx="1">
-              <a:schemeClr val="accent1"/>
-            </a:fillRef>
-            <a:effectRef idx="0">
-              <a:schemeClr val="accent1"/>
-            </a:effectRef>
-            <a:fontRef idx="minor">
-              <a:schemeClr val="lt1"/>
-            </a:fontRef>
-          </p:style>
-          <p:txBody>
-            <a:bodyPr rtlCol="0" anchor="ctr"/>
-            <a:lstStyle/>
-            <a:p>
-              <a:pPr algn="ctr"/>
-              <a:endParaRPr lang="en-US"/>
-            </a:p>
-          </p:txBody>
-        </p:sp>
-        <p:sp>
-          <p:nvSpPr>
             <p:cNvPr id="7" name="TextBox 6"/>
             <p:cNvSpPr txBox="1"/>
             <p:nvPr/>
           </p:nvSpPr>
           <p:spPr>
             <a:xfrm>
-              <a:off x="389617" y="6405810"/>
+              <a:off x="1830432" y="6405810"/>
               <a:ext cx="2377574" cy="383503"/>
             </a:xfrm>
             <a:prstGeom prst="rect">
@@ -3334,39 +3293,6 @@
               <a:r>
                 <a:rPr lang="en-US" sz="1100" dirty="0" smtClean="0"/>
                 <a:t>apability with an XML representation</a:t>
-              </a:r>
-            </a:p>
-          </p:txBody>
-        </p:sp>
-        <p:sp>
-          <p:nvSpPr>
-            <p:cNvPr id="9" name="Rectangle 8"/>
-            <p:cNvSpPr/>
-            <p:nvPr/>
-          </p:nvSpPr>
-          <p:spPr>
-            <a:xfrm>
-              <a:off x="3835556" y="6405810"/>
-              <a:ext cx="2082621" cy="383503"/>
-            </a:xfrm>
-            <a:prstGeom prst="rect">
-              <a:avLst/>
-            </a:prstGeom>
-          </p:spPr>
-          <p:txBody>
-            <a:bodyPr wrap="none">
-              <a:spAutoFit/>
-            </a:bodyPr>
-            <a:lstStyle/>
-            <a:p>
-              <a:pPr>
-                <a:lnSpc>
-                  <a:spcPct val="200000"/>
-                </a:lnSpc>
-              </a:pPr>
-              <a:r>
-                <a:rPr lang="en-US" sz="1100" dirty="0"/>
-                <a:t>Capability not part of this version</a:t>
               </a:r>
             </a:p>
           </p:txBody>
@@ -3586,41 +3512,6 @@
       </p:cxnSp>
       <p:cxnSp>
         <p:nvCxnSpPr>
-          <p:cNvPr id="143" name="Straight Connector 142"/>
-          <p:cNvCxnSpPr/>
-          <p:nvPr/>
-        </p:nvCxnSpPr>
-        <p:spPr>
-          <a:xfrm>
-            <a:off x="4130725" y="3559255"/>
-            <a:ext cx="3609627" cy="626540"/>
-          </a:xfrm>
-          <a:prstGeom prst="line">
-            <a:avLst/>
-          </a:prstGeom>
-          <a:ln w="28575">
-            <a:solidFill>
-              <a:schemeClr val="tx1"/>
-            </a:solidFill>
-          </a:ln>
-        </p:spPr>
-        <p:style>
-          <a:lnRef idx="1">
-            <a:schemeClr val="accent1"/>
-          </a:lnRef>
-          <a:fillRef idx="0">
-            <a:schemeClr val="accent1"/>
-          </a:fillRef>
-          <a:effectRef idx="0">
-            <a:schemeClr val="accent1"/>
-          </a:effectRef>
-          <a:fontRef idx="minor">
-            <a:schemeClr val="tx1"/>
-          </a:fontRef>
-        </p:style>
-      </p:cxnSp>
-      <p:cxnSp>
-        <p:nvCxnSpPr>
           <p:cNvPr id="140" name="Straight Connector 139"/>
           <p:cNvCxnSpPr/>
           <p:nvPr/>
@@ -3628,7 +3519,7 @@
         <p:spPr>
           <a:xfrm>
             <a:off x="3989189" y="3677849"/>
-            <a:ext cx="3290979" cy="1083903"/>
+            <a:ext cx="3998770" cy="1335392"/>
           </a:xfrm>
           <a:prstGeom prst="line">
             <a:avLst/>
@@ -4382,8 +4273,8 @@
         </p:nvSpPr>
         <p:spPr>
           <a:xfrm>
-            <a:off x="6857839" y="4754203"/>
-            <a:ext cx="2232000" cy="886637"/>
+            <a:off x="6857839" y="5021449"/>
+            <a:ext cx="2232000" cy="619391"/>
           </a:xfrm>
           <a:prstGeom prst="rect">
             <a:avLst/>
@@ -4416,73 +4307,6 @@
                 </a:solidFill>
               </a:rPr>
               <a:t>Kinematics</a:t>
-            </a:r>
-            <a:endParaRPr lang="en-US" sz="1400" b="1" dirty="0">
-              <a:solidFill>
-                <a:schemeClr val="tx1"/>
-              </a:solidFill>
-            </a:endParaRPr>
-          </a:p>
-        </p:txBody>
-      </p:sp>
-      <p:sp>
-        <p:nvSpPr>
-          <p:cNvPr id="15" name="Rectangle 14"/>
-          <p:cNvSpPr/>
-          <p:nvPr/>
-        </p:nvSpPr>
-        <p:spPr>
-          <a:xfrm>
-            <a:off x="7067702" y="3715184"/>
-            <a:ext cx="2033768" cy="886637"/>
-          </a:xfrm>
-          <a:prstGeom prst="rect">
-            <a:avLst/>
-          </a:prstGeom>
-          <a:ln/>
-        </p:spPr>
-        <p:style>
-          <a:lnRef idx="0">
-            <a:schemeClr val="accent6"/>
-          </a:lnRef>
-          <a:fillRef idx="3">
-            <a:schemeClr val="accent6"/>
-          </a:fillRef>
-          <a:effectRef idx="3">
-            <a:schemeClr val="accent6"/>
-          </a:effectRef>
-          <a:fontRef idx="minor">
-            <a:schemeClr val="lt1"/>
-          </a:fontRef>
-        </p:style>
-        <p:txBody>
-          <a:bodyPr lIns="0" tIns="0" rIns="0" bIns="0" rtlCol="0" anchor="t"/>
-          <a:lstStyle/>
-          <a:p>
-            <a:pPr algn="ctr"/>
-            <a:r>
-              <a:rPr lang="en-US" sz="1400" b="1" dirty="0" smtClean="0">
-                <a:solidFill>
-                  <a:schemeClr val="tx1"/>
-                </a:solidFill>
-              </a:rPr>
-              <a:t>Shape Data </a:t>
-            </a:r>
-            <a:r>
-              <a:rPr lang="en-US" sz="1400" b="1" dirty="0">
-                <a:solidFill>
-                  <a:schemeClr val="tx1"/>
-                </a:solidFill>
-              </a:rPr>
-              <a:t>Q</a:t>
-            </a:r>
-            <a:r>
-              <a:rPr lang="en-US" sz="1400" b="1" dirty="0" smtClean="0">
-                <a:solidFill>
-                  <a:schemeClr val="tx1"/>
-                </a:solidFill>
-              </a:rPr>
-              <a:t>uality</a:t>
             </a:r>
             <a:endParaRPr lang="en-US" sz="1400" b="1" dirty="0">
               <a:solidFill>
@@ -5680,228 +5504,6 @@
       </p:sp>
       <p:sp>
         <p:nvSpPr>
-          <p:cNvPr id="64" name="Rectangle 63"/>
-          <p:cNvSpPr/>
-          <p:nvPr/>
-        </p:nvSpPr>
-        <p:spPr>
-          <a:xfrm>
-            <a:off x="7158253" y="4000419"/>
-            <a:ext cx="1874603" cy="216024"/>
-          </a:xfrm>
-          <a:prstGeom prst="rect">
-            <a:avLst/>
-          </a:prstGeom>
-          <a:ln w="12700"/>
-        </p:spPr>
-        <p:style>
-          <a:lnRef idx="2">
-            <a:schemeClr val="dk1"/>
-          </a:lnRef>
-          <a:fillRef idx="1">
-            <a:schemeClr val="lt1"/>
-          </a:fillRef>
-          <a:effectRef idx="0">
-            <a:schemeClr val="dk1"/>
-          </a:effectRef>
-          <a:fontRef idx="minor">
-            <a:schemeClr val="dk1"/>
-          </a:fontRef>
-        </p:style>
-        <p:txBody>
-          <a:bodyPr rtlCol="0" anchor="ctr"/>
-          <a:lstStyle/>
-          <a:p>
-            <a:r>
-              <a:rPr lang="fr-FR" sz="1200" dirty="0" smtClean="0"/>
-              <a:t>Shape Data Q. Criteria</a:t>
-            </a:r>
-            <a:endParaRPr lang="en-GB" sz="1200" dirty="0"/>
-          </a:p>
-        </p:txBody>
-      </p:sp>
-      <p:sp>
-        <p:nvSpPr>
-          <p:cNvPr id="66" name="Rectangle 65"/>
-          <p:cNvSpPr/>
-          <p:nvPr/>
-        </p:nvSpPr>
-        <p:spPr>
-          <a:xfrm>
-            <a:off x="7158253" y="4272409"/>
-            <a:ext cx="1874603" cy="216024"/>
-          </a:xfrm>
-          <a:prstGeom prst="rect">
-            <a:avLst/>
-          </a:prstGeom>
-          <a:ln w="12700"/>
-        </p:spPr>
-        <p:style>
-          <a:lnRef idx="2">
-            <a:schemeClr val="dk1"/>
-          </a:lnRef>
-          <a:fillRef idx="1">
-            <a:schemeClr val="lt1"/>
-          </a:fillRef>
-          <a:effectRef idx="0">
-            <a:schemeClr val="dk1"/>
-          </a:effectRef>
-          <a:fontRef idx="minor">
-            <a:schemeClr val="dk1"/>
-          </a:fontRef>
-        </p:style>
-        <p:txBody>
-          <a:bodyPr rtlCol="0" anchor="ctr"/>
-          <a:lstStyle/>
-          <a:p>
-            <a:r>
-              <a:rPr lang="fr-FR" sz="1200" dirty="0" smtClean="0"/>
-              <a:t>Shape Data Q. Inspection</a:t>
-            </a:r>
-            <a:endParaRPr lang="en-GB" sz="1200" dirty="0"/>
-          </a:p>
-        </p:txBody>
-      </p:sp>
-      <p:sp>
-        <p:nvSpPr>
-          <p:cNvPr id="69" name="6-Point Star 68"/>
-          <p:cNvSpPr/>
-          <p:nvPr/>
-        </p:nvSpPr>
-        <p:spPr>
-          <a:xfrm>
-            <a:off x="8850049" y="4025793"/>
-            <a:ext cx="139910" cy="157498"/>
-          </a:xfrm>
-          <a:prstGeom prst="star6">
-            <a:avLst/>
-          </a:prstGeom>
-          <a:solidFill>
-            <a:schemeClr val="tx1"/>
-          </a:solidFill>
-          <a:ln>
-            <a:solidFill>
-              <a:schemeClr val="tx1"/>
-            </a:solidFill>
-          </a:ln>
-        </p:spPr>
-        <p:style>
-          <a:lnRef idx="2">
-            <a:schemeClr val="accent1">
-              <a:shade val="50000"/>
-            </a:schemeClr>
-          </a:lnRef>
-          <a:fillRef idx="1">
-            <a:schemeClr val="accent1"/>
-          </a:fillRef>
-          <a:effectRef idx="0">
-            <a:schemeClr val="accent1"/>
-          </a:effectRef>
-          <a:fontRef idx="minor">
-            <a:schemeClr val="lt1"/>
-          </a:fontRef>
-        </p:style>
-        <p:txBody>
-          <a:bodyPr rtlCol="0" anchor="ctr"/>
-          <a:lstStyle/>
-          <a:p>
-            <a:pPr algn="ctr"/>
-            <a:endParaRPr lang="en-GB"/>
-          </a:p>
-        </p:txBody>
-      </p:sp>
-      <p:sp>
-        <p:nvSpPr>
-          <p:cNvPr id="74" name="Rectangle 73"/>
-          <p:cNvSpPr/>
-          <p:nvPr/>
-        </p:nvSpPr>
-        <p:spPr>
-          <a:xfrm>
-            <a:off x="6914821" y="5052524"/>
-            <a:ext cx="2118036" cy="216024"/>
-          </a:xfrm>
-          <a:prstGeom prst="rect">
-            <a:avLst/>
-          </a:prstGeom>
-          <a:ln w="12700"/>
-        </p:spPr>
-        <p:style>
-          <a:lnRef idx="2">
-            <a:schemeClr val="dk1"/>
-          </a:lnRef>
-          <a:fillRef idx="1">
-            <a:schemeClr val="lt1"/>
-          </a:fillRef>
-          <a:effectRef idx="0">
-            <a:schemeClr val="dk1"/>
-          </a:effectRef>
-          <a:fontRef idx="minor">
-            <a:schemeClr val="dk1"/>
-          </a:fontRef>
-        </p:style>
-        <p:txBody>
-          <a:bodyPr rtlCol="0" anchor="ctr"/>
-          <a:lstStyle/>
-          <a:p>
-            <a:r>
-              <a:rPr lang="fr-FR" sz="1200" dirty="0" smtClean="0"/>
-              <a:t>Kinematic Structure &amp; Links</a:t>
-            </a:r>
-            <a:endParaRPr lang="en-GB" sz="1200" dirty="0"/>
-          </a:p>
-        </p:txBody>
-      </p:sp>
-      <p:sp>
-        <p:nvSpPr>
-          <p:cNvPr id="75" name="6-Point Star 74"/>
-          <p:cNvSpPr/>
-          <p:nvPr/>
-        </p:nvSpPr>
-        <p:spPr>
-          <a:xfrm>
-            <a:off x="8841165" y="5080629"/>
-            <a:ext cx="139910" cy="157498"/>
-          </a:xfrm>
-          <a:prstGeom prst="star6">
-            <a:avLst/>
-          </a:prstGeom>
-          <a:solidFill>
-            <a:schemeClr val="tx1"/>
-          </a:solidFill>
-          <a:ln>
-            <a:solidFill>
-              <a:schemeClr val="tx1"/>
-            </a:solidFill>
-          </a:ln>
-        </p:spPr>
-        <p:style>
-          <a:lnRef idx="2">
-            <a:schemeClr val="accent1">
-              <a:shade val="50000"/>
-            </a:schemeClr>
-          </a:lnRef>
-          <a:fillRef idx="1">
-            <a:schemeClr val="accent1"/>
-          </a:fillRef>
-          <a:effectRef idx="0">
-            <a:schemeClr val="accent1"/>
-          </a:effectRef>
-          <a:fontRef idx="minor">
-            <a:schemeClr val="lt1"/>
-          </a:fontRef>
-        </p:style>
-        <p:txBody>
-          <a:bodyPr rtlCol="0" anchor="ctr"/>
-          <a:lstStyle/>
-          <a:p>
-            <a:pPr algn="ctr"/>
-            <a:endParaRPr lang="en-GB"/>
-          </a:p>
-        </p:txBody>
-      </p:sp>
-      <p:sp>
-        <p:nvSpPr>
           <p:cNvPr id="76" name="Rectangle 75"/>
           <p:cNvSpPr/>
           <p:nvPr/>
@@ -8467,54 +8069,6 @@
           </a:extLst>
         </p:spPr>
       </p:pic>
-      <p:sp>
-        <p:nvSpPr>
-          <p:cNvPr id="133" name="6-Point Star 132"/>
-          <p:cNvSpPr/>
-          <p:nvPr/>
-        </p:nvSpPr>
-        <p:spPr>
-          <a:xfrm>
-            <a:off x="8852556" y="4303677"/>
-            <a:ext cx="139910" cy="157498"/>
-          </a:xfrm>
-          <a:prstGeom prst="star6">
-            <a:avLst/>
-          </a:prstGeom>
-          <a:solidFill>
-            <a:schemeClr val="tx1"/>
-          </a:solidFill>
-          <a:ln>
-            <a:solidFill>
-              <a:schemeClr val="tx1"/>
-            </a:solidFill>
-          </a:ln>
-        </p:spPr>
-        <p:style>
-          <a:lnRef idx="2">
-            <a:schemeClr val="accent1">
-              <a:shade val="50000"/>
-            </a:schemeClr>
-          </a:lnRef>
-          <a:fillRef idx="1">
-            <a:schemeClr val="accent1"/>
-          </a:fillRef>
-          <a:effectRef idx="0">
-            <a:schemeClr val="accent1"/>
-          </a:effectRef>
-          <a:fontRef idx="minor">
-            <a:schemeClr val="lt1"/>
-          </a:fontRef>
-        </p:style>
-        <p:txBody>
-          <a:bodyPr rtlCol="0" anchor="ctr"/>
-          <a:lstStyle/>
-          <a:p>
-            <a:pPr algn="ctr"/>
-            <a:endParaRPr lang="en-GB"/>
-          </a:p>
-        </p:txBody>
-      </p:sp>
       <p:pic>
         <p:nvPicPr>
           <p:cNvPr id="134" name="Picture 2" descr="EXPRESS-G"/>

</xml_diff>